<commit_message>
-Fixed OnActivated launching of app -Updated some line breaks -Updated slides
</commit_message>
<xml_diff>
--- a/Hey Cortana, Where Am I.pptx
+++ b/Hey Cortana, Where Am I.pptx
@@ -114,6 +114,11 @@
       </a:defRPr>
     </a:lvl9pPr>
   </p:defaultTextStyle>
+  <p:extLst>
+    <p:ext uri="{EFAFB233-063F-42B5-8137-9DF3F51BA10A}">
+      <p15:sldGuideLst xmlns:p15="http://schemas.microsoft.com/office/powerpoint/2012/main"/>
+    </p:ext>
+  </p:extLst>
 </p:presentation>
 </file>
 
@@ -2948,13 +2953,8 @@
             </a:pPr>
             <a:r>
               <a:rPr lang="en-US" dirty="0" smtClean="0"/>
-              <a:t>Contact </a:t>
-            </a:r>
-            <a:r>
-              <a:rPr lang="en-US" dirty="0" smtClean="0"/>
-              <a:t>Me</a:t>
-            </a:r>
-            <a:endParaRPr lang="en-US" dirty="0" smtClean="0"/>
+              <a:t>Contact Me</a:t>
+            </a:r>
           </a:p>
           <a:p>
             <a:pPr marL="0" indent="0" algn="ctr">
@@ -2974,13 +2974,8 @@
             </a:pPr>
             <a:r>
               <a:rPr lang="en-US" dirty="0" smtClean="0"/>
-              <a:t>Mention </a:t>
-            </a:r>
-            <a:r>
-              <a:rPr lang="en-US" dirty="0" smtClean="0"/>
-              <a:t>That Conference</a:t>
-            </a:r>
-            <a:endParaRPr lang="en-US" dirty="0" smtClean="0"/>
+              <a:t>Mention That Conference</a:t>
+            </a:r>
           </a:p>
         </p:txBody>
       </p:sp>
@@ -3387,9 +3382,10 @@
           </a:p>
           <a:p>
             <a:r>
-              <a:rPr lang="en-US" dirty="0"/>
-              <a:t>Now support dictation variables</a:t>
-            </a:r>
+              <a:rPr lang="en-US" dirty="0" smtClean="0"/>
+              <a:t>Declare Dictation Phrase Topics</a:t>
+            </a:r>
+            <a:endParaRPr lang="en-US" dirty="0"/>
           </a:p>
           <a:p>
             <a:r>
@@ -3397,8 +3393,8 @@
               <a:t>Declare Capabilities in </a:t>
             </a:r>
             <a:r>
-              <a:rPr lang="en-US" dirty="0" smtClean="0"/>
-              <a:t>AppxManifext.xml</a:t>
+              <a:rPr lang="en-US" smtClean="0"/>
+              <a:t>Package.appxmanifest</a:t>
             </a:r>
             <a:endParaRPr lang="en-US" dirty="0"/>
           </a:p>
@@ -3681,7 +3677,6 @@
               <a:rPr lang="en-US" dirty="0"/>
               <a:t>Good for custom uses</a:t>
             </a:r>
-            <a:endParaRPr lang="en-US" dirty="0"/>
           </a:p>
         </p:txBody>
       </p:sp>
@@ -3877,7 +3872,6 @@
               <a:rPr lang="en-US" dirty="0"/>
               <a:t>Fast and accurate</a:t>
             </a:r>
-            <a:endParaRPr lang="en-US" dirty="0"/>
           </a:p>
         </p:txBody>
       </p:sp>

</xml_diff>

<commit_message>
-Captains Log Demo now prompts for voice interation -Captains Log Demo now accepts "Captains Log" then provides a UI to provide a new log entry. -Updated slide deck
</commit_message>
<xml_diff>
--- a/Hey Cortana, Where Am I.pptx
+++ b/Hey Cortana, Where Am I.pptx
@@ -12,10 +12,12 @@
     <p:sldId id="260" r:id="rId6"/>
     <p:sldId id="261" r:id="rId7"/>
     <p:sldId id="262" r:id="rId8"/>
-    <p:sldId id="263" r:id="rId9"/>
-    <p:sldId id="264" r:id="rId10"/>
-    <p:sldId id="265" r:id="rId11"/>
-    <p:sldId id="266" r:id="rId12"/>
+    <p:sldId id="267" r:id="rId9"/>
+    <p:sldId id="268" r:id="rId10"/>
+    <p:sldId id="263" r:id="rId11"/>
+    <p:sldId id="264" r:id="rId12"/>
+    <p:sldId id="265" r:id="rId13"/>
+    <p:sldId id="266" r:id="rId14"/>
   </p:sldIdLst>
   <p:sldSz cx="12192000" cy="6858000"/>
   <p:notesSz cx="6858000" cy="9144000"/>
@@ -2548,6 +2550,237 @@
           <a:p>
             <a:r>
               <a:rPr lang="en-US" dirty="0"/>
+              <a:t>Single Shot Location</a:t>
+            </a:r>
+          </a:p>
+        </p:txBody>
+      </p:sp>
+      <p:sp>
+        <p:nvSpPr>
+          <p:cNvPr id="3" name="Content Placeholder 2"/>
+          <p:cNvSpPr>
+            <a:spLocks noGrp="1"/>
+          </p:cNvSpPr>
+          <p:nvPr>
+            <p:ph idx="1"/>
+          </p:nvPr>
+        </p:nvSpPr>
+        <p:spPr/>
+        <p:txBody>
+          <a:bodyPr/>
+          <a:lstStyle/>
+          <a:p>
+            <a:r>
+              <a:rPr lang="en-US" dirty="0" err="1"/>
+              <a:t>Geolocator.DesiredAccuracy</a:t>
+            </a:r>
+            <a:endParaRPr lang="en-US" dirty="0"/>
+          </a:p>
+          <a:p>
+            <a:r>
+              <a:rPr lang="en-US" dirty="0"/>
+              <a:t>Uses</a:t>
+            </a:r>
+          </a:p>
+          <a:p>
+            <a:pPr lvl="1"/>
+            <a:r>
+              <a:rPr lang="en-US" dirty="0"/>
+              <a:t>Check-In’s</a:t>
+            </a:r>
+          </a:p>
+          <a:p>
+            <a:pPr lvl="1"/>
+            <a:r>
+              <a:rPr lang="en-US" dirty="0"/>
+              <a:t>Placing a geocache</a:t>
+            </a:r>
+          </a:p>
+          <a:p>
+            <a:pPr lvl="1"/>
+            <a:r>
+              <a:rPr lang="en-US" dirty="0"/>
+              <a:t>Where am I?</a:t>
+            </a:r>
+          </a:p>
+          <a:p>
+            <a:pPr lvl="1"/>
+            <a:r>
+              <a:rPr lang="en-US" dirty="0"/>
+              <a:t>Where did I park?</a:t>
+            </a:r>
+          </a:p>
+          <a:p>
+            <a:pPr lvl="1"/>
+            <a:r>
+              <a:rPr lang="en-US" dirty="0"/>
+              <a:t>What country am I in?</a:t>
+            </a:r>
+          </a:p>
+        </p:txBody>
+      </p:sp>
+    </p:spTree>
+    <p:extLst>
+      <p:ext uri="{BB962C8B-B14F-4D97-AF65-F5344CB8AC3E}">
+        <p14:creationId xmlns:p14="http://schemas.microsoft.com/office/powerpoint/2010/main" val="3195247172"/>
+      </p:ext>
+    </p:extLst>
+  </p:cSld>
+  <p:clrMapOvr>
+    <a:masterClrMapping/>
+  </p:clrMapOvr>
+</p:sld>
+</file>
+
+<file path=ppt/slides/slide11.xml><?xml version="1.0" encoding="utf-8"?>
+<p:sld xmlns:a="http://schemas.openxmlformats.org/drawingml/2006/main" xmlns:r="http://schemas.openxmlformats.org/officeDocument/2006/relationships" xmlns:p="http://schemas.openxmlformats.org/presentationml/2006/main">
+  <p:cSld>
+    <p:spTree>
+      <p:nvGrpSpPr>
+        <p:cNvPr id="1" name=""/>
+        <p:cNvGrpSpPr/>
+        <p:nvPr/>
+      </p:nvGrpSpPr>
+      <p:grpSpPr>
+        <a:xfrm>
+          <a:off x="0" y="0"/>
+          <a:ext cx="0" cy="0"/>
+          <a:chOff x="0" y="0"/>
+          <a:chExt cx="0" cy="0"/>
+        </a:xfrm>
+      </p:grpSpPr>
+      <p:sp>
+        <p:nvSpPr>
+          <p:cNvPr id="2" name="Title 1"/>
+          <p:cNvSpPr>
+            <a:spLocks noGrp="1"/>
+          </p:cNvSpPr>
+          <p:nvPr>
+            <p:ph type="title"/>
+          </p:nvPr>
+        </p:nvSpPr>
+        <p:spPr/>
+        <p:txBody>
+          <a:bodyPr/>
+          <a:lstStyle/>
+          <a:p>
+            <a:r>
+              <a:rPr lang="en-US" dirty="0"/>
+              <a:t>Continuous Tracking</a:t>
+            </a:r>
+          </a:p>
+        </p:txBody>
+      </p:sp>
+      <p:sp>
+        <p:nvSpPr>
+          <p:cNvPr id="3" name="Content Placeholder 2"/>
+          <p:cNvSpPr>
+            <a:spLocks noGrp="1"/>
+          </p:cNvSpPr>
+          <p:nvPr>
+            <p:ph idx="1"/>
+          </p:nvPr>
+        </p:nvSpPr>
+        <p:spPr/>
+        <p:txBody>
+          <a:bodyPr/>
+          <a:lstStyle/>
+          <a:p>
+            <a:r>
+              <a:rPr lang="en-US" dirty="0"/>
+              <a:t>Report Interval</a:t>
+            </a:r>
+          </a:p>
+          <a:p>
+            <a:r>
+              <a:rPr lang="en-US" dirty="0"/>
+              <a:t>Movement Interval</a:t>
+            </a:r>
+          </a:p>
+          <a:p>
+            <a:r>
+              <a:rPr lang="en-US" dirty="0"/>
+              <a:t>Uses</a:t>
+            </a:r>
+          </a:p>
+          <a:p>
+            <a:pPr lvl="1"/>
+            <a:r>
+              <a:rPr lang="en-US" dirty="0"/>
+              <a:t>Running</a:t>
+            </a:r>
+          </a:p>
+          <a:p>
+            <a:pPr lvl="1"/>
+            <a:r>
+              <a:rPr lang="en-US" dirty="0"/>
+              <a:t>Mt. Biking</a:t>
+            </a:r>
+          </a:p>
+          <a:p>
+            <a:pPr lvl="1"/>
+            <a:r>
+              <a:rPr lang="en-US" dirty="0"/>
+              <a:t>Exercising</a:t>
+            </a:r>
+          </a:p>
+          <a:p>
+            <a:pPr lvl="1"/>
+            <a:r>
+              <a:rPr lang="en-US" dirty="0" smtClean="0"/>
+              <a:t>Navigation</a:t>
+            </a:r>
+            <a:endParaRPr lang="en-US" dirty="0"/>
+          </a:p>
+        </p:txBody>
+      </p:sp>
+    </p:spTree>
+    <p:extLst>
+      <p:ext uri="{BB962C8B-B14F-4D97-AF65-F5344CB8AC3E}">
+        <p14:creationId xmlns:p14="http://schemas.microsoft.com/office/powerpoint/2010/main" val="2047251107"/>
+      </p:ext>
+    </p:extLst>
+  </p:cSld>
+  <p:clrMapOvr>
+    <a:masterClrMapping/>
+  </p:clrMapOvr>
+</p:sld>
+</file>
+
+<file path=ppt/slides/slide12.xml><?xml version="1.0" encoding="utf-8"?>
+<p:sld xmlns:a="http://schemas.openxmlformats.org/drawingml/2006/main" xmlns:r="http://schemas.openxmlformats.org/officeDocument/2006/relationships" xmlns:p="http://schemas.openxmlformats.org/presentationml/2006/main">
+  <p:cSld>
+    <p:spTree>
+      <p:nvGrpSpPr>
+        <p:cNvPr id="1" name=""/>
+        <p:cNvGrpSpPr/>
+        <p:nvPr/>
+      </p:nvGrpSpPr>
+      <p:grpSpPr>
+        <a:xfrm>
+          <a:off x="0" y="0"/>
+          <a:ext cx="0" cy="0"/>
+          <a:chOff x="0" y="0"/>
+          <a:chExt cx="0" cy="0"/>
+        </a:xfrm>
+      </p:grpSpPr>
+      <p:sp>
+        <p:nvSpPr>
+          <p:cNvPr id="2" name="Title 1"/>
+          <p:cNvSpPr>
+            <a:spLocks noGrp="1"/>
+          </p:cNvSpPr>
+          <p:nvPr>
+            <p:ph type="title"/>
+          </p:nvPr>
+        </p:nvSpPr>
+        <p:spPr/>
+        <p:txBody>
+          <a:bodyPr/>
+          <a:lstStyle/>
+          <a:p>
+            <a:r>
+              <a:rPr lang="en-US" dirty="0"/>
               <a:t>Best Practices</a:t>
             </a:r>
           </a:p>
@@ -2620,7 +2853,7 @@
 </p:sld>
 </file>
 
-<file path=ppt/slides/slide11.xml><?xml version="1.0" encoding="utf-8"?>
+<file path=ppt/slides/slide13.xml><?xml version="1.0" encoding="utf-8"?>
 <p:sld xmlns:a="http://schemas.openxmlformats.org/drawingml/2006/main" xmlns:r="http://schemas.openxmlformats.org/officeDocument/2006/relationships" xmlns:p="http://schemas.openxmlformats.org/presentationml/2006/main">
   <p:cSld>
     <p:spTree>
@@ -3495,17 +3728,49 @@
           <a:p>
             <a:pPr lvl="1"/>
             <a:r>
-              <a:rPr lang="en-US" dirty="0"/>
+              <a:rPr lang="en-US" dirty="0" smtClean="0"/>
               <a:t>.</a:t>
             </a:r>
             <a:r>
+              <a:rPr lang="en-US" dirty="0"/>
+              <a:t> </a:t>
+            </a:r>
+            <a:r>
               <a:rPr lang="en-US" dirty="0" err="1"/>
-              <a:t>SpeakTextAsync</a:t>
-            </a:r>
-            <a:r>
-              <a:rPr lang="en-US" dirty="0"/>
-              <a:t>(“string”)</a:t>
-            </a:r>
+              <a:t>SynthesizeTextToStreamAsync</a:t>
+            </a:r>
+            <a:r>
+              <a:rPr lang="en-US" dirty="0" smtClean="0"/>
+              <a:t>(“normal language string”);</a:t>
+            </a:r>
+          </a:p>
+          <a:p>
+            <a:pPr lvl="1"/>
+            <a:r>
+              <a:rPr lang="en-US" dirty="0" smtClean="0"/>
+              <a:t>.</a:t>
+            </a:r>
+            <a:r>
+              <a:rPr lang="en-US" dirty="0"/>
+              <a:t> </a:t>
+            </a:r>
+            <a:r>
+              <a:rPr lang="en-US" dirty="0" err="1" smtClean="0"/>
+              <a:t>SynthesizeSsmlToStreamAsync</a:t>
+            </a:r>
+            <a:r>
+              <a:rPr lang="en-US" dirty="0" smtClean="0"/>
+              <a:t>(“</a:t>
+            </a:r>
+            <a:r>
+              <a:rPr lang="en-US" dirty="0" err="1" smtClean="0"/>
+              <a:t>ssml</a:t>
+            </a:r>
+            <a:r>
+              <a:rPr lang="en-US" dirty="0" smtClean="0"/>
+              <a:t> string”);</a:t>
+            </a:r>
+            <a:endParaRPr lang="en-US" dirty="0"/>
           </a:p>
           <a:p>
             <a:r>
@@ -3588,8 +3853,24 @@
           <a:lstStyle/>
           <a:p>
             <a:r>
-              <a:rPr lang="en-US" dirty="0" err="1"/>
-              <a:t>SpeechRecognizerUI</a:t>
+              <a:rPr lang="en-US" dirty="0" err="1" smtClean="0"/>
+              <a:t>SpeechRecognizer</a:t>
+            </a:r>
+            <a:r>
+              <a:rPr lang="en-US" dirty="0" smtClean="0"/>
+              <a:t>.</a:t>
+            </a:r>
+            <a:r>
+              <a:rPr lang="en-US" dirty="0"/>
+              <a:t> </a:t>
+            </a:r>
+            <a:r>
+              <a:rPr lang="en-US" dirty="0" err="1" smtClean="0"/>
+              <a:t>RecognizeWithUIAsync</a:t>
+            </a:r>
+            <a:r>
+              <a:rPr lang="en-US" dirty="0" smtClean="0"/>
+              <a:t>()</a:t>
             </a:r>
             <a:endParaRPr lang="en-US" dirty="0"/>
           </a:p>
@@ -3616,12 +3897,6 @@
             </a:r>
           </a:p>
           <a:p>
-            <a:r>
-              <a:rPr lang="en-US" dirty="0"/>
-              <a:t>Good for basic uses</a:t>
-            </a:r>
-          </a:p>
-          <a:p>
             <a:endParaRPr lang="en-US" dirty="0"/>
           </a:p>
           <a:p>
@@ -3645,8 +3920,24 @@
           <a:lstStyle/>
           <a:p>
             <a:r>
-              <a:rPr lang="en-US" dirty="0" err="1"/>
+              <a:rPr lang="en-US" dirty="0" err="1" smtClean="0"/>
               <a:t>SpeechRecognizer</a:t>
+            </a:r>
+            <a:r>
+              <a:rPr lang="en-US" dirty="0" smtClean="0"/>
+              <a:t>.</a:t>
+            </a:r>
+            <a:r>
+              <a:rPr lang="en-US" dirty="0"/>
+              <a:t> </a:t>
+            </a:r>
+            <a:r>
+              <a:rPr lang="en-US" dirty="0" err="1" smtClean="0"/>
+              <a:t>RecognizeAsync</a:t>
+            </a:r>
+            <a:r>
+              <a:rPr lang="en-US" dirty="0" smtClean="0"/>
+              <a:t>()</a:t>
             </a:r>
             <a:endParaRPr lang="en-US" dirty="0"/>
           </a:p>
@@ -3669,14 +3960,13 @@
           <a:p>
             <a:r>
               <a:rPr lang="en-US" dirty="0"/>
-              <a:t>App must provide any desired UI for interaction</a:t>
-            </a:r>
-          </a:p>
-          <a:p>
-            <a:r>
-              <a:rPr lang="en-US" dirty="0"/>
-              <a:t>Good for custom uses</a:t>
-            </a:r>
+              <a:t>App must provide any desired UI for </a:t>
+            </a:r>
+            <a:r>
+              <a:rPr lang="en-US" dirty="0" smtClean="0"/>
+              <a:t>interaction</a:t>
+            </a:r>
+            <a:endParaRPr lang="en-US" dirty="0"/>
           </a:p>
         </p:txBody>
       </p:sp>
@@ -3702,8 +3992,8 @@
         </p:blipFill>
         <p:spPr>
           <a:xfrm>
-            <a:off x="1143000" y="3048000"/>
-            <a:ext cx="1846898" cy="3078163"/>
+            <a:off x="1142999" y="2597566"/>
+            <a:ext cx="2117159" cy="3528598"/>
           </a:xfrm>
           <a:prstGeom prst="rect">
             <a:avLst/>
@@ -3732,8 +4022,8 @@
         </p:blipFill>
         <p:spPr>
           <a:xfrm>
-            <a:off x="7527174" y="3001963"/>
-            <a:ext cx="1874520" cy="3124200"/>
+            <a:off x="7527174" y="2597566"/>
+            <a:ext cx="2117158" cy="3528597"/>
           </a:xfrm>
           <a:prstGeom prst="rect">
             <a:avLst/>
@@ -3787,8 +4077,17 @@
           <a:p>
             <a:r>
               <a:rPr lang="en-US" dirty="0"/>
-              <a:t>Choosing Between Grammars</a:t>
-            </a:r>
+              <a:t>Choosing </a:t>
+            </a:r>
+            <a:r>
+              <a:rPr lang="en-US" dirty="0" smtClean="0"/>
+              <a:t>a </a:t>
+            </a:r>
+            <a:r>
+              <a:rPr lang="en-US" dirty="0" err="1" smtClean="0"/>
+              <a:t>ISpeechRecognitionConstraint</a:t>
+            </a:r>
+            <a:endParaRPr lang="en-US" dirty="0"/>
           </a:p>
         </p:txBody>
       </p:sp>
@@ -3804,74 +4103,145 @@
         </p:nvSpPr>
         <p:spPr/>
         <p:txBody>
-          <a:bodyPr/>
+          <a:bodyPr>
+            <a:normAutofit lnSpcReduction="10000"/>
+          </a:bodyPr>
           <a:lstStyle/>
           <a:p>
             <a:r>
-              <a:rPr lang="en-US" dirty="0"/>
-              <a:t>Dictation and Web Search Grammar</a:t>
-            </a:r>
+              <a:rPr lang="en-US" dirty="0" err="1" smtClean="0"/>
+              <a:t>SpeechRecognitionTopicConstraint</a:t>
+            </a:r>
+            <a:r>
+              <a:rPr lang="en-US" dirty="0" smtClean="0"/>
+              <a:t>(</a:t>
+            </a:r>
+          </a:p>
+          <a:p>
+            <a:pPr marL="342900" lvl="1" indent="0">
+              <a:buNone/>
+            </a:pPr>
+            <a:r>
+              <a:rPr lang="en-US" dirty="0"/>
+              <a:t>	</a:t>
+            </a:r>
+            <a:r>
+              <a:rPr lang="en-US" sz="2400" dirty="0" err="1" smtClean="0"/>
+              <a:t>SpeechRecognitionScenario.Dictation</a:t>
+            </a:r>
+            <a:r>
+              <a:rPr lang="en-US" dirty="0" smtClean="0"/>
+              <a:t>, “</a:t>
+            </a:r>
+            <a:r>
+              <a:rPr lang="en-US" dirty="0" err="1" smtClean="0"/>
+              <a:t>TopicHint</a:t>
+            </a:r>
+            <a:r>
+              <a:rPr lang="en-US" dirty="0" smtClean="0"/>
+              <a:t>”, “Tag" </a:t>
+            </a:r>
+            <a:r>
+              <a:rPr lang="en-US" dirty="0"/>
+              <a:t>)</a:t>
+            </a:r>
+            <a:endParaRPr lang="en-US" dirty="0" smtClean="0"/>
           </a:p>
           <a:p>
             <a:pPr lvl="1"/>
             <a:r>
-              <a:rPr lang="en-US" dirty="0"/>
-              <a:t>This is the built in grammar</a:t>
+              <a:rPr lang="en-US" dirty="0" err="1" smtClean="0"/>
+              <a:t>SpeechRecognitionScenario</a:t>
+            </a:r>
+            <a:r>
+              <a:rPr lang="en-US" dirty="0" smtClean="0"/>
+              <a:t> options</a:t>
+            </a:r>
+          </a:p>
+          <a:p>
+            <a:pPr lvl="2"/>
+            <a:r>
+              <a:rPr lang="en-US" dirty="0" smtClean="0"/>
+              <a:t>Dictation</a:t>
+            </a:r>
+          </a:p>
+          <a:p>
+            <a:pPr lvl="2"/>
+            <a:r>
+              <a:rPr lang="en-US" dirty="0" err="1" smtClean="0"/>
+              <a:t>FormFilling</a:t>
+            </a:r>
+            <a:endParaRPr lang="en-US" dirty="0" smtClean="0"/>
+          </a:p>
+          <a:p>
+            <a:pPr lvl="2"/>
+            <a:r>
+              <a:rPr lang="en-US" dirty="0" err="1" smtClean="0"/>
+              <a:t>WebSearch</a:t>
+            </a:r>
+            <a:endParaRPr lang="en-US" dirty="0"/>
+          </a:p>
+          <a:p>
+            <a:r>
+              <a:rPr lang="en-US" dirty="0" err="1"/>
+              <a:t>SpeechRecognitionListConstraint</a:t>
+            </a:r>
+            <a:r>
+              <a:rPr lang="en-US" dirty="0"/>
+              <a:t>( new[] { "1", "2" } </a:t>
+            </a:r>
+            <a:r>
+              <a:rPr lang="en-US" dirty="0" smtClean="0"/>
+              <a:t>)</a:t>
             </a:r>
           </a:p>
           <a:p>
             <a:pPr lvl="1"/>
             <a:r>
-              <a:rPr lang="en-US" dirty="0"/>
-              <a:t>Must have network connectivity to use</a:t>
+              <a:rPr lang="en-US" dirty="0" smtClean="0"/>
+              <a:t>Created </a:t>
+            </a:r>
+            <a:r>
+              <a:rPr lang="en-US" dirty="0"/>
+              <a:t>in code from a list of strings</a:t>
             </a:r>
           </a:p>
           <a:p>
             <a:pPr lvl="1"/>
             <a:r>
               <a:rPr lang="en-US" dirty="0"/>
-              <a:t>Used by default when no other grammar specified</a:t>
-            </a:r>
-          </a:p>
-          <a:p>
-            <a:r>
-              <a:rPr lang="en-US" dirty="0"/>
-              <a:t>Programmatic List Grammar</a:t>
+              <a:t>Extremely light weight, fast, and accurate</a:t>
+            </a:r>
+          </a:p>
+          <a:p>
+            <a:r>
+              <a:rPr lang="en-US" dirty="0" err="1"/>
+              <a:t>SpeechRecognitionGrammarFileConstraint</a:t>
+            </a:r>
+            <a:r>
+              <a:rPr lang="en-US" dirty="0"/>
+              <a:t> </a:t>
+            </a:r>
+            <a:r>
+              <a:rPr lang="en-US" dirty="0" smtClean="0"/>
+              <a:t>( [SRGS File] )</a:t>
             </a:r>
           </a:p>
           <a:p>
             <a:pPr lvl="1"/>
             <a:r>
-              <a:rPr lang="en-US" dirty="0"/>
-              <a:t>Created in code from a list of strings</a:t>
-            </a:r>
+              <a:rPr lang="en-US" dirty="0" smtClean="0"/>
+              <a:t>“[Can] capture multiple semantic meanings in a single recognition”</a:t>
+            </a:r>
+            <a:endParaRPr lang="en-US" dirty="0"/>
           </a:p>
           <a:p>
             <a:pPr lvl="1"/>
             <a:r>
-              <a:rPr lang="en-US" dirty="0"/>
-              <a:t>Extremely light weight, fast, and accurate</a:t>
-            </a:r>
-          </a:p>
-          <a:p>
-            <a:r>
-              <a:rPr lang="en-US" dirty="0"/>
-              <a:t>Speech Recognition Grammar Specification (SRGS File)</a:t>
-            </a:r>
-          </a:p>
-          <a:p>
-            <a:pPr lvl="1"/>
-            <a:r>
-              <a:rPr lang="en-US" dirty="0"/>
-              <a:t>Extremely flexible</a:t>
-            </a:r>
-          </a:p>
-          <a:p>
-            <a:pPr lvl="1"/>
-            <a:r>
-              <a:rPr lang="en-US" dirty="0"/>
-              <a:t>Fast and accurate</a:t>
-            </a:r>
+              <a:rPr lang="en-US" dirty="0" smtClean="0"/>
+              <a:t>Industry Standard (meaning portable to other platforms)</a:t>
+            </a:r>
+            <a:endParaRPr lang="en-US" dirty="0"/>
           </a:p>
         </p:txBody>
       </p:sp>
@@ -3921,9 +4291,14 @@
           <a:lstStyle/>
           <a:p>
             <a:r>
-              <a:rPr lang="en-US" dirty="0"/>
-              <a:t>Single Shot Location</a:t>
-            </a:r>
+              <a:rPr lang="en-US" dirty="0" smtClean="0"/>
+              <a:t>Using </a:t>
+            </a:r>
+            <a:r>
+              <a:rPr lang="en-US" dirty="0" err="1" smtClean="0"/>
+              <a:t>SpeechRecognizer</a:t>
+            </a:r>
+            <a:endParaRPr lang="en-US" dirty="0"/>
           </a:p>
         </p:txBody>
       </p:sp>
@@ -3943,58 +4318,329 @@
           <a:lstStyle/>
           <a:p>
             <a:r>
+              <a:rPr lang="en-US" sz="2000" dirty="0" smtClean="0">
+                <a:solidFill>
+                  <a:srgbClr val="0000FF"/>
+                </a:solidFill>
+                <a:highlight>
+                  <a:srgbClr val="FFFFFF"/>
+                </a:highlight>
+                <a:latin typeface="Consolas" panose="020B0609020204030204" pitchFamily="49" charset="0"/>
+              </a:rPr>
+              <a:t>new</a:t>
+            </a:r>
+            <a:r>
+              <a:rPr lang="en-US" sz="2000" dirty="0" smtClean="0">
+                <a:solidFill>
+                  <a:srgbClr val="000000"/>
+                </a:solidFill>
+                <a:highlight>
+                  <a:srgbClr val="FFFFFF"/>
+                </a:highlight>
+                <a:latin typeface="Consolas" panose="020B0609020204030204" pitchFamily="49" charset="0"/>
+              </a:rPr>
+              <a:t> </a:t>
+            </a:r>
+            <a:r>
+              <a:rPr lang="en-US" sz="2000" dirty="0" err="1">
+                <a:solidFill>
+                  <a:srgbClr val="2B91AF"/>
+                </a:solidFill>
+                <a:highlight>
+                  <a:srgbClr val="FFFFFF"/>
+                </a:highlight>
+                <a:latin typeface="Consolas" panose="020B0609020204030204" pitchFamily="49" charset="0"/>
+              </a:rPr>
+              <a:t>SpeechRecognizer</a:t>
+            </a:r>
+            <a:r>
+              <a:rPr lang="en-US" sz="2000" dirty="0">
+                <a:solidFill>
+                  <a:srgbClr val="000000"/>
+                </a:solidFill>
+                <a:highlight>
+                  <a:srgbClr val="FFFFFF"/>
+                </a:highlight>
+                <a:latin typeface="Consolas" panose="020B0609020204030204" pitchFamily="49" charset="0"/>
+              </a:rPr>
+              <a:t>( </a:t>
+            </a:r>
+            <a:r>
+              <a:rPr lang="en-US" sz="2000" dirty="0" err="1">
+                <a:solidFill>
+                  <a:srgbClr val="000000"/>
+                </a:solidFill>
+                <a:highlight>
+                  <a:srgbClr val="FFFFFF"/>
+                </a:highlight>
+                <a:latin typeface="Consolas" panose="020B0609020204030204" pitchFamily="49" charset="0"/>
+              </a:rPr>
+              <a:t>Windows.Globalization.</a:t>
+            </a:r>
+            <a:r>
+              <a:rPr lang="en-US" sz="2000" dirty="0" err="1">
+                <a:solidFill>
+                  <a:srgbClr val="2B91AF"/>
+                </a:solidFill>
+                <a:highlight>
+                  <a:srgbClr val="FFFFFF"/>
+                </a:highlight>
+                <a:latin typeface="Consolas" panose="020B0609020204030204" pitchFamily="49" charset="0"/>
+              </a:rPr>
+              <a:t>Language</a:t>
+            </a:r>
+            <a:r>
+              <a:rPr lang="en-US" sz="2000" dirty="0">
+                <a:solidFill>
+                  <a:srgbClr val="000000"/>
+                </a:solidFill>
+                <a:highlight>
+                  <a:srgbClr val="FFFFFF"/>
+                </a:highlight>
+                <a:latin typeface="Consolas" panose="020B0609020204030204" pitchFamily="49" charset="0"/>
+              </a:rPr>
+              <a:t> )</a:t>
+            </a:r>
+            <a:endParaRPr lang="en-US" dirty="0" smtClean="0"/>
+          </a:p>
+          <a:p>
+            <a:r>
+              <a:rPr lang="en-US" sz="2000" dirty="0" err="1" smtClean="0">
+                <a:solidFill>
+                  <a:srgbClr val="000000"/>
+                </a:solidFill>
+                <a:highlight>
+                  <a:srgbClr val="FFFFFF"/>
+                </a:highlight>
+                <a:latin typeface="Consolas" panose="020B0609020204030204" pitchFamily="49" charset="0"/>
+              </a:rPr>
+              <a:t>speechRecognizer.Constraints.Add</a:t>
+            </a:r>
+            <a:r>
+              <a:rPr lang="en-US" sz="2000" dirty="0" smtClean="0">
+                <a:solidFill>
+                  <a:srgbClr val="000000"/>
+                </a:solidFill>
+                <a:highlight>
+                  <a:srgbClr val="FFFFFF"/>
+                </a:highlight>
+                <a:latin typeface="Consolas" panose="020B0609020204030204" pitchFamily="49" charset="0"/>
+              </a:rPr>
+              <a:t>(</a:t>
+            </a:r>
+            <a:r>
+              <a:rPr lang="en-US" sz="2000" dirty="0" err="1" smtClean="0">
+                <a:solidFill>
+                  <a:srgbClr val="000000"/>
+                </a:solidFill>
+                <a:highlight>
+                  <a:srgbClr val="FFFFFF"/>
+                </a:highlight>
+                <a:latin typeface="Consolas" panose="020B0609020204030204" pitchFamily="49" charset="0"/>
+              </a:rPr>
+              <a:t>commandConstraint</a:t>
+            </a:r>
+            <a:r>
+              <a:rPr lang="en-US" sz="2000" dirty="0">
+                <a:solidFill>
+                  <a:srgbClr val="000000"/>
+                </a:solidFill>
+                <a:highlight>
+                  <a:srgbClr val="FFFFFF"/>
+                </a:highlight>
+                <a:latin typeface="Consolas" panose="020B0609020204030204" pitchFamily="49" charset="0"/>
+              </a:rPr>
+              <a:t>)</a:t>
+            </a:r>
+            <a:endParaRPr lang="en-US" sz="2000" dirty="0" smtClean="0"/>
+          </a:p>
+          <a:p>
+            <a:pPr lvl="1"/>
+            <a:r>
+              <a:rPr lang="en-US" dirty="0" smtClean="0"/>
+              <a:t>Optional to add constraints</a:t>
+            </a:r>
+          </a:p>
+          <a:p>
+            <a:r>
+              <a:rPr lang="en-US" dirty="0" smtClean="0"/>
+              <a:t> </a:t>
+            </a:r>
+            <a:r>
+              <a:rPr lang="en-US" sz="2000" dirty="0" smtClean="0">
+                <a:solidFill>
+                  <a:srgbClr val="0000FF"/>
+                </a:solidFill>
+                <a:highlight>
+                  <a:srgbClr val="FFFFFF"/>
+                </a:highlight>
+                <a:latin typeface="Consolas" panose="020B0609020204030204" pitchFamily="49" charset="0"/>
+              </a:rPr>
+              <a:t>await </a:t>
+            </a:r>
+            <a:r>
+              <a:rPr lang="en-US" sz="2000" dirty="0" err="1" smtClean="0">
+                <a:solidFill>
+                  <a:srgbClr val="000000"/>
+                </a:solidFill>
+                <a:highlight>
+                  <a:srgbClr val="FFFFFF"/>
+                </a:highlight>
+                <a:latin typeface="Consolas" panose="020B0609020204030204" pitchFamily="49" charset="0"/>
+              </a:rPr>
+              <a:t>speechRecognizerCaptainsLogCommand.CompileConstraintsAsync</a:t>
+            </a:r>
+            <a:r>
+              <a:rPr lang="en-US" sz="2000" dirty="0">
+                <a:solidFill>
+                  <a:srgbClr val="000000"/>
+                </a:solidFill>
+                <a:highlight>
+                  <a:srgbClr val="FFFFFF"/>
+                </a:highlight>
+                <a:latin typeface="Consolas" panose="020B0609020204030204" pitchFamily="49" charset="0"/>
+              </a:rPr>
+              <a:t>()</a:t>
+            </a:r>
+            <a:endParaRPr lang="en-US" sz="2000" dirty="0" smtClean="0"/>
+          </a:p>
+          <a:p>
+            <a:pPr lvl="1"/>
+            <a:r>
+              <a:rPr lang="en-US" dirty="0" smtClean="0"/>
+              <a:t>Even if no constraints were added</a:t>
+            </a:r>
+          </a:p>
+          <a:p>
+            <a:r>
+              <a:rPr lang="en-US" dirty="0" smtClean="0"/>
+              <a:t> </a:t>
+            </a:r>
+            <a:r>
+              <a:rPr lang="en-US" sz="2000" dirty="0" err="1">
+                <a:solidFill>
+                  <a:srgbClr val="2B91AF"/>
+                </a:solidFill>
+                <a:highlight>
+                  <a:srgbClr val="FFFFFF"/>
+                </a:highlight>
+                <a:latin typeface="Consolas" panose="020B0609020204030204" pitchFamily="49" charset="0"/>
+              </a:rPr>
+              <a:t>SpeechRecognitionResult</a:t>
+            </a:r>
+            <a:r>
+              <a:rPr lang="en-US" sz="2000" dirty="0">
+                <a:solidFill>
+                  <a:srgbClr val="000000"/>
+                </a:solidFill>
+                <a:highlight>
+                  <a:srgbClr val="FFFFFF"/>
+                </a:highlight>
+                <a:latin typeface="Consolas" panose="020B0609020204030204" pitchFamily="49" charset="0"/>
+              </a:rPr>
+              <a:t> result = </a:t>
+            </a:r>
+            <a:endParaRPr lang="en-US" sz="2000" dirty="0" smtClean="0">
+              <a:solidFill>
+                <a:srgbClr val="000000"/>
+              </a:solidFill>
+              <a:highlight>
+                <a:srgbClr val="FFFFFF"/>
+              </a:highlight>
+              <a:latin typeface="Consolas" panose="020B0609020204030204" pitchFamily="49" charset="0"/>
+            </a:endParaRPr>
+          </a:p>
+          <a:p>
+            <a:pPr marL="0" indent="0">
+              <a:buNone/>
+            </a:pPr>
+            <a:r>
+              <a:rPr lang="en-US" sz="2000" dirty="0">
+                <a:solidFill>
+                  <a:srgbClr val="000000"/>
+                </a:solidFill>
+                <a:highlight>
+                  <a:srgbClr val="FFFFFF"/>
+                </a:highlight>
+                <a:latin typeface="Consolas" panose="020B0609020204030204" pitchFamily="49" charset="0"/>
+              </a:rPr>
+              <a:t>	</a:t>
+            </a:r>
+            <a:r>
+              <a:rPr lang="en-US" sz="2000" dirty="0" smtClean="0">
+                <a:solidFill>
+                  <a:srgbClr val="0000FF"/>
+                </a:solidFill>
+                <a:highlight>
+                  <a:srgbClr val="FFFFFF"/>
+                </a:highlight>
+                <a:latin typeface="Consolas" panose="020B0609020204030204" pitchFamily="49" charset="0"/>
+              </a:rPr>
+              <a:t>await</a:t>
+            </a:r>
+            <a:r>
+              <a:rPr lang="en-US" sz="2000" dirty="0" smtClean="0">
+                <a:solidFill>
+                  <a:srgbClr val="000000"/>
+                </a:solidFill>
+                <a:highlight>
+                  <a:srgbClr val="FFFFFF"/>
+                </a:highlight>
+                <a:latin typeface="Consolas" panose="020B0609020204030204" pitchFamily="49" charset="0"/>
+              </a:rPr>
+              <a:t> </a:t>
+            </a:r>
+            <a:r>
+              <a:rPr lang="en-US" sz="2000" dirty="0" err="1">
+                <a:solidFill>
+                  <a:srgbClr val="000000"/>
+                </a:solidFill>
+                <a:highlight>
+                  <a:srgbClr val="FFFFFF"/>
+                </a:highlight>
+                <a:latin typeface="Consolas" panose="020B0609020204030204" pitchFamily="49" charset="0"/>
+              </a:rPr>
+              <a:t>speechRecognizerCaptainsLogCommand.RecognizeAsync</a:t>
+            </a:r>
+            <a:r>
+              <a:rPr lang="en-US" sz="2000" dirty="0">
+                <a:solidFill>
+                  <a:srgbClr val="000000"/>
+                </a:solidFill>
+                <a:highlight>
+                  <a:srgbClr val="FFFFFF"/>
+                </a:highlight>
+                <a:latin typeface="Consolas" panose="020B0609020204030204" pitchFamily="49" charset="0"/>
+              </a:rPr>
+              <a:t>()</a:t>
+            </a:r>
+            <a:endParaRPr lang="en-US" dirty="0" smtClean="0"/>
+          </a:p>
+          <a:p>
+            <a:pPr lvl="1"/>
+            <a:r>
+              <a:rPr lang="en-US" dirty="0" smtClean="0"/>
+              <a:t>Or </a:t>
+            </a:r>
+            <a:r>
               <a:rPr lang="en-US" dirty="0" err="1"/>
-              <a:t>Geolocator.DesiredAccuracy</a:t>
+              <a:t>RecognizeWithUIAsync</a:t>
+            </a:r>
+            <a:endParaRPr lang="en-US" dirty="0" smtClean="0"/>
+          </a:p>
+          <a:p>
+            <a:r>
+              <a:rPr lang="en-US" dirty="0" err="1" smtClean="0"/>
+              <a:t>asdf</a:t>
             </a:r>
             <a:endParaRPr lang="en-US" dirty="0"/>
-          </a:p>
-          <a:p>
-            <a:r>
-              <a:rPr lang="en-US" dirty="0"/>
-              <a:t>Uses</a:t>
-            </a:r>
-          </a:p>
-          <a:p>
-            <a:pPr lvl="1"/>
-            <a:r>
-              <a:rPr lang="en-US" dirty="0"/>
-              <a:t>Check-In’s</a:t>
-            </a:r>
-          </a:p>
-          <a:p>
-            <a:pPr lvl="1"/>
-            <a:r>
-              <a:rPr lang="en-US" dirty="0"/>
-              <a:t>Placing a geocache</a:t>
-            </a:r>
-          </a:p>
-          <a:p>
-            <a:pPr lvl="1"/>
-            <a:r>
-              <a:rPr lang="en-US" dirty="0"/>
-              <a:t>Where am I?</a:t>
-            </a:r>
-          </a:p>
-          <a:p>
-            <a:pPr lvl="1"/>
-            <a:r>
-              <a:rPr lang="en-US" dirty="0"/>
-              <a:t>Where did I park?</a:t>
-            </a:r>
-          </a:p>
-          <a:p>
-            <a:pPr lvl="1"/>
-            <a:r>
-              <a:rPr lang="en-US" dirty="0"/>
-              <a:t>What country am I in?</a:t>
-            </a:r>
           </a:p>
         </p:txBody>
       </p:sp>
     </p:spTree>
     <p:extLst>
       <p:ext uri="{BB962C8B-B14F-4D97-AF65-F5344CB8AC3E}">
-        <p14:creationId xmlns:p14="http://schemas.microsoft.com/office/powerpoint/2010/main" val="3195247172"/>
+        <p14:creationId xmlns:p14="http://schemas.microsoft.com/office/powerpoint/2010/main" val="229033254"/>
       </p:ext>
     </p:extLst>
   </p:cSld>
@@ -4037,9 +4683,14 @@
           <a:lstStyle/>
           <a:p>
             <a:r>
-              <a:rPr lang="en-US" dirty="0"/>
-              <a:t>Continuous Tracking</a:t>
-            </a:r>
+              <a:rPr lang="en-US" dirty="0" smtClean="0"/>
+              <a:t>Sample </a:t>
+            </a:r>
+            <a:r>
+              <a:rPr lang="en-US" dirty="0" err="1" smtClean="0"/>
+              <a:t>Ssml</a:t>
+            </a:r>
+            <a:endParaRPr lang="en-US" dirty="0"/>
           </a:p>
         </p:txBody>
       </p:sp>
@@ -4058,50 +4709,121 @@
           <a:bodyPr/>
           <a:lstStyle/>
           <a:p>
-            <a:r>
-              <a:rPr lang="en-US" dirty="0"/>
-              <a:t>Report Interval</a:t>
-            </a:r>
-          </a:p>
-          <a:p>
-            <a:r>
-              <a:rPr lang="en-US" dirty="0"/>
-              <a:t>Movement Interval</a:t>
-            </a:r>
-          </a:p>
-          <a:p>
-            <a:r>
-              <a:rPr lang="en-US" dirty="0"/>
-              <a:t>Uses</a:t>
-            </a:r>
-          </a:p>
-          <a:p>
-            <a:pPr lvl="1"/>
-            <a:r>
-              <a:rPr lang="en-US" dirty="0"/>
-              <a:t>Running</a:t>
-            </a:r>
-          </a:p>
-          <a:p>
-            <a:pPr lvl="1"/>
-            <a:r>
-              <a:rPr lang="en-US" dirty="0"/>
-              <a:t>Mt. Biking</a:t>
-            </a:r>
-          </a:p>
-          <a:p>
-            <a:pPr lvl="1"/>
-            <a:r>
-              <a:rPr lang="en-US" dirty="0"/>
-              <a:t>Exercising</a:t>
-            </a:r>
-          </a:p>
-          <a:p>
-            <a:pPr lvl="1"/>
+            <a:pPr marL="0" indent="0">
+              <a:buNone/>
+            </a:pPr>
+            <a:r>
+              <a:rPr lang="en-US" dirty="0"/>
+              <a:t>string </a:t>
+            </a:r>
+            <a:r>
+              <a:rPr lang="en-US" dirty="0" err="1"/>
+              <a:t>Ssml</a:t>
+            </a:r>
+            <a:r>
+              <a:rPr lang="en-US" dirty="0"/>
+              <a:t> =</a:t>
+            </a:r>
+          </a:p>
+          <a:p>
+            <a:pPr marL="0" indent="0">
+              <a:buNone/>
+            </a:pPr>
+            <a:r>
+              <a:rPr lang="en-US" dirty="0"/>
+              <a:t>    @"&lt;speak version='1.0' " +</a:t>
+            </a:r>
+          </a:p>
+          <a:p>
+            <a:pPr marL="0" indent="0">
+              <a:buNone/>
+            </a:pPr>
+            <a:r>
+              <a:rPr lang="en-US" dirty="0"/>
+              <a:t>    "</a:t>
+            </a:r>
+            <a:r>
+              <a:rPr lang="en-US" dirty="0" err="1"/>
+              <a:t>xmlns</a:t>
+            </a:r>
+            <a:r>
+              <a:rPr lang="en-US" dirty="0"/>
+              <a:t>='http://www.w3.org/2001/10/synthesis' </a:t>
+            </a:r>
+            <a:r>
+              <a:rPr lang="en-US" dirty="0" err="1"/>
+              <a:t>xml:lang</a:t>
+            </a:r>
+            <a:r>
+              <a:rPr lang="en-US" dirty="0"/>
+              <a:t>='</a:t>
+            </a:r>
+            <a:r>
+              <a:rPr lang="en-US" dirty="0" err="1"/>
+              <a:t>en</a:t>
+            </a:r>
+            <a:r>
+              <a:rPr lang="en-US" dirty="0"/>
+              <a:t>-US'&gt;" +</a:t>
+            </a:r>
+          </a:p>
+          <a:p>
+            <a:pPr marL="0" indent="0">
+              <a:buNone/>
+            </a:pPr>
+            <a:r>
+              <a:rPr lang="en-US" dirty="0"/>
+              <a:t>    "Hello &lt;prosody contour='(0%,+80Hz) (10%,+80%) </a:t>
+            </a:r>
+            <a:r>
+              <a:rPr lang="en-US" smtClean="0"/>
+              <a:t>		(</a:t>
+            </a:r>
+            <a:r>
+              <a:rPr lang="en-US" dirty="0"/>
+              <a:t>40%,+80Hz)'&gt;World&lt;/prosody&gt; " + </a:t>
+            </a:r>
+          </a:p>
+          <a:p>
+            <a:pPr marL="0" indent="0">
+              <a:buNone/>
+            </a:pPr>
+            <a:r>
+              <a:rPr lang="en-US" dirty="0"/>
+              <a:t>    "&lt;break time='500ms' /&gt;" +</a:t>
+            </a:r>
+          </a:p>
+          <a:p>
+            <a:pPr marL="0" indent="0">
+              <a:buNone/>
+            </a:pPr>
+            <a:r>
+              <a:rPr lang="en-US" dirty="0"/>
+              <a:t>    "Goodbye &lt;prosody rate='slow' contour='(0%,+20Hz) (10%,+30%) </a:t>
+            </a:r>
             <a:r>
               <a:rPr lang="en-US" dirty="0" smtClean="0"/>
-              <a:t>Navigation</a:t>
-            </a:r>
+              <a:t>		(</a:t>
+            </a:r>
+            <a:r>
+              <a:rPr lang="en-US" dirty="0"/>
+              <a:t>40%,+10Hz)'&gt;World&lt;/prosody&gt;" +</a:t>
+            </a:r>
+          </a:p>
+          <a:p>
+            <a:pPr marL="0" indent="0">
+              <a:buNone/>
+            </a:pPr>
+            <a:r>
+              <a:rPr lang="en-US" dirty="0"/>
+              <a:t>    "&lt;/speak&gt;";</a:t>
+            </a:r>
+            <a:endParaRPr lang="en-US" dirty="0" smtClean="0"/>
+          </a:p>
+          <a:p>
+            <a:endParaRPr lang="en-US" dirty="0" smtClean="0"/>
+          </a:p>
+          <a:p>
             <a:endParaRPr lang="en-US" dirty="0"/>
           </a:p>
         </p:txBody>
@@ -4109,7 +4831,7 @@
     </p:spTree>
     <p:extLst>
       <p:ext uri="{BB962C8B-B14F-4D97-AF65-F5344CB8AC3E}">
-        <p14:creationId xmlns:p14="http://schemas.microsoft.com/office/powerpoint/2010/main" val="2047251107"/>
+        <p14:creationId xmlns:p14="http://schemas.microsoft.com/office/powerpoint/2010/main" val="533380120"/>
       </p:ext>
     </p:extLst>
   </p:cSld>

</xml_diff>

<commit_message>
-Added That Conference slides into the deck
</commit_message>
<xml_diff>
--- a/Hey Cortana, Where Am I.pptx
+++ b/Hey Cortana, Where Am I.pptx
@@ -5,21 +5,23 @@
     <p:sldMasterId id="2147483685" r:id="rId1"/>
   </p:sldMasterIdLst>
   <p:sldIdLst>
-    <p:sldId id="256" r:id="rId2"/>
-    <p:sldId id="257" r:id="rId3"/>
-    <p:sldId id="270" r:id="rId4"/>
-    <p:sldId id="263" r:id="rId5"/>
-    <p:sldId id="264" r:id="rId6"/>
-    <p:sldId id="265" r:id="rId7"/>
-    <p:sldId id="269" r:id="rId8"/>
-    <p:sldId id="258" r:id="rId9"/>
-    <p:sldId id="259" r:id="rId10"/>
-    <p:sldId id="260" r:id="rId11"/>
-    <p:sldId id="261" r:id="rId12"/>
-    <p:sldId id="267" r:id="rId13"/>
-    <p:sldId id="262" r:id="rId14"/>
-    <p:sldId id="268" r:id="rId15"/>
-    <p:sldId id="266" r:id="rId16"/>
+    <p:sldId id="271" r:id="rId2"/>
+    <p:sldId id="272" r:id="rId3"/>
+    <p:sldId id="256" r:id="rId4"/>
+    <p:sldId id="257" r:id="rId5"/>
+    <p:sldId id="270" r:id="rId6"/>
+    <p:sldId id="263" r:id="rId7"/>
+    <p:sldId id="264" r:id="rId8"/>
+    <p:sldId id="265" r:id="rId9"/>
+    <p:sldId id="269" r:id="rId10"/>
+    <p:sldId id="258" r:id="rId11"/>
+    <p:sldId id="259" r:id="rId12"/>
+    <p:sldId id="260" r:id="rId13"/>
+    <p:sldId id="261" r:id="rId14"/>
+    <p:sldId id="267" r:id="rId15"/>
+    <p:sldId id="262" r:id="rId16"/>
+    <p:sldId id="268" r:id="rId17"/>
+    <p:sldId id="266" r:id="rId18"/>
   </p:sldIdLst>
   <p:sldSz cx="12192000" cy="6858000"/>
   <p:notesSz cx="6858000" cy="9144000"/>
@@ -2439,76 +2441,70 @@
           <a:chExt cx="0" cy="0"/>
         </a:xfrm>
       </p:grpSpPr>
-      <p:sp>
-        <p:nvSpPr>
-          <p:cNvPr id="2" name="Title 1"/>
-          <p:cNvSpPr>
-            <a:spLocks noGrp="1"/>
-          </p:cNvSpPr>
-          <p:nvPr>
-            <p:ph type="ctrTitle"/>
-          </p:nvPr>
-        </p:nvSpPr>
-        <p:spPr/>
-        <p:txBody>
-          <a:bodyPr/>
-          <a:lstStyle/>
-          <a:p>
-            <a:r>
-              <a:rPr lang="en-US" dirty="0" smtClean="0"/>
-              <a:t>Hey Cortana, Where Am I?</a:t>
-            </a:r>
-            <a:endParaRPr lang="en-US" dirty="0"/>
-          </a:p>
-        </p:txBody>
-      </p:sp>
-      <p:sp>
-        <p:nvSpPr>
-          <p:cNvPr id="3" name="Subtitle 2"/>
-          <p:cNvSpPr>
-            <a:spLocks noGrp="1"/>
-          </p:cNvSpPr>
-          <p:nvPr>
-            <p:ph type="subTitle" idx="1"/>
-          </p:nvPr>
-        </p:nvSpPr>
-        <p:spPr/>
-        <p:txBody>
-          <a:bodyPr/>
-          <a:lstStyle/>
-          <a:p>
-            <a:r>
-              <a:rPr lang="en-US" dirty="0" smtClean="0"/>
-              <a:t>Danny Warren</a:t>
-            </a:r>
-          </a:p>
-          <a:p>
-            <a:r>
-              <a:rPr lang="en-US" dirty="0" smtClean="0"/>
-              <a:t>@</a:t>
-            </a:r>
-            <a:r>
-              <a:rPr lang="en-US" dirty="0" err="1" smtClean="0"/>
-              <a:t>dannydwarren</a:t>
-            </a:r>
-            <a:endParaRPr lang="en-US" dirty="0" smtClean="0"/>
-          </a:p>
-          <a:p>
-            <a:r>
-              <a:rPr lang="en-US" smtClean="0"/>
-              <a:t>dannydwarren@gmail.com</a:t>
-            </a:r>
-            <a:endParaRPr lang="en-US" dirty="0" smtClean="0"/>
-          </a:p>
-          <a:p>
-            <a:endParaRPr lang="en-US" dirty="0"/>
-          </a:p>
-        </p:txBody>
-      </p:sp>
+      <p:pic>
+        <p:nvPicPr>
+          <p:cNvPr id="4" name="Picture 3"/>
+          <p:cNvPicPr>
+            <a:picLocks noChangeAspect="1"/>
+          </p:cNvPicPr>
+          <p:nvPr/>
+        </p:nvPicPr>
+        <p:blipFill>
+          <a:blip r:embed="rId2">
+            <a:extLst>
+              <a:ext uri="{28A0092B-C50C-407E-A947-70E740481C1C}">
+                <a14:useLocalDpi xmlns:a14="http://schemas.microsoft.com/office/drawing/2010/main" val="0"/>
+              </a:ext>
+            </a:extLst>
+          </a:blip>
+          <a:stretch>
+            <a:fillRect/>
+          </a:stretch>
+        </p:blipFill>
+        <p:spPr>
+          <a:xfrm>
+            <a:off x="0" y="0"/>
+            <a:ext cx="12192000" cy="6858000"/>
+          </a:xfrm>
+          <a:prstGeom prst="rect">
+            <a:avLst/>
+          </a:prstGeom>
+        </p:spPr>
+      </p:pic>
+      <p:pic>
+        <p:nvPicPr>
+          <p:cNvPr id="5" name="Picture 4"/>
+          <p:cNvPicPr>
+            <a:picLocks noChangeAspect="1"/>
+          </p:cNvPicPr>
+          <p:nvPr/>
+        </p:nvPicPr>
+        <p:blipFill>
+          <a:blip r:embed="rId3">
+            <a:extLst>
+              <a:ext uri="{28A0092B-C50C-407E-A947-70E740481C1C}">
+                <a14:useLocalDpi xmlns:a14="http://schemas.microsoft.com/office/drawing/2010/main" val="0"/>
+              </a:ext>
+            </a:extLst>
+          </a:blip>
+          <a:stretch>
+            <a:fillRect/>
+          </a:stretch>
+        </p:blipFill>
+        <p:spPr>
+          <a:xfrm>
+            <a:off x="1371600" y="0"/>
+            <a:ext cx="9442032" cy="6858000"/>
+          </a:xfrm>
+          <a:prstGeom prst="rect">
+            <a:avLst/>
+          </a:prstGeom>
+        </p:spPr>
+      </p:pic>
     </p:spTree>
     <p:extLst>
       <p:ext uri="{BB962C8B-B14F-4D97-AF65-F5344CB8AC3E}">
-        <p14:creationId xmlns:p14="http://schemas.microsoft.com/office/powerpoint/2010/main" val="3942048576"/>
+        <p14:creationId xmlns:p14="http://schemas.microsoft.com/office/powerpoint/2010/main" val="404177705"/>
       </p:ext>
     </p:extLst>
   </p:cSld>
@@ -2551,6 +2547,255 @@
           <a:lstStyle/>
           <a:p>
             <a:r>
+              <a:rPr lang="en-US" dirty="0" smtClean="0"/>
+              <a:t>UWP Cortana (Speech) API</a:t>
+            </a:r>
+            <a:endParaRPr lang="en-US" dirty="0"/>
+          </a:p>
+        </p:txBody>
+      </p:sp>
+      <p:sp>
+        <p:nvSpPr>
+          <p:cNvPr id="3" name="Content Placeholder 2"/>
+          <p:cNvSpPr>
+            <a:spLocks noGrp="1"/>
+          </p:cNvSpPr>
+          <p:nvPr>
+            <p:ph idx="1"/>
+          </p:nvPr>
+        </p:nvSpPr>
+        <p:spPr/>
+        <p:txBody>
+          <a:bodyPr/>
+          <a:lstStyle/>
+          <a:p>
+            <a:r>
+              <a:rPr lang="en-US" dirty="0"/>
+              <a:t>Voice Commands</a:t>
+            </a:r>
+          </a:p>
+          <a:p>
+            <a:pPr lvl="1"/>
+            <a:r>
+              <a:rPr lang="en-US" dirty="0"/>
+              <a:t>VCD.xml file</a:t>
+            </a:r>
+          </a:p>
+          <a:p>
+            <a:pPr lvl="1"/>
+            <a:r>
+              <a:rPr lang="en-US" dirty="0"/>
+              <a:t>Used to </a:t>
+            </a:r>
+            <a:r>
+              <a:rPr lang="en-US" dirty="0" smtClean="0"/>
+              <a:t>launch Apps (Deep Link)</a:t>
+            </a:r>
+          </a:p>
+          <a:p>
+            <a:pPr lvl="1"/>
+            <a:r>
+              <a:rPr lang="en-US" dirty="0" smtClean="0"/>
+              <a:t>Used to display information provided by </a:t>
+            </a:r>
+            <a:r>
+              <a:rPr lang="en-US" dirty="0" err="1" smtClean="0"/>
+              <a:t>VoiceCommandService</a:t>
+            </a:r>
+            <a:endParaRPr lang="en-US" dirty="0"/>
+          </a:p>
+          <a:p>
+            <a:r>
+              <a:rPr lang="en-US" dirty="0"/>
+              <a:t>Speech Recognition</a:t>
+            </a:r>
+          </a:p>
+          <a:p>
+            <a:r>
+              <a:rPr lang="en-US" dirty="0" smtClean="0"/>
+              <a:t>Text-To-Speech </a:t>
+            </a:r>
+            <a:r>
+              <a:rPr lang="en-US" dirty="0"/>
+              <a:t>(TTS</a:t>
+            </a:r>
+            <a:r>
+              <a:rPr lang="en-US" dirty="0" smtClean="0"/>
+              <a:t>)</a:t>
+            </a:r>
+            <a:endParaRPr lang="en-US" dirty="0"/>
+          </a:p>
+        </p:txBody>
+      </p:sp>
+    </p:spTree>
+    <p:extLst>
+      <p:ext uri="{BB962C8B-B14F-4D97-AF65-F5344CB8AC3E}">
+        <p14:creationId xmlns:p14="http://schemas.microsoft.com/office/powerpoint/2010/main" val="3601383397"/>
+      </p:ext>
+    </p:extLst>
+  </p:cSld>
+  <p:clrMapOvr>
+    <a:masterClrMapping/>
+  </p:clrMapOvr>
+</p:sld>
+</file>
+
+<file path=ppt/slides/slide11.xml><?xml version="1.0" encoding="utf-8"?>
+<p:sld xmlns:a="http://schemas.openxmlformats.org/drawingml/2006/main" xmlns:r="http://schemas.openxmlformats.org/officeDocument/2006/relationships" xmlns:p="http://schemas.openxmlformats.org/presentationml/2006/main">
+  <p:cSld>
+    <p:spTree>
+      <p:nvGrpSpPr>
+        <p:cNvPr id="1" name=""/>
+        <p:cNvGrpSpPr/>
+        <p:nvPr/>
+      </p:nvGrpSpPr>
+      <p:grpSpPr>
+        <a:xfrm>
+          <a:off x="0" y="0"/>
+          <a:ext cx="0" cy="0"/>
+          <a:chOff x="0" y="0"/>
+          <a:chExt cx="0" cy="0"/>
+        </a:xfrm>
+      </p:grpSpPr>
+      <p:sp>
+        <p:nvSpPr>
+          <p:cNvPr id="2" name="Title 1"/>
+          <p:cNvSpPr>
+            <a:spLocks noGrp="1"/>
+          </p:cNvSpPr>
+          <p:nvPr>
+            <p:ph type="title"/>
+          </p:nvPr>
+        </p:nvSpPr>
+        <p:spPr/>
+        <p:txBody>
+          <a:bodyPr/>
+          <a:lstStyle/>
+          <a:p>
+            <a:r>
+              <a:rPr lang="en-US" dirty="0" smtClean="0"/>
+              <a:t>Voice Commands</a:t>
+            </a:r>
+            <a:endParaRPr lang="en-US" dirty="0"/>
+          </a:p>
+        </p:txBody>
+      </p:sp>
+      <p:sp>
+        <p:nvSpPr>
+          <p:cNvPr id="3" name="Content Placeholder 2"/>
+          <p:cNvSpPr>
+            <a:spLocks noGrp="1"/>
+          </p:cNvSpPr>
+          <p:nvPr>
+            <p:ph idx="1"/>
+          </p:nvPr>
+        </p:nvSpPr>
+        <p:spPr/>
+        <p:txBody>
+          <a:bodyPr/>
+          <a:lstStyle/>
+          <a:p>
+            <a:r>
+              <a:rPr lang="en-US" dirty="0"/>
+              <a:t>Create VCD.xml File</a:t>
+            </a:r>
+          </a:p>
+          <a:p>
+            <a:r>
+              <a:rPr lang="en-US" dirty="0"/>
+              <a:t>Register VCD File</a:t>
+            </a:r>
+          </a:p>
+          <a:p>
+            <a:r>
+              <a:rPr lang="en-US" dirty="0"/>
+              <a:t>Update Phrase Lists</a:t>
+            </a:r>
+          </a:p>
+          <a:p>
+            <a:r>
+              <a:rPr lang="en-US" dirty="0" smtClean="0"/>
+              <a:t>Declare Dictation Phrase Topics</a:t>
+            </a:r>
+            <a:endParaRPr lang="en-US" dirty="0"/>
+          </a:p>
+          <a:p>
+            <a:r>
+              <a:rPr lang="en-US" dirty="0"/>
+              <a:t>Declare Capabilities in </a:t>
+            </a:r>
+            <a:r>
+              <a:rPr lang="en-US" smtClean="0"/>
+              <a:t>Package.appxmanifest</a:t>
+            </a:r>
+            <a:endParaRPr lang="en-US" dirty="0"/>
+          </a:p>
+          <a:p>
+            <a:pPr lvl="1"/>
+            <a:r>
+              <a:rPr lang="en-US" dirty="0"/>
+              <a:t>Microphone</a:t>
+            </a:r>
+          </a:p>
+          <a:p>
+            <a:pPr lvl="1"/>
+            <a:r>
+              <a:rPr lang="en-US" dirty="0" smtClean="0"/>
+              <a:t>Internet</a:t>
+            </a:r>
+            <a:endParaRPr lang="en-US" dirty="0"/>
+          </a:p>
+          <a:p>
+            <a:endParaRPr lang="en-US" dirty="0"/>
+          </a:p>
+        </p:txBody>
+      </p:sp>
+    </p:spTree>
+    <p:extLst>
+      <p:ext uri="{BB962C8B-B14F-4D97-AF65-F5344CB8AC3E}">
+        <p14:creationId xmlns:p14="http://schemas.microsoft.com/office/powerpoint/2010/main" val="989318782"/>
+      </p:ext>
+    </p:extLst>
+  </p:cSld>
+  <p:clrMapOvr>
+    <a:masterClrMapping/>
+  </p:clrMapOvr>
+</p:sld>
+</file>
+
+<file path=ppt/slides/slide12.xml><?xml version="1.0" encoding="utf-8"?>
+<p:sld xmlns:a="http://schemas.openxmlformats.org/drawingml/2006/main" xmlns:r="http://schemas.openxmlformats.org/officeDocument/2006/relationships" xmlns:p="http://schemas.openxmlformats.org/presentationml/2006/main">
+  <p:cSld>
+    <p:spTree>
+      <p:nvGrpSpPr>
+        <p:cNvPr id="1" name=""/>
+        <p:cNvGrpSpPr/>
+        <p:nvPr/>
+      </p:nvGrpSpPr>
+      <p:grpSpPr>
+        <a:xfrm>
+          <a:off x="0" y="0"/>
+          <a:ext cx="0" cy="0"/>
+          <a:chOff x="0" y="0"/>
+          <a:chExt cx="0" cy="0"/>
+        </a:xfrm>
+      </p:grpSpPr>
+      <p:sp>
+        <p:nvSpPr>
+          <p:cNvPr id="2" name="Title 1"/>
+          <p:cNvSpPr>
+            <a:spLocks noGrp="1"/>
+          </p:cNvSpPr>
+          <p:nvPr>
+            <p:ph type="title"/>
+          </p:nvPr>
+        </p:nvSpPr>
+        <p:spPr/>
+        <p:txBody>
+          <a:bodyPr/>
+          <a:lstStyle/>
+          <a:p>
+            <a:r>
               <a:rPr lang="en-US" dirty="0"/>
               <a:t>Text-To-Speech (TTS)</a:t>
             </a:r>
@@ -2652,7 +2897,7 @@
 </p:sld>
 </file>
 
-<file path=ppt/slides/slide11.xml><?xml version="1.0" encoding="utf-8"?>
+<file path=ppt/slides/slide13.xml><?xml version="1.0" encoding="utf-8"?>
 <p:sld xmlns:a="http://schemas.openxmlformats.org/drawingml/2006/main" xmlns:r="http://schemas.openxmlformats.org/officeDocument/2006/relationships" xmlns:p="http://schemas.openxmlformats.org/presentationml/2006/main">
   <p:cSld>
     <p:spTree>
@@ -2897,897 +3142,6 @@
 </p:sld>
 </file>
 
-<file path=ppt/slides/slide12.xml><?xml version="1.0" encoding="utf-8"?>
-<p:sld xmlns:a="http://schemas.openxmlformats.org/drawingml/2006/main" xmlns:r="http://schemas.openxmlformats.org/officeDocument/2006/relationships" xmlns:p="http://schemas.openxmlformats.org/presentationml/2006/main">
-  <p:cSld>
-    <p:spTree>
-      <p:nvGrpSpPr>
-        <p:cNvPr id="1" name=""/>
-        <p:cNvGrpSpPr/>
-        <p:nvPr/>
-      </p:nvGrpSpPr>
-      <p:grpSpPr>
-        <a:xfrm>
-          <a:off x="0" y="0"/>
-          <a:ext cx="0" cy="0"/>
-          <a:chOff x="0" y="0"/>
-          <a:chExt cx="0" cy="0"/>
-        </a:xfrm>
-      </p:grpSpPr>
-      <p:sp>
-        <p:nvSpPr>
-          <p:cNvPr id="2" name="Title 1"/>
-          <p:cNvSpPr>
-            <a:spLocks noGrp="1"/>
-          </p:cNvSpPr>
-          <p:nvPr>
-            <p:ph type="title"/>
-          </p:nvPr>
-        </p:nvSpPr>
-        <p:spPr/>
-        <p:txBody>
-          <a:bodyPr/>
-          <a:lstStyle/>
-          <a:p>
-            <a:r>
-              <a:rPr lang="en-US" dirty="0" smtClean="0"/>
-              <a:t>Using </a:t>
-            </a:r>
-            <a:r>
-              <a:rPr lang="en-US" dirty="0" err="1" smtClean="0"/>
-              <a:t>SpeechRecognizer</a:t>
-            </a:r>
-            <a:endParaRPr lang="en-US" dirty="0"/>
-          </a:p>
-        </p:txBody>
-      </p:sp>
-      <p:sp>
-        <p:nvSpPr>
-          <p:cNvPr id="3" name="Content Placeholder 2"/>
-          <p:cNvSpPr>
-            <a:spLocks noGrp="1"/>
-          </p:cNvSpPr>
-          <p:nvPr>
-            <p:ph idx="1"/>
-          </p:nvPr>
-        </p:nvSpPr>
-        <p:spPr/>
-        <p:txBody>
-          <a:bodyPr>
-            <a:normAutofit lnSpcReduction="10000"/>
-          </a:bodyPr>
-          <a:lstStyle/>
-          <a:p>
-            <a:pPr marL="0" indent="0">
-              <a:buNone/>
-            </a:pPr>
-            <a:r>
-              <a:rPr lang="en-US" sz="2000" dirty="0" err="1" smtClean="0">
-                <a:solidFill>
-                  <a:srgbClr val="0000FF"/>
-                </a:solidFill>
-                <a:highlight>
-                  <a:srgbClr val="FFFFFF"/>
-                </a:highlight>
-                <a:latin typeface="Consolas" panose="020B0609020204030204" pitchFamily="49" charset="0"/>
-              </a:rPr>
-              <a:t>var</a:t>
-            </a:r>
-            <a:r>
-              <a:rPr lang="en-US" sz="2000" dirty="0" smtClean="0">
-                <a:solidFill>
-                  <a:srgbClr val="0000FF"/>
-                </a:solidFill>
-                <a:highlight>
-                  <a:srgbClr val="FFFFFF"/>
-                </a:highlight>
-                <a:latin typeface="Consolas" panose="020B0609020204030204" pitchFamily="49" charset="0"/>
-              </a:rPr>
-              <a:t> </a:t>
-            </a:r>
-            <a:r>
-              <a:rPr lang="en-US" sz="2000" dirty="0" err="1" smtClean="0">
-                <a:solidFill>
-                  <a:srgbClr val="000000"/>
-                </a:solidFill>
-                <a:highlight>
-                  <a:srgbClr val="FFFFFF"/>
-                </a:highlight>
-                <a:latin typeface="Consolas" panose="020B0609020204030204" pitchFamily="49" charset="0"/>
-              </a:rPr>
-              <a:t>speechRecognizer</a:t>
-            </a:r>
-            <a:r>
-              <a:rPr lang="en-US" sz="2000" dirty="0" smtClean="0">
-                <a:solidFill>
-                  <a:srgbClr val="000000"/>
-                </a:solidFill>
-                <a:highlight>
-                  <a:srgbClr val="FFFFFF"/>
-                </a:highlight>
-                <a:latin typeface="Consolas" panose="020B0609020204030204" pitchFamily="49" charset="0"/>
-              </a:rPr>
-              <a:t> = </a:t>
-            </a:r>
-            <a:r>
-              <a:rPr lang="en-US" sz="2000" dirty="0" smtClean="0">
-                <a:solidFill>
-                  <a:srgbClr val="0000FF"/>
-                </a:solidFill>
-                <a:highlight>
-                  <a:srgbClr val="FFFFFF"/>
-                </a:highlight>
-                <a:latin typeface="Consolas" panose="020B0609020204030204" pitchFamily="49" charset="0"/>
-              </a:rPr>
-              <a:t>new</a:t>
-            </a:r>
-            <a:r>
-              <a:rPr lang="en-US" sz="2000" dirty="0" smtClean="0">
-                <a:solidFill>
-                  <a:srgbClr val="000000"/>
-                </a:solidFill>
-                <a:highlight>
-                  <a:srgbClr val="FFFFFF"/>
-                </a:highlight>
-                <a:latin typeface="Consolas" panose="020B0609020204030204" pitchFamily="49" charset="0"/>
-              </a:rPr>
-              <a:t> </a:t>
-            </a:r>
-            <a:r>
-              <a:rPr lang="en-US" sz="2000" dirty="0" err="1">
-                <a:solidFill>
-                  <a:srgbClr val="2B91AF"/>
-                </a:solidFill>
-                <a:highlight>
-                  <a:srgbClr val="FFFFFF"/>
-                </a:highlight>
-                <a:latin typeface="Consolas" panose="020B0609020204030204" pitchFamily="49" charset="0"/>
-              </a:rPr>
-              <a:t>SpeechRecognizer</a:t>
-            </a:r>
-            <a:r>
-              <a:rPr lang="en-US" sz="2000" dirty="0">
-                <a:solidFill>
-                  <a:srgbClr val="000000"/>
-                </a:solidFill>
-                <a:highlight>
-                  <a:srgbClr val="FFFFFF"/>
-                </a:highlight>
-                <a:latin typeface="Consolas" panose="020B0609020204030204" pitchFamily="49" charset="0"/>
-              </a:rPr>
-              <a:t>( </a:t>
-            </a:r>
-            <a:r>
-              <a:rPr lang="en-US" sz="2000" dirty="0" err="1">
-                <a:solidFill>
-                  <a:srgbClr val="000000"/>
-                </a:solidFill>
-                <a:highlight>
-                  <a:srgbClr val="FFFFFF"/>
-                </a:highlight>
-                <a:latin typeface="Consolas" panose="020B0609020204030204" pitchFamily="49" charset="0"/>
-              </a:rPr>
-              <a:t>Windows.Globalization.</a:t>
-            </a:r>
-            <a:r>
-              <a:rPr lang="en-US" sz="2000" dirty="0" err="1">
-                <a:solidFill>
-                  <a:srgbClr val="2B91AF"/>
-                </a:solidFill>
-                <a:highlight>
-                  <a:srgbClr val="FFFFFF"/>
-                </a:highlight>
-                <a:latin typeface="Consolas" panose="020B0609020204030204" pitchFamily="49" charset="0"/>
-              </a:rPr>
-              <a:t>Language</a:t>
-            </a:r>
-            <a:r>
-              <a:rPr lang="en-US" sz="2000" dirty="0">
-                <a:solidFill>
-                  <a:srgbClr val="000000"/>
-                </a:solidFill>
-                <a:highlight>
-                  <a:srgbClr val="FFFFFF"/>
-                </a:highlight>
-                <a:latin typeface="Consolas" panose="020B0609020204030204" pitchFamily="49" charset="0"/>
-              </a:rPr>
-              <a:t> )</a:t>
-            </a:r>
-            <a:endParaRPr lang="en-US" dirty="0" smtClean="0"/>
-          </a:p>
-          <a:p>
-            <a:pPr marL="0" indent="0">
-              <a:buNone/>
-            </a:pPr>
-            <a:r>
-              <a:rPr lang="en-US" sz="2000" dirty="0" err="1" smtClean="0">
-                <a:solidFill>
-                  <a:srgbClr val="000000"/>
-                </a:solidFill>
-                <a:highlight>
-                  <a:srgbClr val="FFFFFF"/>
-                </a:highlight>
-                <a:latin typeface="Consolas" panose="020B0609020204030204" pitchFamily="49" charset="0"/>
-              </a:rPr>
-              <a:t>speechRecognizer.Constraints.Add</a:t>
-            </a:r>
-            <a:r>
-              <a:rPr lang="en-US" sz="2000" dirty="0" smtClean="0">
-                <a:solidFill>
-                  <a:srgbClr val="000000"/>
-                </a:solidFill>
-                <a:highlight>
-                  <a:srgbClr val="FFFFFF"/>
-                </a:highlight>
-                <a:latin typeface="Consolas" panose="020B0609020204030204" pitchFamily="49" charset="0"/>
-              </a:rPr>
-              <a:t>(</a:t>
-            </a:r>
-            <a:r>
-              <a:rPr lang="en-US" sz="2000" dirty="0" err="1" smtClean="0">
-                <a:solidFill>
-                  <a:srgbClr val="000000"/>
-                </a:solidFill>
-                <a:highlight>
-                  <a:srgbClr val="FFFFFF"/>
-                </a:highlight>
-                <a:latin typeface="Consolas" panose="020B0609020204030204" pitchFamily="49" charset="0"/>
-              </a:rPr>
-              <a:t>commandConstraint</a:t>
-            </a:r>
-            <a:r>
-              <a:rPr lang="en-US" sz="2000" dirty="0">
-                <a:solidFill>
-                  <a:srgbClr val="000000"/>
-                </a:solidFill>
-                <a:highlight>
-                  <a:srgbClr val="FFFFFF"/>
-                </a:highlight>
-                <a:latin typeface="Consolas" panose="020B0609020204030204" pitchFamily="49" charset="0"/>
-              </a:rPr>
-              <a:t>)</a:t>
-            </a:r>
-            <a:endParaRPr lang="en-US" sz="2000" dirty="0" smtClean="0"/>
-          </a:p>
-          <a:p>
-            <a:pPr lvl="1"/>
-            <a:r>
-              <a:rPr lang="en-US" dirty="0" smtClean="0"/>
-              <a:t>Optional to add constraints</a:t>
-            </a:r>
-          </a:p>
-          <a:p>
-            <a:pPr marL="0" indent="0">
-              <a:buNone/>
-            </a:pPr>
-            <a:r>
-              <a:rPr lang="en-US" sz="2000" dirty="0" smtClean="0">
-                <a:solidFill>
-                  <a:srgbClr val="0000FF"/>
-                </a:solidFill>
-                <a:highlight>
-                  <a:srgbClr val="FFFFFF"/>
-                </a:highlight>
-                <a:latin typeface="Consolas" panose="020B0609020204030204" pitchFamily="49" charset="0"/>
-              </a:rPr>
-              <a:t>await </a:t>
-            </a:r>
-            <a:r>
-              <a:rPr lang="en-US" sz="2000" dirty="0" err="1" smtClean="0">
-                <a:solidFill>
-                  <a:srgbClr val="000000"/>
-                </a:solidFill>
-                <a:highlight>
-                  <a:srgbClr val="FFFFFF"/>
-                </a:highlight>
-                <a:latin typeface="Consolas" panose="020B0609020204030204" pitchFamily="49" charset="0"/>
-              </a:rPr>
-              <a:t>speechRecognizerCaptainsLogCommand.CompileConstraintsAsync</a:t>
-            </a:r>
-            <a:r>
-              <a:rPr lang="en-US" sz="2000" dirty="0">
-                <a:solidFill>
-                  <a:srgbClr val="000000"/>
-                </a:solidFill>
-                <a:highlight>
-                  <a:srgbClr val="FFFFFF"/>
-                </a:highlight>
-                <a:latin typeface="Consolas" panose="020B0609020204030204" pitchFamily="49" charset="0"/>
-              </a:rPr>
-              <a:t>()</a:t>
-            </a:r>
-            <a:endParaRPr lang="en-US" sz="2000" dirty="0" smtClean="0"/>
-          </a:p>
-          <a:p>
-            <a:pPr lvl="1"/>
-            <a:r>
-              <a:rPr lang="en-US" dirty="0" smtClean="0"/>
-              <a:t>Even if no constraints were added</a:t>
-            </a:r>
-          </a:p>
-          <a:p>
-            <a:pPr marL="0" indent="0">
-              <a:buNone/>
-            </a:pPr>
-            <a:r>
-              <a:rPr lang="en-US" sz="2000" dirty="0" err="1" smtClean="0">
-                <a:solidFill>
-                  <a:srgbClr val="2B91AF"/>
-                </a:solidFill>
-                <a:highlight>
-                  <a:srgbClr val="FFFFFF"/>
-                </a:highlight>
-                <a:latin typeface="Consolas" panose="020B0609020204030204" pitchFamily="49" charset="0"/>
-              </a:rPr>
-              <a:t>SpeechRecognitionResult</a:t>
-            </a:r>
-            <a:r>
-              <a:rPr lang="en-US" sz="2000" dirty="0" smtClean="0">
-                <a:solidFill>
-                  <a:srgbClr val="000000"/>
-                </a:solidFill>
-                <a:highlight>
-                  <a:srgbClr val="FFFFFF"/>
-                </a:highlight>
-                <a:latin typeface="Consolas" panose="020B0609020204030204" pitchFamily="49" charset="0"/>
-              </a:rPr>
-              <a:t> </a:t>
-            </a:r>
-            <a:r>
-              <a:rPr lang="en-US" sz="2000" dirty="0">
-                <a:solidFill>
-                  <a:srgbClr val="000000"/>
-                </a:solidFill>
-                <a:highlight>
-                  <a:srgbClr val="FFFFFF"/>
-                </a:highlight>
-                <a:latin typeface="Consolas" panose="020B0609020204030204" pitchFamily="49" charset="0"/>
-              </a:rPr>
-              <a:t>result = </a:t>
-            </a:r>
-            <a:endParaRPr lang="en-US" sz="2000" dirty="0" smtClean="0">
-              <a:solidFill>
-                <a:srgbClr val="000000"/>
-              </a:solidFill>
-              <a:highlight>
-                <a:srgbClr val="FFFFFF"/>
-              </a:highlight>
-              <a:latin typeface="Consolas" panose="020B0609020204030204" pitchFamily="49" charset="0"/>
-            </a:endParaRPr>
-          </a:p>
-          <a:p>
-            <a:pPr marL="0" indent="0">
-              <a:buNone/>
-            </a:pPr>
-            <a:r>
-              <a:rPr lang="en-US" sz="2000" dirty="0">
-                <a:solidFill>
-                  <a:srgbClr val="000000"/>
-                </a:solidFill>
-                <a:highlight>
-                  <a:srgbClr val="FFFFFF"/>
-                </a:highlight>
-                <a:latin typeface="Consolas" panose="020B0609020204030204" pitchFamily="49" charset="0"/>
-              </a:rPr>
-              <a:t>	</a:t>
-            </a:r>
-            <a:r>
-              <a:rPr lang="en-US" sz="2000" dirty="0" smtClean="0">
-                <a:solidFill>
-                  <a:srgbClr val="0000FF"/>
-                </a:solidFill>
-                <a:highlight>
-                  <a:srgbClr val="FFFFFF"/>
-                </a:highlight>
-                <a:latin typeface="Consolas" panose="020B0609020204030204" pitchFamily="49" charset="0"/>
-              </a:rPr>
-              <a:t>await</a:t>
-            </a:r>
-            <a:r>
-              <a:rPr lang="en-US" sz="2000" dirty="0" smtClean="0">
-                <a:solidFill>
-                  <a:srgbClr val="000000"/>
-                </a:solidFill>
-                <a:highlight>
-                  <a:srgbClr val="FFFFFF"/>
-                </a:highlight>
-                <a:latin typeface="Consolas" panose="020B0609020204030204" pitchFamily="49" charset="0"/>
-              </a:rPr>
-              <a:t> </a:t>
-            </a:r>
-            <a:r>
-              <a:rPr lang="en-US" sz="2000" dirty="0" err="1">
-                <a:solidFill>
-                  <a:srgbClr val="000000"/>
-                </a:solidFill>
-                <a:highlight>
-                  <a:srgbClr val="FFFFFF"/>
-                </a:highlight>
-                <a:latin typeface="Consolas" panose="020B0609020204030204" pitchFamily="49" charset="0"/>
-              </a:rPr>
-              <a:t>speechRecognizerCaptainsLogCommand.RecognizeAsync</a:t>
-            </a:r>
-            <a:r>
-              <a:rPr lang="en-US" sz="2000" dirty="0">
-                <a:solidFill>
-                  <a:srgbClr val="000000"/>
-                </a:solidFill>
-                <a:highlight>
-                  <a:srgbClr val="FFFFFF"/>
-                </a:highlight>
-                <a:latin typeface="Consolas" panose="020B0609020204030204" pitchFamily="49" charset="0"/>
-              </a:rPr>
-              <a:t>()</a:t>
-            </a:r>
-            <a:endParaRPr lang="en-US" dirty="0" smtClean="0"/>
-          </a:p>
-          <a:p>
-            <a:pPr lvl="1"/>
-            <a:r>
-              <a:rPr lang="en-US" dirty="0" smtClean="0"/>
-              <a:t>Or </a:t>
-            </a:r>
-            <a:r>
-              <a:rPr lang="en-US" dirty="0" err="1" smtClean="0"/>
-              <a:t>RecognizeWithUIAsync</a:t>
-            </a:r>
-            <a:endParaRPr lang="en-US" dirty="0" smtClean="0"/>
-          </a:p>
-          <a:p>
-            <a:pPr marL="0" indent="0">
-              <a:buNone/>
-            </a:pPr>
-            <a:r>
-              <a:rPr lang="en-US" sz="2000" dirty="0" smtClean="0">
-                <a:solidFill>
-                  <a:srgbClr val="0000FF"/>
-                </a:solidFill>
-                <a:highlight>
-                  <a:srgbClr val="FFFFFF"/>
-                </a:highlight>
-                <a:latin typeface="Consolas" panose="020B0609020204030204" pitchFamily="49" charset="0"/>
-              </a:rPr>
-              <a:t>if</a:t>
-            </a:r>
-            <a:r>
-              <a:rPr lang="en-US" sz="2000" dirty="0" smtClean="0">
-                <a:solidFill>
-                  <a:srgbClr val="000000"/>
-                </a:solidFill>
-                <a:highlight>
-                  <a:srgbClr val="FFFFFF"/>
-                </a:highlight>
-                <a:latin typeface="Consolas" panose="020B0609020204030204" pitchFamily="49" charset="0"/>
-              </a:rPr>
-              <a:t> ( </a:t>
-            </a:r>
-            <a:r>
-              <a:rPr lang="en-US" sz="2000" dirty="0" err="1" smtClean="0">
-                <a:solidFill>
-                  <a:srgbClr val="000000"/>
-                </a:solidFill>
-                <a:highlight>
-                  <a:srgbClr val="FFFFFF"/>
-                </a:highlight>
-                <a:latin typeface="Consolas" panose="020B0609020204030204" pitchFamily="49" charset="0"/>
-              </a:rPr>
-              <a:t>dictationResult.Status</a:t>
-            </a:r>
-            <a:r>
-              <a:rPr lang="en-US" sz="2000" dirty="0" smtClean="0">
-                <a:solidFill>
-                  <a:srgbClr val="000000"/>
-                </a:solidFill>
-                <a:highlight>
-                  <a:srgbClr val="FFFFFF"/>
-                </a:highlight>
-                <a:latin typeface="Consolas" panose="020B0609020204030204" pitchFamily="49" charset="0"/>
-              </a:rPr>
-              <a:t> == </a:t>
-            </a:r>
-            <a:r>
-              <a:rPr lang="en-US" sz="2000" dirty="0" err="1" smtClean="0">
-                <a:solidFill>
-                  <a:srgbClr val="2B91AF"/>
-                </a:solidFill>
-                <a:highlight>
-                  <a:srgbClr val="FFFFFF"/>
-                </a:highlight>
-                <a:latin typeface="Consolas" panose="020B0609020204030204" pitchFamily="49" charset="0"/>
-              </a:rPr>
-              <a:t>SpeechRecognitionResultStatus</a:t>
-            </a:r>
-            <a:r>
-              <a:rPr lang="en-US" sz="2000" dirty="0" err="1" smtClean="0">
-                <a:solidFill>
-                  <a:srgbClr val="000000"/>
-                </a:solidFill>
-                <a:highlight>
-                  <a:srgbClr val="FFFFFF"/>
-                </a:highlight>
-                <a:latin typeface="Consolas" panose="020B0609020204030204" pitchFamily="49" charset="0"/>
-              </a:rPr>
-              <a:t>.Success</a:t>
-            </a:r>
-            <a:endParaRPr lang="en-US" sz="2000" dirty="0" smtClean="0">
-              <a:solidFill>
-                <a:srgbClr val="000000"/>
-              </a:solidFill>
-              <a:highlight>
-                <a:srgbClr val="FFFFFF"/>
-              </a:highlight>
-              <a:latin typeface="Consolas" panose="020B0609020204030204" pitchFamily="49" charset="0"/>
-            </a:endParaRPr>
-          </a:p>
-          <a:p>
-            <a:pPr marL="0" indent="0">
-              <a:buNone/>
-            </a:pPr>
-            <a:r>
-              <a:rPr lang="en-US" sz="2000" dirty="0" smtClean="0">
-                <a:solidFill>
-                  <a:srgbClr val="000000"/>
-                </a:solidFill>
-                <a:highlight>
-                  <a:srgbClr val="FFFFFF"/>
-                </a:highlight>
-                <a:latin typeface="Consolas" panose="020B0609020204030204" pitchFamily="49" charset="0"/>
-              </a:rPr>
-              <a:t>	&amp;&amp; </a:t>
-            </a:r>
-            <a:r>
-              <a:rPr lang="en-US" sz="2000" dirty="0" err="1">
-                <a:solidFill>
-                  <a:srgbClr val="000000"/>
-                </a:solidFill>
-                <a:highlight>
-                  <a:srgbClr val="FFFFFF"/>
-                </a:highlight>
-                <a:latin typeface="Consolas" panose="020B0609020204030204" pitchFamily="49" charset="0"/>
-              </a:rPr>
-              <a:t>dictationResult.Confidence</a:t>
-            </a:r>
-            <a:r>
-              <a:rPr lang="en-US" sz="2000" dirty="0">
-                <a:solidFill>
-                  <a:srgbClr val="000000"/>
-                </a:solidFill>
-                <a:highlight>
-                  <a:srgbClr val="FFFFFF"/>
-                </a:highlight>
-                <a:latin typeface="Consolas" panose="020B0609020204030204" pitchFamily="49" charset="0"/>
-              </a:rPr>
-              <a:t> == </a:t>
-            </a:r>
-            <a:r>
-              <a:rPr lang="en-US" sz="2000" dirty="0" err="1">
-                <a:solidFill>
-                  <a:srgbClr val="2B91AF"/>
-                </a:solidFill>
-                <a:highlight>
-                  <a:srgbClr val="FFFFFF"/>
-                </a:highlight>
-                <a:latin typeface="Consolas" panose="020B0609020204030204" pitchFamily="49" charset="0"/>
-              </a:rPr>
-              <a:t>SpeechRecognitionConfidence</a:t>
-            </a:r>
-            <a:r>
-              <a:rPr lang="en-US" sz="2000" dirty="0" err="1">
-                <a:solidFill>
-                  <a:srgbClr val="000000"/>
-                </a:solidFill>
-                <a:highlight>
-                  <a:srgbClr val="FFFFFF"/>
-                </a:highlight>
-                <a:latin typeface="Consolas" panose="020B0609020204030204" pitchFamily="49" charset="0"/>
-              </a:rPr>
-              <a:t>.Rejected</a:t>
-            </a:r>
-            <a:endParaRPr lang="en-US" dirty="0" smtClean="0"/>
-          </a:p>
-          <a:p>
-            <a:pPr marL="0" indent="0">
-              <a:buNone/>
-            </a:pPr>
-            <a:r>
-              <a:rPr lang="en-US" sz="1600" dirty="0" smtClean="0">
-                <a:solidFill>
-                  <a:srgbClr val="000000"/>
-                </a:solidFill>
-                <a:highlight>
-                  <a:srgbClr val="FFFFFF"/>
-                </a:highlight>
-                <a:latin typeface="Consolas" panose="020B0609020204030204" pitchFamily="49" charset="0"/>
-              </a:rPr>
-              <a:t>{</a:t>
-            </a:r>
-          </a:p>
-          <a:p>
-            <a:pPr marL="0" indent="0">
-              <a:buNone/>
-            </a:pPr>
-            <a:r>
-              <a:rPr lang="en-US" sz="2000" dirty="0" smtClean="0">
-                <a:solidFill>
-                  <a:srgbClr val="000000"/>
-                </a:solidFill>
-                <a:highlight>
-                  <a:srgbClr val="FFFFFF"/>
-                </a:highlight>
-                <a:latin typeface="Consolas" panose="020B0609020204030204" pitchFamily="49" charset="0"/>
-              </a:rPr>
-              <a:t>	</a:t>
-            </a:r>
-            <a:r>
-              <a:rPr lang="en-US" sz="2000" b="1" dirty="0" err="1" smtClean="0">
-                <a:solidFill>
-                  <a:srgbClr val="000000"/>
-                </a:solidFill>
-                <a:highlight>
-                  <a:srgbClr val="FFFFFF"/>
-                </a:highlight>
-                <a:latin typeface="Consolas" panose="020B0609020204030204" pitchFamily="49" charset="0"/>
-              </a:rPr>
-              <a:t>result.Text</a:t>
-            </a:r>
-            <a:endParaRPr lang="en-US" sz="2000" b="1" dirty="0" smtClean="0">
-              <a:solidFill>
-                <a:srgbClr val="000000"/>
-              </a:solidFill>
-              <a:highlight>
-                <a:srgbClr val="FFFFFF"/>
-              </a:highlight>
-              <a:latin typeface="Consolas" panose="020B0609020204030204" pitchFamily="49" charset="0"/>
-            </a:endParaRPr>
-          </a:p>
-          <a:p>
-            <a:pPr marL="0" indent="0">
-              <a:buNone/>
-            </a:pPr>
-            <a:r>
-              <a:rPr lang="en-US" sz="1600" dirty="0" smtClean="0">
-                <a:solidFill>
-                  <a:srgbClr val="000000"/>
-                </a:solidFill>
-                <a:highlight>
-                  <a:srgbClr val="FFFFFF"/>
-                </a:highlight>
-                <a:latin typeface="Consolas" panose="020B0609020204030204" pitchFamily="49" charset="0"/>
-              </a:rPr>
-              <a:t>}</a:t>
-            </a:r>
-            <a:endParaRPr lang="en-US" sz="1600" dirty="0"/>
-          </a:p>
-        </p:txBody>
-      </p:sp>
-    </p:spTree>
-    <p:extLst>
-      <p:ext uri="{BB962C8B-B14F-4D97-AF65-F5344CB8AC3E}">
-        <p14:creationId xmlns:p14="http://schemas.microsoft.com/office/powerpoint/2010/main" val="229033254"/>
-      </p:ext>
-    </p:extLst>
-  </p:cSld>
-  <p:clrMapOvr>
-    <a:masterClrMapping/>
-  </p:clrMapOvr>
-</p:sld>
-</file>
-
-<file path=ppt/slides/slide13.xml><?xml version="1.0" encoding="utf-8"?>
-<p:sld xmlns:a="http://schemas.openxmlformats.org/drawingml/2006/main" xmlns:r="http://schemas.openxmlformats.org/officeDocument/2006/relationships" xmlns:p="http://schemas.openxmlformats.org/presentationml/2006/main">
-  <p:cSld>
-    <p:spTree>
-      <p:nvGrpSpPr>
-        <p:cNvPr id="1" name=""/>
-        <p:cNvGrpSpPr/>
-        <p:nvPr/>
-      </p:nvGrpSpPr>
-      <p:grpSpPr>
-        <a:xfrm>
-          <a:off x="0" y="0"/>
-          <a:ext cx="0" cy="0"/>
-          <a:chOff x="0" y="0"/>
-          <a:chExt cx="0" cy="0"/>
-        </a:xfrm>
-      </p:grpSpPr>
-      <p:sp>
-        <p:nvSpPr>
-          <p:cNvPr id="2" name="Title 1"/>
-          <p:cNvSpPr>
-            <a:spLocks noGrp="1"/>
-          </p:cNvSpPr>
-          <p:nvPr>
-            <p:ph type="title"/>
-          </p:nvPr>
-        </p:nvSpPr>
-        <p:spPr/>
-        <p:txBody>
-          <a:bodyPr/>
-          <a:lstStyle/>
-          <a:p>
-            <a:r>
-              <a:rPr lang="en-US" dirty="0"/>
-              <a:t>Choosing </a:t>
-            </a:r>
-            <a:r>
-              <a:rPr lang="en-US" dirty="0" smtClean="0"/>
-              <a:t>a </a:t>
-            </a:r>
-            <a:r>
-              <a:rPr lang="en-US" dirty="0" err="1" smtClean="0"/>
-              <a:t>ISpeechRecognitionConstraint</a:t>
-            </a:r>
-            <a:endParaRPr lang="en-US" dirty="0"/>
-          </a:p>
-        </p:txBody>
-      </p:sp>
-      <p:sp>
-        <p:nvSpPr>
-          <p:cNvPr id="3" name="Content Placeholder 2"/>
-          <p:cNvSpPr>
-            <a:spLocks noGrp="1"/>
-          </p:cNvSpPr>
-          <p:nvPr>
-            <p:ph idx="1"/>
-          </p:nvPr>
-        </p:nvSpPr>
-        <p:spPr/>
-        <p:txBody>
-          <a:bodyPr>
-            <a:normAutofit lnSpcReduction="10000"/>
-          </a:bodyPr>
-          <a:lstStyle/>
-          <a:p>
-            <a:r>
-              <a:rPr lang="en-US" dirty="0" err="1" smtClean="0"/>
-              <a:t>SpeechRecognitionTopicConstraint</a:t>
-            </a:r>
-            <a:r>
-              <a:rPr lang="en-US" dirty="0" smtClean="0"/>
-              <a:t>(</a:t>
-            </a:r>
-          </a:p>
-          <a:p>
-            <a:pPr marL="342900" lvl="1" indent="0">
-              <a:buNone/>
-            </a:pPr>
-            <a:r>
-              <a:rPr lang="en-US" dirty="0"/>
-              <a:t>	</a:t>
-            </a:r>
-            <a:r>
-              <a:rPr lang="en-US" sz="2400" dirty="0" err="1" smtClean="0"/>
-              <a:t>SpeechRecognitionScenario.Dictation</a:t>
-            </a:r>
-            <a:r>
-              <a:rPr lang="en-US" dirty="0" smtClean="0"/>
-              <a:t>, “</a:t>
-            </a:r>
-            <a:r>
-              <a:rPr lang="en-US" dirty="0" err="1" smtClean="0"/>
-              <a:t>TopicHint</a:t>
-            </a:r>
-            <a:r>
-              <a:rPr lang="en-US" dirty="0" smtClean="0"/>
-              <a:t>”, “Tag" </a:t>
-            </a:r>
-            <a:r>
-              <a:rPr lang="en-US" dirty="0"/>
-              <a:t>)</a:t>
-            </a:r>
-            <a:endParaRPr lang="en-US" dirty="0" smtClean="0"/>
-          </a:p>
-          <a:p>
-            <a:pPr lvl="1"/>
-            <a:r>
-              <a:rPr lang="en-US" dirty="0" err="1" smtClean="0"/>
-              <a:t>SpeechRecognitionScenario</a:t>
-            </a:r>
-            <a:r>
-              <a:rPr lang="en-US" dirty="0" smtClean="0"/>
-              <a:t> options</a:t>
-            </a:r>
-          </a:p>
-          <a:p>
-            <a:pPr lvl="2"/>
-            <a:r>
-              <a:rPr lang="en-US" dirty="0" smtClean="0"/>
-              <a:t>Dictation</a:t>
-            </a:r>
-          </a:p>
-          <a:p>
-            <a:pPr lvl="2"/>
-            <a:r>
-              <a:rPr lang="en-US" dirty="0" err="1" smtClean="0"/>
-              <a:t>FormFilling</a:t>
-            </a:r>
-            <a:endParaRPr lang="en-US" dirty="0" smtClean="0"/>
-          </a:p>
-          <a:p>
-            <a:pPr lvl="2"/>
-            <a:r>
-              <a:rPr lang="en-US" dirty="0" err="1" smtClean="0"/>
-              <a:t>WebSearch</a:t>
-            </a:r>
-            <a:endParaRPr lang="en-US" dirty="0"/>
-          </a:p>
-          <a:p>
-            <a:r>
-              <a:rPr lang="en-US" dirty="0" err="1"/>
-              <a:t>SpeechRecognitionListConstraint</a:t>
-            </a:r>
-            <a:r>
-              <a:rPr lang="en-US" dirty="0"/>
-              <a:t>( new[] { "1", "2" } </a:t>
-            </a:r>
-            <a:r>
-              <a:rPr lang="en-US" dirty="0" smtClean="0"/>
-              <a:t>)</a:t>
-            </a:r>
-          </a:p>
-          <a:p>
-            <a:pPr lvl="1"/>
-            <a:r>
-              <a:rPr lang="en-US" dirty="0" smtClean="0"/>
-              <a:t>Created </a:t>
-            </a:r>
-            <a:r>
-              <a:rPr lang="en-US" dirty="0"/>
-              <a:t>in code from a list of strings</a:t>
-            </a:r>
-          </a:p>
-          <a:p>
-            <a:pPr lvl="1"/>
-            <a:r>
-              <a:rPr lang="en-US" dirty="0"/>
-              <a:t>Extremely light weight, fast, and accurate</a:t>
-            </a:r>
-          </a:p>
-          <a:p>
-            <a:r>
-              <a:rPr lang="en-US" dirty="0" err="1"/>
-              <a:t>SpeechRecognitionGrammarFileConstraint</a:t>
-            </a:r>
-            <a:r>
-              <a:rPr lang="en-US" dirty="0"/>
-              <a:t> </a:t>
-            </a:r>
-            <a:r>
-              <a:rPr lang="en-US" dirty="0" smtClean="0"/>
-              <a:t>( [SRGS File] )</a:t>
-            </a:r>
-          </a:p>
-          <a:p>
-            <a:pPr lvl="1"/>
-            <a:r>
-              <a:rPr lang="en-US" dirty="0" smtClean="0"/>
-              <a:t>“[Can] capture multiple semantic meanings in a single recognition”</a:t>
-            </a:r>
-            <a:endParaRPr lang="en-US" dirty="0"/>
-          </a:p>
-          <a:p>
-            <a:pPr lvl="1"/>
-            <a:r>
-              <a:rPr lang="en-US" dirty="0" smtClean="0"/>
-              <a:t>Industry Standard (meaning portable to other platforms)</a:t>
-            </a:r>
-            <a:endParaRPr lang="en-US" dirty="0"/>
-          </a:p>
-        </p:txBody>
-      </p:sp>
-    </p:spTree>
-    <p:extLst>
-      <p:ext uri="{BB962C8B-B14F-4D97-AF65-F5344CB8AC3E}">
-        <p14:creationId xmlns:p14="http://schemas.microsoft.com/office/powerpoint/2010/main" val="242263823"/>
-      </p:ext>
-    </p:extLst>
-  </p:cSld>
-  <p:clrMapOvr>
-    <a:masterClrMapping/>
-  </p:clrMapOvr>
-</p:sld>
-</file>
-
 <file path=ppt/slides/slide14.xml><?xml version="1.0" encoding="utf-8"?>
 <p:sld xmlns:a="http://schemas.openxmlformats.org/drawingml/2006/main" xmlns:r="http://schemas.openxmlformats.org/officeDocument/2006/relationships" xmlns:p="http://schemas.openxmlformats.org/presentationml/2006/main">
   <p:cSld>
@@ -3822,6 +3176,897 @@
           <a:p>
             <a:r>
               <a:rPr lang="en-US" dirty="0" smtClean="0"/>
+              <a:t>Using </a:t>
+            </a:r>
+            <a:r>
+              <a:rPr lang="en-US" dirty="0" err="1" smtClean="0"/>
+              <a:t>SpeechRecognizer</a:t>
+            </a:r>
+            <a:endParaRPr lang="en-US" dirty="0"/>
+          </a:p>
+        </p:txBody>
+      </p:sp>
+      <p:sp>
+        <p:nvSpPr>
+          <p:cNvPr id="3" name="Content Placeholder 2"/>
+          <p:cNvSpPr>
+            <a:spLocks noGrp="1"/>
+          </p:cNvSpPr>
+          <p:nvPr>
+            <p:ph idx="1"/>
+          </p:nvPr>
+        </p:nvSpPr>
+        <p:spPr/>
+        <p:txBody>
+          <a:bodyPr>
+            <a:normAutofit lnSpcReduction="10000"/>
+          </a:bodyPr>
+          <a:lstStyle/>
+          <a:p>
+            <a:pPr marL="0" indent="0">
+              <a:buNone/>
+            </a:pPr>
+            <a:r>
+              <a:rPr lang="en-US" sz="2000" dirty="0" err="1" smtClean="0">
+                <a:solidFill>
+                  <a:srgbClr val="0000FF"/>
+                </a:solidFill>
+                <a:highlight>
+                  <a:srgbClr val="FFFFFF"/>
+                </a:highlight>
+                <a:latin typeface="Consolas" panose="020B0609020204030204" pitchFamily="49" charset="0"/>
+              </a:rPr>
+              <a:t>var</a:t>
+            </a:r>
+            <a:r>
+              <a:rPr lang="en-US" sz="2000" dirty="0" smtClean="0">
+                <a:solidFill>
+                  <a:srgbClr val="0000FF"/>
+                </a:solidFill>
+                <a:highlight>
+                  <a:srgbClr val="FFFFFF"/>
+                </a:highlight>
+                <a:latin typeface="Consolas" panose="020B0609020204030204" pitchFamily="49" charset="0"/>
+              </a:rPr>
+              <a:t> </a:t>
+            </a:r>
+            <a:r>
+              <a:rPr lang="en-US" sz="2000" dirty="0" err="1" smtClean="0">
+                <a:solidFill>
+                  <a:srgbClr val="000000"/>
+                </a:solidFill>
+                <a:highlight>
+                  <a:srgbClr val="FFFFFF"/>
+                </a:highlight>
+                <a:latin typeface="Consolas" panose="020B0609020204030204" pitchFamily="49" charset="0"/>
+              </a:rPr>
+              <a:t>speechRecognizer</a:t>
+            </a:r>
+            <a:r>
+              <a:rPr lang="en-US" sz="2000" dirty="0" smtClean="0">
+                <a:solidFill>
+                  <a:srgbClr val="000000"/>
+                </a:solidFill>
+                <a:highlight>
+                  <a:srgbClr val="FFFFFF"/>
+                </a:highlight>
+                <a:latin typeface="Consolas" panose="020B0609020204030204" pitchFamily="49" charset="0"/>
+              </a:rPr>
+              <a:t> = </a:t>
+            </a:r>
+            <a:r>
+              <a:rPr lang="en-US" sz="2000" dirty="0" smtClean="0">
+                <a:solidFill>
+                  <a:srgbClr val="0000FF"/>
+                </a:solidFill>
+                <a:highlight>
+                  <a:srgbClr val="FFFFFF"/>
+                </a:highlight>
+                <a:latin typeface="Consolas" panose="020B0609020204030204" pitchFamily="49" charset="0"/>
+              </a:rPr>
+              <a:t>new</a:t>
+            </a:r>
+            <a:r>
+              <a:rPr lang="en-US" sz="2000" dirty="0" smtClean="0">
+                <a:solidFill>
+                  <a:srgbClr val="000000"/>
+                </a:solidFill>
+                <a:highlight>
+                  <a:srgbClr val="FFFFFF"/>
+                </a:highlight>
+                <a:latin typeface="Consolas" panose="020B0609020204030204" pitchFamily="49" charset="0"/>
+              </a:rPr>
+              <a:t> </a:t>
+            </a:r>
+            <a:r>
+              <a:rPr lang="en-US" sz="2000" dirty="0" err="1">
+                <a:solidFill>
+                  <a:srgbClr val="2B91AF"/>
+                </a:solidFill>
+                <a:highlight>
+                  <a:srgbClr val="FFFFFF"/>
+                </a:highlight>
+                <a:latin typeface="Consolas" panose="020B0609020204030204" pitchFamily="49" charset="0"/>
+              </a:rPr>
+              <a:t>SpeechRecognizer</a:t>
+            </a:r>
+            <a:r>
+              <a:rPr lang="en-US" sz="2000" dirty="0">
+                <a:solidFill>
+                  <a:srgbClr val="000000"/>
+                </a:solidFill>
+                <a:highlight>
+                  <a:srgbClr val="FFFFFF"/>
+                </a:highlight>
+                <a:latin typeface="Consolas" panose="020B0609020204030204" pitchFamily="49" charset="0"/>
+              </a:rPr>
+              <a:t>( </a:t>
+            </a:r>
+            <a:r>
+              <a:rPr lang="en-US" sz="2000" dirty="0" err="1">
+                <a:solidFill>
+                  <a:srgbClr val="000000"/>
+                </a:solidFill>
+                <a:highlight>
+                  <a:srgbClr val="FFFFFF"/>
+                </a:highlight>
+                <a:latin typeface="Consolas" panose="020B0609020204030204" pitchFamily="49" charset="0"/>
+              </a:rPr>
+              <a:t>Windows.Globalization.</a:t>
+            </a:r>
+            <a:r>
+              <a:rPr lang="en-US" sz="2000" dirty="0" err="1">
+                <a:solidFill>
+                  <a:srgbClr val="2B91AF"/>
+                </a:solidFill>
+                <a:highlight>
+                  <a:srgbClr val="FFFFFF"/>
+                </a:highlight>
+                <a:latin typeface="Consolas" panose="020B0609020204030204" pitchFamily="49" charset="0"/>
+              </a:rPr>
+              <a:t>Language</a:t>
+            </a:r>
+            <a:r>
+              <a:rPr lang="en-US" sz="2000" dirty="0">
+                <a:solidFill>
+                  <a:srgbClr val="000000"/>
+                </a:solidFill>
+                <a:highlight>
+                  <a:srgbClr val="FFFFFF"/>
+                </a:highlight>
+                <a:latin typeface="Consolas" panose="020B0609020204030204" pitchFamily="49" charset="0"/>
+              </a:rPr>
+              <a:t> )</a:t>
+            </a:r>
+            <a:endParaRPr lang="en-US" dirty="0" smtClean="0"/>
+          </a:p>
+          <a:p>
+            <a:pPr marL="0" indent="0">
+              <a:buNone/>
+            </a:pPr>
+            <a:r>
+              <a:rPr lang="en-US" sz="2000" dirty="0" err="1" smtClean="0">
+                <a:solidFill>
+                  <a:srgbClr val="000000"/>
+                </a:solidFill>
+                <a:highlight>
+                  <a:srgbClr val="FFFFFF"/>
+                </a:highlight>
+                <a:latin typeface="Consolas" panose="020B0609020204030204" pitchFamily="49" charset="0"/>
+              </a:rPr>
+              <a:t>speechRecognizer.Constraints.Add</a:t>
+            </a:r>
+            <a:r>
+              <a:rPr lang="en-US" sz="2000" dirty="0" smtClean="0">
+                <a:solidFill>
+                  <a:srgbClr val="000000"/>
+                </a:solidFill>
+                <a:highlight>
+                  <a:srgbClr val="FFFFFF"/>
+                </a:highlight>
+                <a:latin typeface="Consolas" panose="020B0609020204030204" pitchFamily="49" charset="0"/>
+              </a:rPr>
+              <a:t>(</a:t>
+            </a:r>
+            <a:r>
+              <a:rPr lang="en-US" sz="2000" dirty="0" err="1" smtClean="0">
+                <a:solidFill>
+                  <a:srgbClr val="000000"/>
+                </a:solidFill>
+                <a:highlight>
+                  <a:srgbClr val="FFFFFF"/>
+                </a:highlight>
+                <a:latin typeface="Consolas" panose="020B0609020204030204" pitchFamily="49" charset="0"/>
+              </a:rPr>
+              <a:t>commandConstraint</a:t>
+            </a:r>
+            <a:r>
+              <a:rPr lang="en-US" sz="2000" dirty="0">
+                <a:solidFill>
+                  <a:srgbClr val="000000"/>
+                </a:solidFill>
+                <a:highlight>
+                  <a:srgbClr val="FFFFFF"/>
+                </a:highlight>
+                <a:latin typeface="Consolas" panose="020B0609020204030204" pitchFamily="49" charset="0"/>
+              </a:rPr>
+              <a:t>)</a:t>
+            </a:r>
+            <a:endParaRPr lang="en-US" sz="2000" dirty="0" smtClean="0"/>
+          </a:p>
+          <a:p>
+            <a:pPr lvl="1"/>
+            <a:r>
+              <a:rPr lang="en-US" dirty="0" smtClean="0"/>
+              <a:t>Optional to add constraints</a:t>
+            </a:r>
+          </a:p>
+          <a:p>
+            <a:pPr marL="0" indent="0">
+              <a:buNone/>
+            </a:pPr>
+            <a:r>
+              <a:rPr lang="en-US" sz="2000" dirty="0" smtClean="0">
+                <a:solidFill>
+                  <a:srgbClr val="0000FF"/>
+                </a:solidFill>
+                <a:highlight>
+                  <a:srgbClr val="FFFFFF"/>
+                </a:highlight>
+                <a:latin typeface="Consolas" panose="020B0609020204030204" pitchFamily="49" charset="0"/>
+              </a:rPr>
+              <a:t>await </a:t>
+            </a:r>
+            <a:r>
+              <a:rPr lang="en-US" sz="2000" dirty="0" err="1" smtClean="0">
+                <a:solidFill>
+                  <a:srgbClr val="000000"/>
+                </a:solidFill>
+                <a:highlight>
+                  <a:srgbClr val="FFFFFF"/>
+                </a:highlight>
+                <a:latin typeface="Consolas" panose="020B0609020204030204" pitchFamily="49" charset="0"/>
+              </a:rPr>
+              <a:t>speechRecognizerCaptainsLogCommand.CompileConstraintsAsync</a:t>
+            </a:r>
+            <a:r>
+              <a:rPr lang="en-US" sz="2000" dirty="0">
+                <a:solidFill>
+                  <a:srgbClr val="000000"/>
+                </a:solidFill>
+                <a:highlight>
+                  <a:srgbClr val="FFFFFF"/>
+                </a:highlight>
+                <a:latin typeface="Consolas" panose="020B0609020204030204" pitchFamily="49" charset="0"/>
+              </a:rPr>
+              <a:t>()</a:t>
+            </a:r>
+            <a:endParaRPr lang="en-US" sz="2000" dirty="0" smtClean="0"/>
+          </a:p>
+          <a:p>
+            <a:pPr lvl="1"/>
+            <a:r>
+              <a:rPr lang="en-US" dirty="0" smtClean="0"/>
+              <a:t>Even if no constraints were added</a:t>
+            </a:r>
+          </a:p>
+          <a:p>
+            <a:pPr marL="0" indent="0">
+              <a:buNone/>
+            </a:pPr>
+            <a:r>
+              <a:rPr lang="en-US" sz="2000" dirty="0" err="1" smtClean="0">
+                <a:solidFill>
+                  <a:srgbClr val="2B91AF"/>
+                </a:solidFill>
+                <a:highlight>
+                  <a:srgbClr val="FFFFFF"/>
+                </a:highlight>
+                <a:latin typeface="Consolas" panose="020B0609020204030204" pitchFamily="49" charset="0"/>
+              </a:rPr>
+              <a:t>SpeechRecognitionResult</a:t>
+            </a:r>
+            <a:r>
+              <a:rPr lang="en-US" sz="2000" dirty="0" smtClean="0">
+                <a:solidFill>
+                  <a:srgbClr val="000000"/>
+                </a:solidFill>
+                <a:highlight>
+                  <a:srgbClr val="FFFFFF"/>
+                </a:highlight>
+                <a:latin typeface="Consolas" panose="020B0609020204030204" pitchFamily="49" charset="0"/>
+              </a:rPr>
+              <a:t> </a:t>
+            </a:r>
+            <a:r>
+              <a:rPr lang="en-US" sz="2000" dirty="0">
+                <a:solidFill>
+                  <a:srgbClr val="000000"/>
+                </a:solidFill>
+                <a:highlight>
+                  <a:srgbClr val="FFFFFF"/>
+                </a:highlight>
+                <a:latin typeface="Consolas" panose="020B0609020204030204" pitchFamily="49" charset="0"/>
+              </a:rPr>
+              <a:t>result = </a:t>
+            </a:r>
+            <a:endParaRPr lang="en-US" sz="2000" dirty="0" smtClean="0">
+              <a:solidFill>
+                <a:srgbClr val="000000"/>
+              </a:solidFill>
+              <a:highlight>
+                <a:srgbClr val="FFFFFF"/>
+              </a:highlight>
+              <a:latin typeface="Consolas" panose="020B0609020204030204" pitchFamily="49" charset="0"/>
+            </a:endParaRPr>
+          </a:p>
+          <a:p>
+            <a:pPr marL="0" indent="0">
+              <a:buNone/>
+            </a:pPr>
+            <a:r>
+              <a:rPr lang="en-US" sz="2000" dirty="0">
+                <a:solidFill>
+                  <a:srgbClr val="000000"/>
+                </a:solidFill>
+                <a:highlight>
+                  <a:srgbClr val="FFFFFF"/>
+                </a:highlight>
+                <a:latin typeface="Consolas" panose="020B0609020204030204" pitchFamily="49" charset="0"/>
+              </a:rPr>
+              <a:t>	</a:t>
+            </a:r>
+            <a:r>
+              <a:rPr lang="en-US" sz="2000" dirty="0" smtClean="0">
+                <a:solidFill>
+                  <a:srgbClr val="0000FF"/>
+                </a:solidFill>
+                <a:highlight>
+                  <a:srgbClr val="FFFFFF"/>
+                </a:highlight>
+                <a:latin typeface="Consolas" panose="020B0609020204030204" pitchFamily="49" charset="0"/>
+              </a:rPr>
+              <a:t>await</a:t>
+            </a:r>
+            <a:r>
+              <a:rPr lang="en-US" sz="2000" dirty="0" smtClean="0">
+                <a:solidFill>
+                  <a:srgbClr val="000000"/>
+                </a:solidFill>
+                <a:highlight>
+                  <a:srgbClr val="FFFFFF"/>
+                </a:highlight>
+                <a:latin typeface="Consolas" panose="020B0609020204030204" pitchFamily="49" charset="0"/>
+              </a:rPr>
+              <a:t> </a:t>
+            </a:r>
+            <a:r>
+              <a:rPr lang="en-US" sz="2000" dirty="0" err="1">
+                <a:solidFill>
+                  <a:srgbClr val="000000"/>
+                </a:solidFill>
+                <a:highlight>
+                  <a:srgbClr val="FFFFFF"/>
+                </a:highlight>
+                <a:latin typeface="Consolas" panose="020B0609020204030204" pitchFamily="49" charset="0"/>
+              </a:rPr>
+              <a:t>speechRecognizerCaptainsLogCommand.RecognizeAsync</a:t>
+            </a:r>
+            <a:r>
+              <a:rPr lang="en-US" sz="2000" dirty="0">
+                <a:solidFill>
+                  <a:srgbClr val="000000"/>
+                </a:solidFill>
+                <a:highlight>
+                  <a:srgbClr val="FFFFFF"/>
+                </a:highlight>
+                <a:latin typeface="Consolas" panose="020B0609020204030204" pitchFamily="49" charset="0"/>
+              </a:rPr>
+              <a:t>()</a:t>
+            </a:r>
+            <a:endParaRPr lang="en-US" dirty="0" smtClean="0"/>
+          </a:p>
+          <a:p>
+            <a:pPr lvl="1"/>
+            <a:r>
+              <a:rPr lang="en-US" dirty="0" smtClean="0"/>
+              <a:t>Or </a:t>
+            </a:r>
+            <a:r>
+              <a:rPr lang="en-US" dirty="0" err="1" smtClean="0"/>
+              <a:t>RecognizeWithUIAsync</a:t>
+            </a:r>
+            <a:endParaRPr lang="en-US" dirty="0" smtClean="0"/>
+          </a:p>
+          <a:p>
+            <a:pPr marL="0" indent="0">
+              <a:buNone/>
+            </a:pPr>
+            <a:r>
+              <a:rPr lang="en-US" sz="2000" dirty="0" smtClean="0">
+                <a:solidFill>
+                  <a:srgbClr val="0000FF"/>
+                </a:solidFill>
+                <a:highlight>
+                  <a:srgbClr val="FFFFFF"/>
+                </a:highlight>
+                <a:latin typeface="Consolas" panose="020B0609020204030204" pitchFamily="49" charset="0"/>
+              </a:rPr>
+              <a:t>if</a:t>
+            </a:r>
+            <a:r>
+              <a:rPr lang="en-US" sz="2000" dirty="0" smtClean="0">
+                <a:solidFill>
+                  <a:srgbClr val="000000"/>
+                </a:solidFill>
+                <a:highlight>
+                  <a:srgbClr val="FFFFFF"/>
+                </a:highlight>
+                <a:latin typeface="Consolas" panose="020B0609020204030204" pitchFamily="49" charset="0"/>
+              </a:rPr>
+              <a:t> ( </a:t>
+            </a:r>
+            <a:r>
+              <a:rPr lang="en-US" sz="2000" dirty="0" err="1" smtClean="0">
+                <a:solidFill>
+                  <a:srgbClr val="000000"/>
+                </a:solidFill>
+                <a:highlight>
+                  <a:srgbClr val="FFFFFF"/>
+                </a:highlight>
+                <a:latin typeface="Consolas" panose="020B0609020204030204" pitchFamily="49" charset="0"/>
+              </a:rPr>
+              <a:t>dictationResult.Status</a:t>
+            </a:r>
+            <a:r>
+              <a:rPr lang="en-US" sz="2000" dirty="0" smtClean="0">
+                <a:solidFill>
+                  <a:srgbClr val="000000"/>
+                </a:solidFill>
+                <a:highlight>
+                  <a:srgbClr val="FFFFFF"/>
+                </a:highlight>
+                <a:latin typeface="Consolas" panose="020B0609020204030204" pitchFamily="49" charset="0"/>
+              </a:rPr>
+              <a:t> == </a:t>
+            </a:r>
+            <a:r>
+              <a:rPr lang="en-US" sz="2000" dirty="0" err="1" smtClean="0">
+                <a:solidFill>
+                  <a:srgbClr val="2B91AF"/>
+                </a:solidFill>
+                <a:highlight>
+                  <a:srgbClr val="FFFFFF"/>
+                </a:highlight>
+                <a:latin typeface="Consolas" panose="020B0609020204030204" pitchFamily="49" charset="0"/>
+              </a:rPr>
+              <a:t>SpeechRecognitionResultStatus</a:t>
+            </a:r>
+            <a:r>
+              <a:rPr lang="en-US" sz="2000" dirty="0" err="1" smtClean="0">
+                <a:solidFill>
+                  <a:srgbClr val="000000"/>
+                </a:solidFill>
+                <a:highlight>
+                  <a:srgbClr val="FFFFFF"/>
+                </a:highlight>
+                <a:latin typeface="Consolas" panose="020B0609020204030204" pitchFamily="49" charset="0"/>
+              </a:rPr>
+              <a:t>.Success</a:t>
+            </a:r>
+            <a:endParaRPr lang="en-US" sz="2000" dirty="0" smtClean="0">
+              <a:solidFill>
+                <a:srgbClr val="000000"/>
+              </a:solidFill>
+              <a:highlight>
+                <a:srgbClr val="FFFFFF"/>
+              </a:highlight>
+              <a:latin typeface="Consolas" panose="020B0609020204030204" pitchFamily="49" charset="0"/>
+            </a:endParaRPr>
+          </a:p>
+          <a:p>
+            <a:pPr marL="0" indent="0">
+              <a:buNone/>
+            </a:pPr>
+            <a:r>
+              <a:rPr lang="en-US" sz="2000" dirty="0" smtClean="0">
+                <a:solidFill>
+                  <a:srgbClr val="000000"/>
+                </a:solidFill>
+                <a:highlight>
+                  <a:srgbClr val="FFFFFF"/>
+                </a:highlight>
+                <a:latin typeface="Consolas" panose="020B0609020204030204" pitchFamily="49" charset="0"/>
+              </a:rPr>
+              <a:t>	&amp;&amp; </a:t>
+            </a:r>
+            <a:r>
+              <a:rPr lang="en-US" sz="2000" dirty="0" err="1">
+                <a:solidFill>
+                  <a:srgbClr val="000000"/>
+                </a:solidFill>
+                <a:highlight>
+                  <a:srgbClr val="FFFFFF"/>
+                </a:highlight>
+                <a:latin typeface="Consolas" panose="020B0609020204030204" pitchFamily="49" charset="0"/>
+              </a:rPr>
+              <a:t>dictationResult.Confidence</a:t>
+            </a:r>
+            <a:r>
+              <a:rPr lang="en-US" sz="2000" dirty="0">
+                <a:solidFill>
+                  <a:srgbClr val="000000"/>
+                </a:solidFill>
+                <a:highlight>
+                  <a:srgbClr val="FFFFFF"/>
+                </a:highlight>
+                <a:latin typeface="Consolas" panose="020B0609020204030204" pitchFamily="49" charset="0"/>
+              </a:rPr>
+              <a:t> == </a:t>
+            </a:r>
+            <a:r>
+              <a:rPr lang="en-US" sz="2000" dirty="0" err="1">
+                <a:solidFill>
+                  <a:srgbClr val="2B91AF"/>
+                </a:solidFill>
+                <a:highlight>
+                  <a:srgbClr val="FFFFFF"/>
+                </a:highlight>
+                <a:latin typeface="Consolas" panose="020B0609020204030204" pitchFamily="49" charset="0"/>
+              </a:rPr>
+              <a:t>SpeechRecognitionConfidence</a:t>
+            </a:r>
+            <a:r>
+              <a:rPr lang="en-US" sz="2000" dirty="0" err="1">
+                <a:solidFill>
+                  <a:srgbClr val="000000"/>
+                </a:solidFill>
+                <a:highlight>
+                  <a:srgbClr val="FFFFFF"/>
+                </a:highlight>
+                <a:latin typeface="Consolas" panose="020B0609020204030204" pitchFamily="49" charset="0"/>
+              </a:rPr>
+              <a:t>.Rejected</a:t>
+            </a:r>
+            <a:endParaRPr lang="en-US" dirty="0" smtClean="0"/>
+          </a:p>
+          <a:p>
+            <a:pPr marL="0" indent="0">
+              <a:buNone/>
+            </a:pPr>
+            <a:r>
+              <a:rPr lang="en-US" sz="1600" dirty="0" smtClean="0">
+                <a:solidFill>
+                  <a:srgbClr val="000000"/>
+                </a:solidFill>
+                <a:highlight>
+                  <a:srgbClr val="FFFFFF"/>
+                </a:highlight>
+                <a:latin typeface="Consolas" panose="020B0609020204030204" pitchFamily="49" charset="0"/>
+              </a:rPr>
+              <a:t>{</a:t>
+            </a:r>
+          </a:p>
+          <a:p>
+            <a:pPr marL="0" indent="0">
+              <a:buNone/>
+            </a:pPr>
+            <a:r>
+              <a:rPr lang="en-US" sz="2000" dirty="0" smtClean="0">
+                <a:solidFill>
+                  <a:srgbClr val="000000"/>
+                </a:solidFill>
+                <a:highlight>
+                  <a:srgbClr val="FFFFFF"/>
+                </a:highlight>
+                <a:latin typeface="Consolas" panose="020B0609020204030204" pitchFamily="49" charset="0"/>
+              </a:rPr>
+              <a:t>	</a:t>
+            </a:r>
+            <a:r>
+              <a:rPr lang="en-US" sz="2000" b="1" dirty="0" err="1" smtClean="0">
+                <a:solidFill>
+                  <a:srgbClr val="000000"/>
+                </a:solidFill>
+                <a:highlight>
+                  <a:srgbClr val="FFFFFF"/>
+                </a:highlight>
+                <a:latin typeface="Consolas" panose="020B0609020204030204" pitchFamily="49" charset="0"/>
+              </a:rPr>
+              <a:t>result.Text</a:t>
+            </a:r>
+            <a:endParaRPr lang="en-US" sz="2000" b="1" dirty="0" smtClean="0">
+              <a:solidFill>
+                <a:srgbClr val="000000"/>
+              </a:solidFill>
+              <a:highlight>
+                <a:srgbClr val="FFFFFF"/>
+              </a:highlight>
+              <a:latin typeface="Consolas" panose="020B0609020204030204" pitchFamily="49" charset="0"/>
+            </a:endParaRPr>
+          </a:p>
+          <a:p>
+            <a:pPr marL="0" indent="0">
+              <a:buNone/>
+            </a:pPr>
+            <a:r>
+              <a:rPr lang="en-US" sz="1600" dirty="0" smtClean="0">
+                <a:solidFill>
+                  <a:srgbClr val="000000"/>
+                </a:solidFill>
+                <a:highlight>
+                  <a:srgbClr val="FFFFFF"/>
+                </a:highlight>
+                <a:latin typeface="Consolas" panose="020B0609020204030204" pitchFamily="49" charset="0"/>
+              </a:rPr>
+              <a:t>}</a:t>
+            </a:r>
+            <a:endParaRPr lang="en-US" sz="1600" dirty="0"/>
+          </a:p>
+        </p:txBody>
+      </p:sp>
+    </p:spTree>
+    <p:extLst>
+      <p:ext uri="{BB962C8B-B14F-4D97-AF65-F5344CB8AC3E}">
+        <p14:creationId xmlns:p14="http://schemas.microsoft.com/office/powerpoint/2010/main" val="229033254"/>
+      </p:ext>
+    </p:extLst>
+  </p:cSld>
+  <p:clrMapOvr>
+    <a:masterClrMapping/>
+  </p:clrMapOvr>
+</p:sld>
+</file>
+
+<file path=ppt/slides/slide15.xml><?xml version="1.0" encoding="utf-8"?>
+<p:sld xmlns:a="http://schemas.openxmlformats.org/drawingml/2006/main" xmlns:r="http://schemas.openxmlformats.org/officeDocument/2006/relationships" xmlns:p="http://schemas.openxmlformats.org/presentationml/2006/main">
+  <p:cSld>
+    <p:spTree>
+      <p:nvGrpSpPr>
+        <p:cNvPr id="1" name=""/>
+        <p:cNvGrpSpPr/>
+        <p:nvPr/>
+      </p:nvGrpSpPr>
+      <p:grpSpPr>
+        <a:xfrm>
+          <a:off x="0" y="0"/>
+          <a:ext cx="0" cy="0"/>
+          <a:chOff x="0" y="0"/>
+          <a:chExt cx="0" cy="0"/>
+        </a:xfrm>
+      </p:grpSpPr>
+      <p:sp>
+        <p:nvSpPr>
+          <p:cNvPr id="2" name="Title 1"/>
+          <p:cNvSpPr>
+            <a:spLocks noGrp="1"/>
+          </p:cNvSpPr>
+          <p:nvPr>
+            <p:ph type="title"/>
+          </p:nvPr>
+        </p:nvSpPr>
+        <p:spPr/>
+        <p:txBody>
+          <a:bodyPr/>
+          <a:lstStyle/>
+          <a:p>
+            <a:r>
+              <a:rPr lang="en-US" dirty="0"/>
+              <a:t>Choosing </a:t>
+            </a:r>
+            <a:r>
+              <a:rPr lang="en-US" dirty="0" smtClean="0"/>
+              <a:t>a </a:t>
+            </a:r>
+            <a:r>
+              <a:rPr lang="en-US" dirty="0" err="1" smtClean="0"/>
+              <a:t>ISpeechRecognitionConstraint</a:t>
+            </a:r>
+            <a:endParaRPr lang="en-US" dirty="0"/>
+          </a:p>
+        </p:txBody>
+      </p:sp>
+      <p:sp>
+        <p:nvSpPr>
+          <p:cNvPr id="3" name="Content Placeholder 2"/>
+          <p:cNvSpPr>
+            <a:spLocks noGrp="1"/>
+          </p:cNvSpPr>
+          <p:nvPr>
+            <p:ph idx="1"/>
+          </p:nvPr>
+        </p:nvSpPr>
+        <p:spPr/>
+        <p:txBody>
+          <a:bodyPr>
+            <a:normAutofit lnSpcReduction="10000"/>
+          </a:bodyPr>
+          <a:lstStyle/>
+          <a:p>
+            <a:r>
+              <a:rPr lang="en-US" dirty="0" err="1" smtClean="0"/>
+              <a:t>SpeechRecognitionTopicConstraint</a:t>
+            </a:r>
+            <a:r>
+              <a:rPr lang="en-US" dirty="0" smtClean="0"/>
+              <a:t>(</a:t>
+            </a:r>
+          </a:p>
+          <a:p>
+            <a:pPr marL="342900" lvl="1" indent="0">
+              <a:buNone/>
+            </a:pPr>
+            <a:r>
+              <a:rPr lang="en-US" dirty="0"/>
+              <a:t>	</a:t>
+            </a:r>
+            <a:r>
+              <a:rPr lang="en-US" sz="2400" dirty="0" err="1" smtClean="0"/>
+              <a:t>SpeechRecognitionScenario.Dictation</a:t>
+            </a:r>
+            <a:r>
+              <a:rPr lang="en-US" dirty="0" smtClean="0"/>
+              <a:t>, “</a:t>
+            </a:r>
+            <a:r>
+              <a:rPr lang="en-US" dirty="0" err="1" smtClean="0"/>
+              <a:t>TopicHint</a:t>
+            </a:r>
+            <a:r>
+              <a:rPr lang="en-US" dirty="0" smtClean="0"/>
+              <a:t>”, “Tag" </a:t>
+            </a:r>
+            <a:r>
+              <a:rPr lang="en-US" dirty="0"/>
+              <a:t>)</a:t>
+            </a:r>
+            <a:endParaRPr lang="en-US" dirty="0" smtClean="0"/>
+          </a:p>
+          <a:p>
+            <a:pPr lvl="1"/>
+            <a:r>
+              <a:rPr lang="en-US" dirty="0" err="1" smtClean="0"/>
+              <a:t>SpeechRecognitionScenario</a:t>
+            </a:r>
+            <a:r>
+              <a:rPr lang="en-US" dirty="0" smtClean="0"/>
+              <a:t> options</a:t>
+            </a:r>
+          </a:p>
+          <a:p>
+            <a:pPr lvl="2"/>
+            <a:r>
+              <a:rPr lang="en-US" dirty="0" smtClean="0"/>
+              <a:t>Dictation</a:t>
+            </a:r>
+          </a:p>
+          <a:p>
+            <a:pPr lvl="2"/>
+            <a:r>
+              <a:rPr lang="en-US" dirty="0" err="1" smtClean="0"/>
+              <a:t>FormFilling</a:t>
+            </a:r>
+            <a:endParaRPr lang="en-US" dirty="0" smtClean="0"/>
+          </a:p>
+          <a:p>
+            <a:pPr lvl="2"/>
+            <a:r>
+              <a:rPr lang="en-US" dirty="0" err="1" smtClean="0"/>
+              <a:t>WebSearch</a:t>
+            </a:r>
+            <a:endParaRPr lang="en-US" dirty="0"/>
+          </a:p>
+          <a:p>
+            <a:r>
+              <a:rPr lang="en-US" dirty="0" err="1"/>
+              <a:t>SpeechRecognitionListConstraint</a:t>
+            </a:r>
+            <a:r>
+              <a:rPr lang="en-US" dirty="0"/>
+              <a:t>( new[] { "1", "2" } </a:t>
+            </a:r>
+            <a:r>
+              <a:rPr lang="en-US" dirty="0" smtClean="0"/>
+              <a:t>)</a:t>
+            </a:r>
+          </a:p>
+          <a:p>
+            <a:pPr lvl="1"/>
+            <a:r>
+              <a:rPr lang="en-US" dirty="0" smtClean="0"/>
+              <a:t>Created </a:t>
+            </a:r>
+            <a:r>
+              <a:rPr lang="en-US" dirty="0"/>
+              <a:t>in code from a list of strings</a:t>
+            </a:r>
+          </a:p>
+          <a:p>
+            <a:pPr lvl="1"/>
+            <a:r>
+              <a:rPr lang="en-US" dirty="0"/>
+              <a:t>Extremely light weight, fast, and accurate</a:t>
+            </a:r>
+          </a:p>
+          <a:p>
+            <a:r>
+              <a:rPr lang="en-US" dirty="0" err="1"/>
+              <a:t>SpeechRecognitionGrammarFileConstraint</a:t>
+            </a:r>
+            <a:r>
+              <a:rPr lang="en-US" dirty="0"/>
+              <a:t> </a:t>
+            </a:r>
+            <a:r>
+              <a:rPr lang="en-US" dirty="0" smtClean="0"/>
+              <a:t>( [SRGS File] )</a:t>
+            </a:r>
+          </a:p>
+          <a:p>
+            <a:pPr lvl="1"/>
+            <a:r>
+              <a:rPr lang="en-US" dirty="0" smtClean="0"/>
+              <a:t>“[Can] capture multiple semantic meanings in a single recognition”</a:t>
+            </a:r>
+            <a:endParaRPr lang="en-US" dirty="0"/>
+          </a:p>
+          <a:p>
+            <a:pPr lvl="1"/>
+            <a:r>
+              <a:rPr lang="en-US" dirty="0" smtClean="0"/>
+              <a:t>Industry Standard (meaning portable to other platforms)</a:t>
+            </a:r>
+            <a:endParaRPr lang="en-US" dirty="0"/>
+          </a:p>
+        </p:txBody>
+      </p:sp>
+    </p:spTree>
+    <p:extLst>
+      <p:ext uri="{BB962C8B-B14F-4D97-AF65-F5344CB8AC3E}">
+        <p14:creationId xmlns:p14="http://schemas.microsoft.com/office/powerpoint/2010/main" val="242263823"/>
+      </p:ext>
+    </p:extLst>
+  </p:cSld>
+  <p:clrMapOvr>
+    <a:masterClrMapping/>
+  </p:clrMapOvr>
+</p:sld>
+</file>
+
+<file path=ppt/slides/slide16.xml><?xml version="1.0" encoding="utf-8"?>
+<p:sld xmlns:a="http://schemas.openxmlformats.org/drawingml/2006/main" xmlns:r="http://schemas.openxmlformats.org/officeDocument/2006/relationships" xmlns:p="http://schemas.openxmlformats.org/presentationml/2006/main">
+  <p:cSld>
+    <p:spTree>
+      <p:nvGrpSpPr>
+        <p:cNvPr id="1" name=""/>
+        <p:cNvGrpSpPr/>
+        <p:nvPr/>
+      </p:nvGrpSpPr>
+      <p:grpSpPr>
+        <a:xfrm>
+          <a:off x="0" y="0"/>
+          <a:ext cx="0" cy="0"/>
+          <a:chOff x="0" y="0"/>
+          <a:chExt cx="0" cy="0"/>
+        </a:xfrm>
+      </p:grpSpPr>
+      <p:sp>
+        <p:nvSpPr>
+          <p:cNvPr id="2" name="Title 1"/>
+          <p:cNvSpPr>
+            <a:spLocks noGrp="1"/>
+          </p:cNvSpPr>
+          <p:nvPr>
+            <p:ph type="title"/>
+          </p:nvPr>
+        </p:nvSpPr>
+        <p:spPr/>
+        <p:txBody>
+          <a:bodyPr/>
+          <a:lstStyle/>
+          <a:p>
+            <a:r>
+              <a:rPr lang="en-US" dirty="0" smtClean="0"/>
               <a:t>Sample </a:t>
             </a:r>
             <a:r>
@@ -3979,7 +4224,7 @@
 </p:sld>
 </file>
 
-<file path=ppt/slides/slide15.xml><?xml version="1.0" encoding="utf-8"?>
+<file path=ppt/slides/slide17.xml><?xml version="1.0" encoding="utf-8"?>
 <p:sld xmlns:a="http://schemas.openxmlformats.org/drawingml/2006/main" xmlns:r="http://schemas.openxmlformats.org/officeDocument/2006/relationships" xmlns:p="http://schemas.openxmlformats.org/presentationml/2006/main">
   <p:cSld>
     <p:spTree>
@@ -4368,160 +4613,70 @@
           <a:chExt cx="0" cy="0"/>
         </a:xfrm>
       </p:grpSpPr>
-      <p:sp>
-        <p:nvSpPr>
-          <p:cNvPr id="2" name="Title 1"/>
-          <p:cNvSpPr>
-            <a:spLocks noGrp="1"/>
-          </p:cNvSpPr>
-          <p:nvPr>
-            <p:ph type="title"/>
-          </p:nvPr>
-        </p:nvSpPr>
-        <p:spPr/>
-        <p:txBody>
-          <a:bodyPr/>
-          <a:lstStyle/>
-          <a:p>
-            <a:r>
-              <a:rPr lang="en-US" dirty="0"/>
-              <a:t>About Danny &amp; InterKnowlogy</a:t>
-            </a:r>
-          </a:p>
-        </p:txBody>
-      </p:sp>
-      <p:sp>
-        <p:nvSpPr>
-          <p:cNvPr id="3" name="Content Placeholder 2"/>
-          <p:cNvSpPr>
-            <a:spLocks noGrp="1"/>
-          </p:cNvSpPr>
-          <p:nvPr>
-            <p:ph idx="1"/>
-          </p:nvPr>
-        </p:nvSpPr>
-        <p:spPr/>
-        <p:txBody>
-          <a:bodyPr>
-            <a:normAutofit lnSpcReduction="10000"/>
-          </a:bodyPr>
-          <a:lstStyle/>
-          <a:p>
-            <a:r>
-              <a:rPr lang="en-US" dirty="0"/>
-              <a:t>InterKnowlogy (</a:t>
-            </a:r>
-            <a:r>
-              <a:rPr lang="en-US" dirty="0">
-                <a:hlinkClick r:id="rId2"/>
-              </a:rPr>
-              <a:t>www.interknowlogy.com</a:t>
-            </a:r>
-            <a:r>
-              <a:rPr lang="en-US" dirty="0"/>
-              <a:t>)</a:t>
-            </a:r>
-          </a:p>
-          <a:p>
-            <a:pPr lvl="1"/>
-            <a:r>
-              <a:rPr lang="en-US" dirty="0"/>
-              <a:t>15 year old services firm – Custom Application Development</a:t>
-            </a:r>
-          </a:p>
-          <a:p>
-            <a:pPr lvl="1"/>
-            <a:r>
-              <a:rPr lang="en-US" dirty="0"/>
-              <a:t>Focused on building NUI solutions</a:t>
-            </a:r>
-          </a:p>
-          <a:p>
-            <a:pPr lvl="2"/>
-            <a:r>
-              <a:rPr lang="en-US" dirty="0" smtClean="0"/>
-              <a:t>Windows Universal Platform (Desktop, Tablet, Phone), </a:t>
-            </a:r>
-            <a:r>
-              <a:rPr lang="en-US" dirty="0"/>
-              <a:t>Xamarin, WPF, Kinect, Azure</a:t>
-            </a:r>
-          </a:p>
-          <a:p>
-            <a:pPr lvl="2"/>
-            <a:r>
-              <a:rPr lang="en-US" dirty="0" smtClean="0"/>
-              <a:t>Touch, Gestures (Touchless), &amp; Mouse and Keyboard</a:t>
-            </a:r>
-          </a:p>
-          <a:p>
-            <a:pPr lvl="1"/>
-            <a:r>
-              <a:rPr lang="en-US" dirty="0" smtClean="0"/>
-              <a:t>Formal R&amp;D program: RECESS</a:t>
-            </a:r>
-          </a:p>
-          <a:p>
-            <a:pPr lvl="2"/>
-            <a:r>
-              <a:rPr lang="en-US" dirty="0" smtClean="0"/>
-              <a:t>Self </a:t>
-            </a:r>
-            <a:r>
-              <a:rPr lang="en-US" dirty="0"/>
-              <a:t>guided learning/My time to prepare this presentation</a:t>
-            </a:r>
-          </a:p>
-          <a:p>
-            <a:r>
-              <a:rPr lang="en-US" dirty="0"/>
-              <a:t>Danny Warren, Sr. Software Engineer</a:t>
-            </a:r>
-          </a:p>
-          <a:p>
-            <a:pPr lvl="1"/>
-            <a:r>
-              <a:rPr lang="en-US" dirty="0"/>
-              <a:t>Graduate Neumont University 2009, B.S. C.S. </a:t>
-            </a:r>
-          </a:p>
-          <a:p>
-            <a:pPr lvl="1"/>
-            <a:r>
-              <a:rPr lang="en-US" dirty="0"/>
-              <a:t>Microsoft MVP in Windows Platform Development</a:t>
-            </a:r>
-          </a:p>
-          <a:p>
-            <a:pPr lvl="2"/>
-            <a:r>
-              <a:rPr lang="en-US" dirty="0"/>
-              <a:t>Since Oct 2013</a:t>
-            </a:r>
-          </a:p>
-          <a:p>
-            <a:pPr lvl="1"/>
-            <a:r>
-              <a:rPr lang="en-US" dirty="0"/>
-              <a:t>Former Nokia Champion</a:t>
-            </a:r>
-          </a:p>
-          <a:p>
-            <a:pPr lvl="1"/>
-            <a:r>
-              <a:rPr lang="en-US" dirty="0"/>
-              <a:t>Avid Mt. Biker and aspiring Rock Climber</a:t>
-            </a:r>
-          </a:p>
-          <a:p>
-            <a:endParaRPr lang="en-US" dirty="0"/>
-          </a:p>
-        </p:txBody>
-      </p:sp>
+      <p:pic>
+        <p:nvPicPr>
+          <p:cNvPr id="4" name="Picture 3"/>
+          <p:cNvPicPr>
+            <a:picLocks noChangeAspect="1"/>
+          </p:cNvPicPr>
+          <p:nvPr/>
+        </p:nvPicPr>
+        <p:blipFill>
+          <a:blip r:embed="rId2">
+            <a:extLst>
+              <a:ext uri="{28A0092B-C50C-407E-A947-70E740481C1C}">
+                <a14:useLocalDpi xmlns:a14="http://schemas.microsoft.com/office/drawing/2010/main" val="0"/>
+              </a:ext>
+            </a:extLst>
+          </a:blip>
+          <a:stretch>
+            <a:fillRect/>
+          </a:stretch>
+        </p:blipFill>
+        <p:spPr>
+          <a:xfrm>
+            <a:off x="0" y="0"/>
+            <a:ext cx="12192000" cy="6858000"/>
+          </a:xfrm>
+          <a:prstGeom prst="rect">
+            <a:avLst/>
+          </a:prstGeom>
+        </p:spPr>
+      </p:pic>
+      <p:pic>
+        <p:nvPicPr>
+          <p:cNvPr id="2" name="Picture 1"/>
+          <p:cNvPicPr>
+            <a:picLocks noChangeAspect="1"/>
+          </p:cNvPicPr>
+          <p:nvPr/>
+        </p:nvPicPr>
+        <p:blipFill>
+          <a:blip r:embed="rId3">
+            <a:extLst>
+              <a:ext uri="{28A0092B-C50C-407E-A947-70E740481C1C}">
+                <a14:useLocalDpi xmlns:a14="http://schemas.microsoft.com/office/drawing/2010/main" val="0"/>
+              </a:ext>
+            </a:extLst>
+          </a:blip>
+          <a:stretch>
+            <a:fillRect/>
+          </a:stretch>
+        </p:blipFill>
+        <p:spPr>
+          <a:xfrm>
+            <a:off x="0" y="0"/>
+            <a:ext cx="12192000" cy="6858000"/>
+          </a:xfrm>
+          <a:prstGeom prst="rect">
+            <a:avLst/>
+          </a:prstGeom>
+        </p:spPr>
+      </p:pic>
     </p:spTree>
     <p:extLst>
       <p:ext uri="{BB962C8B-B14F-4D97-AF65-F5344CB8AC3E}">
-        <p14:creationId xmlns:p14="http://schemas.microsoft.com/office/powerpoint/2010/main" val="2296820659"/>
+        <p14:creationId xmlns:p14="http://schemas.microsoft.com/office/powerpoint/2010/main" val="269905186"/>
       </p:ext>
     </p:extLst>
   </p:cSld>
@@ -4555,7 +4710,7 @@
             <a:spLocks noGrp="1"/>
           </p:cNvSpPr>
           <p:nvPr>
-            <p:ph type="title"/>
+            <p:ph type="ctrTitle"/>
           </p:nvPr>
         </p:nvSpPr>
         <p:spPr/>
@@ -4565,8 +4720,51 @@
           <a:p>
             <a:r>
               <a:rPr lang="en-US" dirty="0" smtClean="0"/>
-              <a:t>Location</a:t>
-            </a:r>
+              <a:t>Hey Cortana, Where Am I?</a:t>
+            </a:r>
+            <a:endParaRPr lang="en-US" dirty="0"/>
+          </a:p>
+        </p:txBody>
+      </p:sp>
+      <p:sp>
+        <p:nvSpPr>
+          <p:cNvPr id="3" name="Subtitle 2"/>
+          <p:cNvSpPr>
+            <a:spLocks noGrp="1"/>
+          </p:cNvSpPr>
+          <p:nvPr>
+            <p:ph type="subTitle" idx="1"/>
+          </p:nvPr>
+        </p:nvSpPr>
+        <p:spPr/>
+        <p:txBody>
+          <a:bodyPr/>
+          <a:lstStyle/>
+          <a:p>
+            <a:r>
+              <a:rPr lang="en-US" dirty="0" smtClean="0"/>
+              <a:t>Danny Warren</a:t>
+            </a:r>
+          </a:p>
+          <a:p>
+            <a:r>
+              <a:rPr lang="en-US" dirty="0" smtClean="0"/>
+              <a:t>@</a:t>
+            </a:r>
+            <a:r>
+              <a:rPr lang="en-US" dirty="0" err="1" smtClean="0"/>
+              <a:t>dannydwarren</a:t>
+            </a:r>
+            <a:endParaRPr lang="en-US" dirty="0" smtClean="0"/>
+          </a:p>
+          <a:p>
+            <a:r>
+              <a:rPr lang="en-US" smtClean="0"/>
+              <a:t>dannydwarren@gmail.com</a:t>
+            </a:r>
+            <a:endParaRPr lang="en-US" dirty="0" smtClean="0"/>
+          </a:p>
+          <a:p>
             <a:endParaRPr lang="en-US" dirty="0"/>
           </a:p>
         </p:txBody>
@@ -4574,7 +4772,7 @@
     </p:spTree>
     <p:extLst>
       <p:ext uri="{BB962C8B-B14F-4D97-AF65-F5344CB8AC3E}">
-        <p14:creationId xmlns:p14="http://schemas.microsoft.com/office/powerpoint/2010/main" val="184170357"/>
+        <p14:creationId xmlns:p14="http://schemas.microsoft.com/office/powerpoint/2010/main" val="3942048576"/>
       </p:ext>
     </p:extLst>
   </p:cSld>
@@ -4618,7 +4816,7 @@
           <a:p>
             <a:r>
               <a:rPr lang="en-US" dirty="0"/>
-              <a:t>Single Shot Location</a:t>
+              <a:t>About Danny &amp; InterKnowlogy</a:t>
             </a:r>
           </a:p>
         </p:txBody>
@@ -4635,62 +4833,126 @@
         </p:nvSpPr>
         <p:spPr/>
         <p:txBody>
-          <a:bodyPr/>
+          <a:bodyPr>
+            <a:normAutofit lnSpcReduction="10000"/>
+          </a:bodyPr>
           <a:lstStyle/>
           <a:p>
             <a:r>
-              <a:rPr lang="en-US" dirty="0" err="1"/>
-              <a:t>Geolocator.DesiredAccuracy</a:t>
-            </a:r>
+              <a:rPr lang="en-US" dirty="0"/>
+              <a:t>InterKnowlogy (</a:t>
+            </a:r>
+            <a:r>
+              <a:rPr lang="en-US" dirty="0">
+                <a:hlinkClick r:id="rId2"/>
+              </a:rPr>
+              <a:t>www.interknowlogy.com</a:t>
+            </a:r>
+            <a:r>
+              <a:rPr lang="en-US" dirty="0"/>
+              <a:t>)</a:t>
+            </a:r>
+          </a:p>
+          <a:p>
+            <a:pPr lvl="1"/>
+            <a:r>
+              <a:rPr lang="en-US" dirty="0"/>
+              <a:t>15 year old services firm – Custom Application Development</a:t>
+            </a:r>
+          </a:p>
+          <a:p>
+            <a:pPr lvl="1"/>
+            <a:r>
+              <a:rPr lang="en-US" dirty="0"/>
+              <a:t>Focused on building NUI solutions</a:t>
+            </a:r>
+          </a:p>
+          <a:p>
+            <a:pPr lvl="2"/>
+            <a:r>
+              <a:rPr lang="en-US" dirty="0" smtClean="0"/>
+              <a:t>Windows Universal Platform (Desktop, Tablet, Phone), </a:t>
+            </a:r>
+            <a:r>
+              <a:rPr lang="en-US" dirty="0"/>
+              <a:t>Xamarin, WPF, Kinect, Azure</a:t>
+            </a:r>
+          </a:p>
+          <a:p>
+            <a:pPr lvl="2"/>
+            <a:r>
+              <a:rPr lang="en-US" dirty="0" smtClean="0"/>
+              <a:t>Touch, Gestures (Touchless), &amp; Mouse and Keyboard</a:t>
+            </a:r>
+          </a:p>
+          <a:p>
+            <a:pPr lvl="1"/>
+            <a:r>
+              <a:rPr lang="en-US" dirty="0" smtClean="0"/>
+              <a:t>Formal R&amp;D program: RECESS</a:t>
+            </a:r>
+          </a:p>
+          <a:p>
+            <a:pPr lvl="2"/>
+            <a:r>
+              <a:rPr lang="en-US" dirty="0" smtClean="0"/>
+              <a:t>Self </a:t>
+            </a:r>
+            <a:r>
+              <a:rPr lang="en-US" dirty="0"/>
+              <a:t>guided learning/My time to prepare this presentation</a:t>
+            </a:r>
+          </a:p>
+          <a:p>
+            <a:r>
+              <a:rPr lang="en-US" dirty="0"/>
+              <a:t>Danny Warren, Sr. Software Engineer</a:t>
+            </a:r>
+          </a:p>
+          <a:p>
+            <a:pPr lvl="1"/>
+            <a:r>
+              <a:rPr lang="en-US" dirty="0"/>
+              <a:t>Graduate Neumont University 2009, B.S. C.S. </a:t>
+            </a:r>
+          </a:p>
+          <a:p>
+            <a:pPr lvl="1"/>
+            <a:r>
+              <a:rPr lang="en-US" dirty="0"/>
+              <a:t>Microsoft MVP in Windows Platform Development</a:t>
+            </a:r>
+          </a:p>
+          <a:p>
+            <a:pPr lvl="2"/>
+            <a:r>
+              <a:rPr lang="en-US" dirty="0"/>
+              <a:t>Since Oct 2013</a:t>
+            </a:r>
+          </a:p>
+          <a:p>
+            <a:pPr lvl="1"/>
+            <a:r>
+              <a:rPr lang="en-US" dirty="0"/>
+              <a:t>Former Nokia Champion</a:t>
+            </a:r>
+          </a:p>
+          <a:p>
+            <a:pPr lvl="1"/>
+            <a:r>
+              <a:rPr lang="en-US" dirty="0"/>
+              <a:t>Avid Mt. Biker and aspiring Rock Climber</a:t>
+            </a:r>
+          </a:p>
+          <a:p>
             <a:endParaRPr lang="en-US" dirty="0"/>
-          </a:p>
-          <a:p>
-            <a:r>
-              <a:rPr lang="en-US" dirty="0"/>
-              <a:t>Uses</a:t>
-            </a:r>
-          </a:p>
-          <a:p>
-            <a:pPr lvl="1"/>
-            <a:r>
-              <a:rPr lang="en-US" dirty="0"/>
-              <a:t>Check-In’s</a:t>
-            </a:r>
-          </a:p>
-          <a:p>
-            <a:pPr lvl="1"/>
-            <a:r>
-              <a:rPr lang="en-US" dirty="0"/>
-              <a:t>Placing a geocache</a:t>
-            </a:r>
-          </a:p>
-          <a:p>
-            <a:pPr lvl="1"/>
-            <a:r>
-              <a:rPr lang="en-US" dirty="0"/>
-              <a:t>Where am I?</a:t>
-            </a:r>
-          </a:p>
-          <a:p>
-            <a:pPr lvl="1"/>
-            <a:r>
-              <a:rPr lang="en-US" dirty="0"/>
-              <a:t>Where did I park?</a:t>
-            </a:r>
-          </a:p>
-          <a:p>
-            <a:pPr lvl="1"/>
-            <a:r>
-              <a:rPr lang="en-US" dirty="0"/>
-              <a:t>What country am I in?</a:t>
-            </a:r>
           </a:p>
         </p:txBody>
       </p:sp>
     </p:spTree>
     <p:extLst>
       <p:ext uri="{BB962C8B-B14F-4D97-AF65-F5344CB8AC3E}">
-        <p14:creationId xmlns:p14="http://schemas.microsoft.com/office/powerpoint/2010/main" val="3195247172"/>
+        <p14:creationId xmlns:p14="http://schemas.microsoft.com/office/powerpoint/2010/main" val="2296820659"/>
       </p:ext>
     </p:extLst>
   </p:cSld>
@@ -4733,70 +4995,8 @@
           <a:lstStyle/>
           <a:p>
             <a:r>
-              <a:rPr lang="en-US" dirty="0"/>
-              <a:t>Continuous Tracking</a:t>
-            </a:r>
-          </a:p>
-        </p:txBody>
-      </p:sp>
-      <p:sp>
-        <p:nvSpPr>
-          <p:cNvPr id="3" name="Content Placeholder 2"/>
-          <p:cNvSpPr>
-            <a:spLocks noGrp="1"/>
-          </p:cNvSpPr>
-          <p:nvPr>
-            <p:ph idx="1"/>
-          </p:nvPr>
-        </p:nvSpPr>
-        <p:spPr/>
-        <p:txBody>
-          <a:bodyPr/>
-          <a:lstStyle/>
-          <a:p>
-            <a:r>
-              <a:rPr lang="en-US" dirty="0"/>
-              <a:t>Report Interval</a:t>
-            </a:r>
-          </a:p>
-          <a:p>
-            <a:r>
-              <a:rPr lang="en-US" dirty="0"/>
-              <a:t>Movement Interval</a:t>
-            </a:r>
-          </a:p>
-          <a:p>
-            <a:r>
-              <a:rPr lang="en-US" dirty="0"/>
-              <a:t>Uses</a:t>
-            </a:r>
-          </a:p>
-          <a:p>
-            <a:pPr lvl="1"/>
-            <a:r>
-              <a:rPr lang="en-US" dirty="0"/>
-              <a:t>Running</a:t>
-            </a:r>
-          </a:p>
-          <a:p>
-            <a:pPr lvl="1"/>
-            <a:r>
-              <a:rPr lang="en-US" dirty="0"/>
-              <a:t>Mt. Biking</a:t>
-            </a:r>
-          </a:p>
-          <a:p>
-            <a:pPr lvl="1"/>
-            <a:r>
-              <a:rPr lang="en-US" dirty="0"/>
-              <a:t>Exercising</a:t>
-            </a:r>
-          </a:p>
-          <a:p>
-            <a:pPr lvl="1"/>
-            <a:r>
               <a:rPr lang="en-US" dirty="0" smtClean="0"/>
-              <a:t>Navigation</a:t>
+              <a:t>Location</a:t>
             </a:r>
             <a:endParaRPr lang="en-US" dirty="0"/>
           </a:p>
@@ -4805,7 +5005,7 @@
     </p:spTree>
     <p:extLst>
       <p:ext uri="{BB962C8B-B14F-4D97-AF65-F5344CB8AC3E}">
-        <p14:creationId xmlns:p14="http://schemas.microsoft.com/office/powerpoint/2010/main" val="2047251107"/>
+        <p14:creationId xmlns:p14="http://schemas.microsoft.com/office/powerpoint/2010/main" val="184170357"/>
       </p:ext>
     </p:extLst>
   </p:cSld>
@@ -4849,7 +5049,7 @@
           <a:p>
             <a:r>
               <a:rPr lang="en-US" dirty="0"/>
-              <a:t>Best Practices</a:t>
+              <a:t>Single Shot Location</a:t>
             </a:r>
           </a:p>
         </p:txBody>
@@ -4870,48 +5070,58 @@
           <a:lstStyle/>
           <a:p>
             <a:r>
-              <a:rPr lang="en-US" dirty="0"/>
-              <a:t>Use </a:t>
-            </a:r>
-            <a:r>
               <a:rPr lang="en-US" dirty="0" err="1"/>
-              <a:t>Geolocator.StatusChanged</a:t>
-            </a:r>
-            <a:r>
-              <a:rPr lang="en-US" dirty="0"/>
-              <a:t> to provide progress feedback to the user</a:t>
-            </a:r>
-          </a:p>
-          <a:p>
-            <a:r>
-              <a:rPr lang="en-US" dirty="0"/>
-              <a:t>Consider Battery Life</a:t>
-            </a:r>
-          </a:p>
-          <a:p>
-            <a:r>
-              <a:rPr lang="en-US" dirty="0"/>
-              <a:t>Personally Identifiable Information</a:t>
+              <a:t>Geolocator.DesiredAccuracy</a:t>
+            </a:r>
+            <a:endParaRPr lang="en-US" dirty="0"/>
+          </a:p>
+          <a:p>
+            <a:r>
+              <a:rPr lang="en-US" dirty="0"/>
+              <a:t>Uses</a:t>
             </a:r>
           </a:p>
           <a:p>
             <a:pPr lvl="1"/>
             <a:r>
               <a:rPr lang="en-US" dirty="0"/>
-              <a:t>Oh, Behave</a:t>
-            </a:r>
-            <a:r>
-              <a:rPr lang="en-US" dirty="0" smtClean="0"/>
-              <a:t>!!!</a:t>
-            </a:r>
-            <a:endParaRPr lang="en-US" dirty="0"/>
+              <a:t>Check-In’s</a:t>
+            </a:r>
+          </a:p>
+          <a:p>
+            <a:pPr lvl="1"/>
+            <a:r>
+              <a:rPr lang="en-US" dirty="0"/>
+              <a:t>Placing a geocache</a:t>
+            </a:r>
+          </a:p>
+          <a:p>
+            <a:pPr lvl="1"/>
+            <a:r>
+              <a:rPr lang="en-US" dirty="0"/>
+              <a:t>Where am I?</a:t>
+            </a:r>
+          </a:p>
+          <a:p>
+            <a:pPr lvl="1"/>
+            <a:r>
+              <a:rPr lang="en-US" dirty="0"/>
+              <a:t>Where did I park?</a:t>
+            </a:r>
+          </a:p>
+          <a:p>
+            <a:pPr lvl="1"/>
+            <a:r>
+              <a:rPr lang="en-US" dirty="0"/>
+              <a:t>What country am I in?</a:t>
+            </a:r>
           </a:p>
         </p:txBody>
       </p:sp>
     </p:spTree>
     <p:extLst>
       <p:ext uri="{BB962C8B-B14F-4D97-AF65-F5344CB8AC3E}">
-        <p14:creationId xmlns:p14="http://schemas.microsoft.com/office/powerpoint/2010/main" val="2901988321"/>
+        <p14:creationId xmlns:p14="http://schemas.microsoft.com/office/powerpoint/2010/main" val="3195247172"/>
       </p:ext>
     </p:extLst>
   </p:cSld>
@@ -4954,8 +5164,70 @@
           <a:lstStyle/>
           <a:p>
             <a:r>
+              <a:rPr lang="en-US" dirty="0"/>
+              <a:t>Continuous Tracking</a:t>
+            </a:r>
+          </a:p>
+        </p:txBody>
+      </p:sp>
+      <p:sp>
+        <p:nvSpPr>
+          <p:cNvPr id="3" name="Content Placeholder 2"/>
+          <p:cNvSpPr>
+            <a:spLocks noGrp="1"/>
+          </p:cNvSpPr>
+          <p:nvPr>
+            <p:ph idx="1"/>
+          </p:nvPr>
+        </p:nvSpPr>
+        <p:spPr/>
+        <p:txBody>
+          <a:bodyPr/>
+          <a:lstStyle/>
+          <a:p>
+            <a:r>
+              <a:rPr lang="en-US" dirty="0"/>
+              <a:t>Report Interval</a:t>
+            </a:r>
+          </a:p>
+          <a:p>
+            <a:r>
+              <a:rPr lang="en-US" dirty="0"/>
+              <a:t>Movement Interval</a:t>
+            </a:r>
+          </a:p>
+          <a:p>
+            <a:r>
+              <a:rPr lang="en-US" dirty="0"/>
+              <a:t>Uses</a:t>
+            </a:r>
+          </a:p>
+          <a:p>
+            <a:pPr lvl="1"/>
+            <a:r>
+              <a:rPr lang="en-US" dirty="0"/>
+              <a:t>Running</a:t>
+            </a:r>
+          </a:p>
+          <a:p>
+            <a:pPr lvl="1"/>
+            <a:r>
+              <a:rPr lang="en-US" dirty="0"/>
+              <a:t>Mt. Biking</a:t>
+            </a:r>
+          </a:p>
+          <a:p>
+            <a:pPr lvl="1"/>
+            <a:r>
+              <a:rPr lang="en-US" dirty="0"/>
+              <a:t>Exercising</a:t>
+            </a:r>
+          </a:p>
+          <a:p>
+            <a:pPr lvl="1"/>
+            <a:r>
               <a:rPr lang="en-US" dirty="0" smtClean="0"/>
-              <a:t>Cortana</a:t>
+              <a:t>Navigation</a:t>
             </a:r>
             <a:endParaRPr lang="en-US" dirty="0"/>
           </a:p>
@@ -4964,7 +5236,7 @@
     </p:spTree>
     <p:extLst>
       <p:ext uri="{BB962C8B-B14F-4D97-AF65-F5344CB8AC3E}">
-        <p14:creationId xmlns:p14="http://schemas.microsoft.com/office/powerpoint/2010/main" val="977365699"/>
+        <p14:creationId xmlns:p14="http://schemas.microsoft.com/office/powerpoint/2010/main" val="2047251107"/>
       </p:ext>
     </p:extLst>
   </p:cSld>
@@ -5007,10 +5279,9 @@
           <a:lstStyle/>
           <a:p>
             <a:r>
-              <a:rPr lang="en-US" dirty="0" smtClean="0"/>
-              <a:t>UWP Cortana (Speech) API</a:t>
-            </a:r>
-            <a:endParaRPr lang="en-US" dirty="0"/>
+              <a:rPr lang="en-US" dirty="0"/>
+              <a:t>Best Practices</a:t>
+            </a:r>
           </a:p>
         </p:txBody>
       </p:sp>
@@ -5031,57 +5302,38 @@
           <a:p>
             <a:r>
               <a:rPr lang="en-US" dirty="0"/>
-              <a:t>Voice Commands</a:t>
+              <a:t>Use </a:t>
+            </a:r>
+            <a:r>
+              <a:rPr lang="en-US" dirty="0" err="1"/>
+              <a:t>Geolocator.StatusChanged</a:t>
+            </a:r>
+            <a:r>
+              <a:rPr lang="en-US" dirty="0"/>
+              <a:t> to provide progress feedback to the user</a:t>
+            </a:r>
+          </a:p>
+          <a:p>
+            <a:r>
+              <a:rPr lang="en-US" dirty="0"/>
+              <a:t>Consider Battery Life</a:t>
+            </a:r>
+          </a:p>
+          <a:p>
+            <a:r>
+              <a:rPr lang="en-US" dirty="0"/>
+              <a:t>Personally Identifiable Information</a:t>
             </a:r>
           </a:p>
           <a:p>
             <a:pPr lvl="1"/>
             <a:r>
               <a:rPr lang="en-US" dirty="0"/>
-              <a:t>VCD.xml file</a:t>
-            </a:r>
-          </a:p>
-          <a:p>
-            <a:pPr lvl="1"/>
-            <a:r>
-              <a:rPr lang="en-US" dirty="0"/>
-              <a:t>Used to </a:t>
+              <a:t>Oh, Behave</a:t>
             </a:r>
             <a:r>
               <a:rPr lang="en-US" dirty="0" smtClean="0"/>
-              <a:t>launch Apps (Deep Link)</a:t>
-            </a:r>
-          </a:p>
-          <a:p>
-            <a:pPr lvl="1"/>
-            <a:r>
-              <a:rPr lang="en-US" dirty="0" smtClean="0"/>
-              <a:t>Used to display information provided by </a:t>
-            </a:r>
-            <a:r>
-              <a:rPr lang="en-US" dirty="0" err="1" smtClean="0"/>
-              <a:t>VoiceCommandService</a:t>
-            </a:r>
-            <a:endParaRPr lang="en-US" dirty="0"/>
-          </a:p>
-          <a:p>
-            <a:r>
-              <a:rPr lang="en-US" dirty="0"/>
-              <a:t>Speech Recognition</a:t>
-            </a:r>
-          </a:p>
-          <a:p>
-            <a:r>
-              <a:rPr lang="en-US" dirty="0" smtClean="0"/>
-              <a:t>Text-To-Speech </a:t>
-            </a:r>
-            <a:r>
-              <a:rPr lang="en-US" dirty="0"/>
-              <a:t>(TTS</a:t>
-            </a:r>
-            <a:r>
-              <a:rPr lang="en-US" dirty="0" smtClean="0"/>
-              <a:t>)</a:t>
+              <a:t>!!!</a:t>
             </a:r>
             <a:endParaRPr lang="en-US" dirty="0"/>
           </a:p>
@@ -5090,7 +5342,7 @@
     </p:spTree>
     <p:extLst>
       <p:ext uri="{BB962C8B-B14F-4D97-AF65-F5344CB8AC3E}">
-        <p14:creationId xmlns:p14="http://schemas.microsoft.com/office/powerpoint/2010/main" val="3601383397"/>
+        <p14:creationId xmlns:p14="http://schemas.microsoft.com/office/powerpoint/2010/main" val="2901988321"/>
       </p:ext>
     </p:extLst>
   </p:cSld>
@@ -5134,78 +5386,8 @@
           <a:p>
             <a:r>
               <a:rPr lang="en-US" dirty="0" smtClean="0"/>
-              <a:t>Voice Commands</a:t>
-            </a:r>
-            <a:endParaRPr lang="en-US" dirty="0"/>
-          </a:p>
-        </p:txBody>
-      </p:sp>
-      <p:sp>
-        <p:nvSpPr>
-          <p:cNvPr id="3" name="Content Placeholder 2"/>
-          <p:cNvSpPr>
-            <a:spLocks noGrp="1"/>
-          </p:cNvSpPr>
-          <p:nvPr>
-            <p:ph idx="1"/>
-          </p:nvPr>
-        </p:nvSpPr>
-        <p:spPr/>
-        <p:txBody>
-          <a:bodyPr/>
-          <a:lstStyle/>
-          <a:p>
-            <a:r>
-              <a:rPr lang="en-US" dirty="0"/>
-              <a:t>Create VCD.xml File</a:t>
-            </a:r>
-          </a:p>
-          <a:p>
-            <a:r>
-              <a:rPr lang="en-US" dirty="0"/>
-              <a:t>Register VCD File</a:t>
-            </a:r>
-          </a:p>
-          <a:p>
-            <a:r>
-              <a:rPr lang="en-US" dirty="0"/>
-              <a:t>Update Phrase Lists</a:t>
-            </a:r>
-          </a:p>
-          <a:p>
-            <a:r>
-              <a:rPr lang="en-US" dirty="0" smtClean="0"/>
-              <a:t>Declare Dictation Phrase Topics</a:t>
-            </a:r>
-            <a:endParaRPr lang="en-US" dirty="0"/>
-          </a:p>
-          <a:p>
-            <a:r>
-              <a:rPr lang="en-US" dirty="0"/>
-              <a:t>Declare Capabilities in </a:t>
-            </a:r>
-            <a:r>
-              <a:rPr lang="en-US" smtClean="0"/>
-              <a:t>Package.appxmanifest</a:t>
-            </a:r>
-            <a:endParaRPr lang="en-US" dirty="0"/>
-          </a:p>
-          <a:p>
-            <a:pPr lvl="1"/>
-            <a:r>
-              <a:rPr lang="en-US" dirty="0"/>
-              <a:t>Microphone</a:t>
-            </a:r>
-          </a:p>
-          <a:p>
-            <a:pPr lvl="1"/>
-            <a:r>
-              <a:rPr lang="en-US" dirty="0" smtClean="0"/>
-              <a:t>Internet</a:t>
-            </a:r>
-            <a:endParaRPr lang="en-US" dirty="0"/>
-          </a:p>
-          <a:p>
+              <a:t>Cortana</a:t>
+            </a:r>
             <a:endParaRPr lang="en-US" dirty="0"/>
           </a:p>
         </p:txBody>
@@ -5213,7 +5395,7 @@
     </p:spTree>
     <p:extLst>
       <p:ext uri="{BB962C8B-B14F-4D97-AF65-F5344CB8AC3E}">
-        <p14:creationId xmlns:p14="http://schemas.microsoft.com/office/powerpoint/2010/main" val="989318782"/>
+        <p14:creationId xmlns:p14="http://schemas.microsoft.com/office/powerpoint/2010/main" val="977365699"/>
       </p:ext>
     </p:extLst>
   </p:cSld>

</xml_diff>

<commit_message>
-Updated Location to support continuous demo -Changed some header sizes -Updated slides
</commit_message>
<xml_diff>
--- a/Hey Cortana, Where Am I.pptx
+++ b/Hey Cortana, Where Am I.pptx
@@ -2637,6 +2637,13 @@
   <p:clrMapOvr>
     <a:masterClrMapping/>
   </p:clrMapOvr>
+  <p:timing>
+    <p:tnLst>
+      <p:par>
+        <p:cTn id="1" dur="indefinite" restart="never" nodeType="tmRoot"/>
+      </p:par>
+    </p:tnLst>
+  </p:timing>
 </p:sld>
 </file>
 
@@ -2760,6 +2767,13 @@
   <p:clrMapOvr>
     <a:masterClrMapping/>
   </p:clrMapOvr>
+  <p:timing>
+    <p:tnLst>
+      <p:par>
+        <p:cTn id="1" dur="indefinite" restart="never" nodeType="tmRoot"/>
+      </p:par>
+    </p:tnLst>
+  </p:timing>
 </p:sld>
 </file>
 
@@ -3139,6 +3153,13 @@
   <p:clrMapOvr>
     <a:masterClrMapping/>
   </p:clrMapOvr>
+  <p:timing>
+    <p:tnLst>
+      <p:par>
+        <p:cTn id="1" dur="indefinite" restart="never" nodeType="tmRoot"/>
+      </p:par>
+    </p:tnLst>
+  </p:timing>
 </p:sld>
 </file>
 
@@ -3199,7 +3220,7 @@
         <p:spPr/>
         <p:txBody>
           <a:bodyPr>
-            <a:normAutofit lnSpcReduction="10000"/>
+            <a:normAutofit/>
           </a:bodyPr>
           <a:lstStyle/>
           <a:p>
@@ -3207,7 +3228,7 @@
               <a:buNone/>
             </a:pPr>
             <a:r>
-              <a:rPr lang="en-US" sz="2000" dirty="0" err="1" smtClean="0">
+              <a:rPr lang="en-US" sz="1800" dirty="0" err="1" smtClean="0">
                 <a:solidFill>
                   <a:srgbClr val="0000FF"/>
                 </a:solidFill>
@@ -3219,7 +3240,7 @@
               <a:t>var</a:t>
             </a:r>
             <a:r>
-              <a:rPr lang="en-US" sz="2000" dirty="0" smtClean="0">
+              <a:rPr lang="en-US" sz="1800" dirty="0" smtClean="0">
                 <a:solidFill>
                   <a:srgbClr val="0000FF"/>
                 </a:solidFill>
@@ -3231,7 +3252,7 @@
               <a:t> </a:t>
             </a:r>
             <a:r>
-              <a:rPr lang="en-US" sz="2000" dirty="0" err="1" smtClean="0">
+              <a:rPr lang="en-US" sz="1800" dirty="0" err="1" smtClean="0">
                 <a:solidFill>
                   <a:srgbClr val="000000"/>
                 </a:solidFill>
@@ -3243,7 +3264,7 @@
               <a:t>speechRecognizer</a:t>
             </a:r>
             <a:r>
-              <a:rPr lang="en-US" sz="2000" dirty="0" smtClean="0">
+              <a:rPr lang="en-US" sz="1800" dirty="0" smtClean="0">
                 <a:solidFill>
                   <a:srgbClr val="000000"/>
                 </a:solidFill>
@@ -3255,7 +3276,7 @@
               <a:t> = </a:t>
             </a:r>
             <a:r>
-              <a:rPr lang="en-US" sz="2000" dirty="0" smtClean="0">
+              <a:rPr lang="en-US" sz="1800" dirty="0" smtClean="0">
                 <a:solidFill>
                   <a:srgbClr val="0000FF"/>
                 </a:solidFill>
@@ -3267,7 +3288,7 @@
               <a:t>new</a:t>
             </a:r>
             <a:r>
-              <a:rPr lang="en-US" sz="2000" dirty="0" smtClean="0">
+              <a:rPr lang="en-US" sz="1800" dirty="0" smtClean="0">
                 <a:solidFill>
                   <a:srgbClr val="000000"/>
                 </a:solidFill>
@@ -3279,7 +3300,7 @@
               <a:t> </a:t>
             </a:r>
             <a:r>
-              <a:rPr lang="en-US" sz="2000" dirty="0" err="1">
+              <a:rPr lang="en-US" sz="1800" dirty="0" err="1">
                 <a:solidFill>
                   <a:srgbClr val="2B91AF"/>
                 </a:solidFill>
@@ -3291,7 +3312,7 @@
               <a:t>SpeechRecognizer</a:t>
             </a:r>
             <a:r>
-              <a:rPr lang="en-US" sz="2000" dirty="0">
+              <a:rPr lang="en-US" sz="1800" dirty="0">
                 <a:solidFill>
                   <a:srgbClr val="000000"/>
                 </a:solidFill>
@@ -3303,7 +3324,7 @@
               <a:t>( </a:t>
             </a:r>
             <a:r>
-              <a:rPr lang="en-US" sz="2000" dirty="0" err="1">
+              <a:rPr lang="en-US" sz="1800" dirty="0" err="1">
                 <a:solidFill>
                   <a:srgbClr val="000000"/>
                 </a:solidFill>
@@ -3315,7 +3336,7 @@
               <a:t>Windows.Globalization.</a:t>
             </a:r>
             <a:r>
-              <a:rPr lang="en-US" sz="2000" dirty="0" err="1">
+              <a:rPr lang="en-US" sz="1800" dirty="0" err="1">
                 <a:solidFill>
                   <a:srgbClr val="2B91AF"/>
                 </a:solidFill>
@@ -3327,7 +3348,7 @@
               <a:t>Language</a:t>
             </a:r>
             <a:r>
-              <a:rPr lang="en-US" sz="2000" dirty="0">
+              <a:rPr lang="en-US" sz="1800" dirty="0">
                 <a:solidFill>
                   <a:srgbClr val="000000"/>
                 </a:solidFill>
@@ -3338,14 +3359,14 @@
               </a:rPr>
               <a:t> )</a:t>
             </a:r>
-            <a:endParaRPr lang="en-US" dirty="0" smtClean="0"/>
+            <a:endParaRPr lang="en-US" sz="2000" dirty="0" smtClean="0"/>
           </a:p>
           <a:p>
             <a:pPr marL="0" indent="0">
               <a:buNone/>
             </a:pPr>
             <a:r>
-              <a:rPr lang="en-US" sz="2000" dirty="0" err="1" smtClean="0">
+              <a:rPr lang="en-US" sz="1800" dirty="0" err="1" smtClean="0">
                 <a:solidFill>
                   <a:srgbClr val="000000"/>
                 </a:solidFill>
@@ -3357,7 +3378,7 @@
               <a:t>speechRecognizer.Constraints.Add</a:t>
             </a:r>
             <a:r>
-              <a:rPr lang="en-US" sz="2000" dirty="0" smtClean="0">
+              <a:rPr lang="en-US" sz="1800" dirty="0" smtClean="0">
                 <a:solidFill>
                   <a:srgbClr val="000000"/>
                 </a:solidFill>
@@ -3369,7 +3390,7 @@
               <a:t>(</a:t>
             </a:r>
             <a:r>
-              <a:rPr lang="en-US" sz="2000" dirty="0" err="1" smtClean="0">
+              <a:rPr lang="en-US" sz="1800" dirty="0" err="1" smtClean="0">
                 <a:solidFill>
                   <a:srgbClr val="000000"/>
                 </a:solidFill>
@@ -3381,7 +3402,7 @@
               <a:t>commandConstraint</a:t>
             </a:r>
             <a:r>
-              <a:rPr lang="en-US" sz="2000" dirty="0">
+              <a:rPr lang="en-US" sz="1800" dirty="0">
                 <a:solidFill>
                   <a:srgbClr val="000000"/>
                 </a:solidFill>
@@ -3392,12 +3413,12 @@
               </a:rPr>
               <a:t>)</a:t>
             </a:r>
-            <a:endParaRPr lang="en-US" sz="2000" dirty="0" smtClean="0"/>
+            <a:endParaRPr lang="en-US" sz="1800" dirty="0" smtClean="0"/>
           </a:p>
           <a:p>
             <a:pPr lvl="1"/>
             <a:r>
-              <a:rPr lang="en-US" dirty="0" smtClean="0"/>
+              <a:rPr lang="en-US" sz="2000" dirty="0" smtClean="0"/>
               <a:t>Optional to add constraints</a:t>
             </a:r>
           </a:p>
@@ -3406,7 +3427,7 @@
               <a:buNone/>
             </a:pPr>
             <a:r>
-              <a:rPr lang="en-US" sz="2000" dirty="0" smtClean="0">
+              <a:rPr lang="en-US" sz="1800" dirty="0" smtClean="0">
                 <a:solidFill>
                   <a:srgbClr val="0000FF"/>
                 </a:solidFill>
@@ -3418,7 +3439,7 @@
               <a:t>await </a:t>
             </a:r>
             <a:r>
-              <a:rPr lang="en-US" sz="2000" dirty="0" err="1" smtClean="0">
+              <a:rPr lang="en-US" sz="1800" dirty="0" err="1" smtClean="0">
                 <a:solidFill>
                   <a:srgbClr val="000000"/>
                 </a:solidFill>
@@ -3430,7 +3451,7 @@
               <a:t>speechRecognizerCaptainsLogCommand.CompileConstraintsAsync</a:t>
             </a:r>
             <a:r>
-              <a:rPr lang="en-US" sz="2000" dirty="0">
+              <a:rPr lang="en-US" sz="1800" dirty="0">
                 <a:solidFill>
                   <a:srgbClr val="000000"/>
                 </a:solidFill>
@@ -3441,12 +3462,12 @@
               </a:rPr>
               <a:t>()</a:t>
             </a:r>
-            <a:endParaRPr lang="en-US" sz="2000" dirty="0" smtClean="0"/>
+            <a:endParaRPr lang="en-US" sz="1800" dirty="0" smtClean="0"/>
           </a:p>
           <a:p>
             <a:pPr lvl="1"/>
             <a:r>
-              <a:rPr lang="en-US" dirty="0" smtClean="0"/>
+              <a:rPr lang="en-US" sz="2000" dirty="0" smtClean="0"/>
               <a:t>Even if no constraints were added</a:t>
             </a:r>
           </a:p>
@@ -3455,7 +3476,7 @@
               <a:buNone/>
             </a:pPr>
             <a:r>
-              <a:rPr lang="en-US" sz="2000" dirty="0" err="1" smtClean="0">
+              <a:rPr lang="en-US" sz="1800" dirty="0" err="1" smtClean="0">
                 <a:solidFill>
                   <a:srgbClr val="2B91AF"/>
                 </a:solidFill>
@@ -3467,7 +3488,7 @@
               <a:t>SpeechRecognitionResult</a:t>
             </a:r>
             <a:r>
-              <a:rPr lang="en-US" sz="2000" dirty="0" smtClean="0">
+              <a:rPr lang="en-US" sz="1800" dirty="0" smtClean="0">
                 <a:solidFill>
                   <a:srgbClr val="000000"/>
                 </a:solidFill>
@@ -3479,7 +3500,7 @@
               <a:t> </a:t>
             </a:r>
             <a:r>
-              <a:rPr lang="en-US" sz="2000" dirty="0">
+              <a:rPr lang="en-US" sz="1800" dirty="0">
                 <a:solidFill>
                   <a:srgbClr val="000000"/>
                 </a:solidFill>
@@ -3490,7 +3511,7 @@
               </a:rPr>
               <a:t>result = </a:t>
             </a:r>
-            <a:endParaRPr lang="en-US" sz="2000" dirty="0" smtClean="0">
+            <a:endParaRPr lang="en-US" sz="1800" dirty="0" smtClean="0">
               <a:solidFill>
                 <a:srgbClr val="000000"/>
               </a:solidFill>
@@ -3505,7 +3526,7 @@
               <a:buNone/>
             </a:pPr>
             <a:r>
-              <a:rPr lang="en-US" sz="2000" dirty="0">
+              <a:rPr lang="en-US" sz="1800" dirty="0">
                 <a:solidFill>
                   <a:srgbClr val="000000"/>
                 </a:solidFill>
@@ -3517,7 +3538,7 @@
               <a:t>	</a:t>
             </a:r>
             <a:r>
-              <a:rPr lang="en-US" sz="2000" dirty="0" smtClean="0">
+              <a:rPr lang="en-US" sz="1800" dirty="0" smtClean="0">
                 <a:solidFill>
                   <a:srgbClr val="0000FF"/>
                 </a:solidFill>
@@ -3529,7 +3550,7 @@
               <a:t>await</a:t>
             </a:r>
             <a:r>
-              <a:rPr lang="en-US" sz="2000" dirty="0" smtClean="0">
+              <a:rPr lang="en-US" sz="1800" dirty="0" smtClean="0">
                 <a:solidFill>
                   <a:srgbClr val="000000"/>
                 </a:solidFill>
@@ -3541,7 +3562,7 @@
               <a:t> </a:t>
             </a:r>
             <a:r>
-              <a:rPr lang="en-US" sz="2000" dirty="0" err="1">
+              <a:rPr lang="en-US" sz="1800" dirty="0" err="1">
                 <a:solidFill>
                   <a:srgbClr val="000000"/>
                 </a:solidFill>
@@ -3553,7 +3574,7 @@
               <a:t>speechRecognizerCaptainsLogCommand.RecognizeAsync</a:t>
             </a:r>
             <a:r>
-              <a:rPr lang="en-US" sz="2000" dirty="0">
+              <a:rPr lang="en-US" sz="1800" dirty="0">
                 <a:solidFill>
                   <a:srgbClr val="000000"/>
                 </a:solidFill>
@@ -3564,26 +3585,26 @@
               </a:rPr>
               <a:t>()</a:t>
             </a:r>
-            <a:endParaRPr lang="en-US" dirty="0" smtClean="0"/>
+            <a:endParaRPr lang="en-US" sz="2000" dirty="0" smtClean="0"/>
           </a:p>
           <a:p>
             <a:pPr lvl="1"/>
             <a:r>
-              <a:rPr lang="en-US" dirty="0" smtClean="0"/>
+              <a:rPr lang="en-US" sz="2000" dirty="0" smtClean="0"/>
               <a:t>Or </a:t>
             </a:r>
             <a:r>
-              <a:rPr lang="en-US" dirty="0" err="1" smtClean="0"/>
+              <a:rPr lang="en-US" sz="2000" dirty="0" err="1" smtClean="0"/>
               <a:t>RecognizeWithUIAsync</a:t>
             </a:r>
-            <a:endParaRPr lang="en-US" dirty="0" smtClean="0"/>
+            <a:endParaRPr lang="en-US" sz="2000" dirty="0" smtClean="0"/>
           </a:p>
           <a:p>
             <a:pPr marL="0" indent="0">
               <a:buNone/>
             </a:pPr>
             <a:r>
-              <a:rPr lang="en-US" sz="2000" dirty="0" smtClean="0">
+              <a:rPr lang="en-US" sz="1800" dirty="0" smtClean="0">
                 <a:solidFill>
                   <a:srgbClr val="0000FF"/>
                 </a:solidFill>
@@ -3595,7 +3616,7 @@
               <a:t>if</a:t>
             </a:r>
             <a:r>
-              <a:rPr lang="en-US" sz="2000" dirty="0" smtClean="0">
+              <a:rPr lang="en-US" sz="1800" dirty="0" smtClean="0">
                 <a:solidFill>
                   <a:srgbClr val="000000"/>
                 </a:solidFill>
@@ -3607,7 +3628,7 @@
               <a:t> ( </a:t>
             </a:r>
             <a:r>
-              <a:rPr lang="en-US" sz="2000" dirty="0" err="1" smtClean="0">
+              <a:rPr lang="en-US" sz="1800" dirty="0" err="1" smtClean="0">
                 <a:solidFill>
                   <a:srgbClr val="000000"/>
                 </a:solidFill>
@@ -3619,7 +3640,7 @@
               <a:t>dictationResult.Status</a:t>
             </a:r>
             <a:r>
-              <a:rPr lang="en-US" sz="2000" dirty="0" smtClean="0">
+              <a:rPr lang="en-US" sz="1800" dirty="0" smtClean="0">
                 <a:solidFill>
                   <a:srgbClr val="000000"/>
                 </a:solidFill>
@@ -3631,7 +3652,7 @@
               <a:t> == </a:t>
             </a:r>
             <a:r>
-              <a:rPr lang="en-US" sz="2000" dirty="0" err="1" smtClean="0">
+              <a:rPr lang="en-US" sz="1800" dirty="0" err="1" smtClean="0">
                 <a:solidFill>
                   <a:srgbClr val="2B91AF"/>
                 </a:solidFill>
@@ -3643,7 +3664,7 @@
               <a:t>SpeechRecognitionResultStatus</a:t>
             </a:r>
             <a:r>
-              <a:rPr lang="en-US" sz="2000" dirty="0" err="1" smtClean="0">
+              <a:rPr lang="en-US" sz="1800" dirty="0" err="1" smtClean="0">
                 <a:solidFill>
                   <a:srgbClr val="000000"/>
                 </a:solidFill>
@@ -3654,7 +3675,7 @@
               </a:rPr>
               <a:t>.Success</a:t>
             </a:r>
-            <a:endParaRPr lang="en-US" sz="2000" dirty="0" smtClean="0">
+            <a:endParaRPr lang="en-US" sz="1800" dirty="0" smtClean="0">
               <a:solidFill>
                 <a:srgbClr val="000000"/>
               </a:solidFill>
@@ -3669,7 +3690,7 @@
               <a:buNone/>
             </a:pPr>
             <a:r>
-              <a:rPr lang="en-US" sz="2000" dirty="0" smtClean="0">
+              <a:rPr lang="en-US" sz="1800" dirty="0" smtClean="0">
                 <a:solidFill>
                   <a:srgbClr val="000000"/>
                 </a:solidFill>
@@ -3681,7 +3702,7 @@
               <a:t>	&amp;&amp; </a:t>
             </a:r>
             <a:r>
-              <a:rPr lang="en-US" sz="2000" dirty="0" err="1">
+              <a:rPr lang="en-US" sz="1800" dirty="0" err="1">
                 <a:solidFill>
                   <a:srgbClr val="000000"/>
                 </a:solidFill>
@@ -3693,7 +3714,7 @@
               <a:t>dictationResult.Confidence</a:t>
             </a:r>
             <a:r>
-              <a:rPr lang="en-US" sz="2000" dirty="0">
+              <a:rPr lang="en-US" sz="1800" dirty="0">
                 <a:solidFill>
                   <a:srgbClr val="000000"/>
                 </a:solidFill>
@@ -3705,7 +3726,7 @@
               <a:t> == </a:t>
             </a:r>
             <a:r>
-              <a:rPr lang="en-US" sz="2000" dirty="0" err="1">
+              <a:rPr lang="en-US" sz="1800" dirty="0" err="1">
                 <a:solidFill>
                   <a:srgbClr val="2B91AF"/>
                 </a:solidFill>
@@ -3717,7 +3738,7 @@
               <a:t>SpeechRecognitionConfidence</a:t>
             </a:r>
             <a:r>
-              <a:rPr lang="en-US" sz="2000" dirty="0" err="1">
+              <a:rPr lang="en-US" sz="1800" dirty="0" err="1">
                 <a:solidFill>
                   <a:srgbClr val="000000"/>
                 </a:solidFill>
@@ -3728,14 +3749,14 @@
               </a:rPr>
               <a:t>.Rejected</a:t>
             </a:r>
-            <a:endParaRPr lang="en-US" dirty="0" smtClean="0"/>
+            <a:endParaRPr lang="en-US" sz="2000" dirty="0" smtClean="0"/>
           </a:p>
           <a:p>
             <a:pPr marL="0" indent="0">
               <a:buNone/>
             </a:pPr>
             <a:r>
-              <a:rPr lang="en-US" sz="1600" dirty="0" smtClean="0">
+              <a:rPr lang="en-US" sz="1400" dirty="0" smtClean="0">
                 <a:solidFill>
                   <a:srgbClr val="000000"/>
                 </a:solidFill>
@@ -3752,7 +3773,7 @@
               <a:buNone/>
             </a:pPr>
             <a:r>
-              <a:rPr lang="en-US" sz="2000" dirty="0" smtClean="0">
+              <a:rPr lang="en-US" sz="1800" dirty="0" smtClean="0">
                 <a:solidFill>
                   <a:srgbClr val="000000"/>
                 </a:solidFill>
@@ -3764,7 +3785,7 @@
               <a:t>	</a:t>
             </a:r>
             <a:r>
-              <a:rPr lang="en-US" sz="2000" b="1" dirty="0" err="1" smtClean="0">
+              <a:rPr lang="en-US" sz="1800" b="1" dirty="0" err="1" smtClean="0">
                 <a:solidFill>
                   <a:srgbClr val="000000"/>
                 </a:solidFill>
@@ -3775,7 +3796,7 @@
               </a:rPr>
               <a:t>result.Text</a:t>
             </a:r>
-            <a:endParaRPr lang="en-US" sz="2000" b="1" dirty="0" smtClean="0">
+            <a:endParaRPr lang="en-US" sz="1800" b="1" dirty="0" smtClean="0">
               <a:solidFill>
                 <a:srgbClr val="000000"/>
               </a:solidFill>
@@ -3790,7 +3811,7 @@
               <a:buNone/>
             </a:pPr>
             <a:r>
-              <a:rPr lang="en-US" sz="1600" dirty="0" smtClean="0">
+              <a:rPr lang="en-US" sz="1400" dirty="0" smtClean="0">
                 <a:solidFill>
                   <a:srgbClr val="000000"/>
                 </a:solidFill>
@@ -3801,7 +3822,7 @@
               </a:rPr>
               <a:t>}</a:t>
             </a:r>
-            <a:endParaRPr lang="en-US" sz="1600" dirty="0"/>
+            <a:endParaRPr lang="en-US" sz="1400" dirty="0"/>
           </a:p>
         </p:txBody>
       </p:sp>
@@ -3815,6 +3836,13 @@
   <p:clrMapOvr>
     <a:masterClrMapping/>
   </p:clrMapOvr>
+  <p:timing>
+    <p:tnLst>
+      <p:par>
+        <p:cTn id="1" dur="indefinite" restart="never" nodeType="tmRoot"/>
+      </p:par>
+    </p:tnLst>
+  </p:timing>
 </p:sld>
 </file>
 
@@ -4030,6 +4058,13 @@
   <p:clrMapOvr>
     <a:masterClrMapping/>
   </p:clrMapOvr>
+  <p:timing>
+    <p:tnLst>
+      <p:par>
+        <p:cTn id="1" dur="indefinite" restart="never" nodeType="tmRoot"/>
+      </p:par>
+    </p:tnLst>
+  </p:timing>
 </p:sld>
 </file>
 
@@ -4070,8 +4105,8 @@
               <a:t>Sample </a:t>
             </a:r>
             <a:r>
-              <a:rPr lang="en-US" dirty="0" err="1" smtClean="0"/>
-              <a:t>Ssml</a:t>
+              <a:rPr lang="en-US" dirty="0" smtClean="0"/>
+              <a:t>SSML (Speech Synthesis Markup Language)</a:t>
             </a:r>
             <a:endParaRPr lang="en-US" dirty="0"/>
           </a:p>
@@ -4101,11 +4136,19 @@
             </a:r>
             <a:r>
               <a:rPr lang="en-US" dirty="0" err="1"/>
-              <a:t>Ssml</a:t>
-            </a:r>
-            <a:r>
-              <a:rPr lang="en-US" dirty="0"/>
-              <a:t> =</a:t>
+              <a:t>s</a:t>
+            </a:r>
+            <a:r>
+              <a:rPr lang="en-US" dirty="0" err="1" smtClean="0"/>
+              <a:t>sml</a:t>
+            </a:r>
+            <a:r>
+              <a:rPr lang="en-US" dirty="0" smtClean="0"/>
+              <a:t> </a:t>
+            </a:r>
+            <a:r>
+              <a:rPr lang="en-US" dirty="0"/>
+              <a:t>=</a:t>
             </a:r>
           </a:p>
           <a:p>
@@ -4159,7 +4202,7 @@
               <a:t>    "Hello &lt;prosody contour='(0%,+80Hz) (10%,+80%) </a:t>
             </a:r>
             <a:r>
-              <a:rPr lang="en-US" smtClean="0"/>
+              <a:rPr lang="en-US" dirty="0" smtClean="0"/>
               <a:t>		(</a:t>
             </a:r>
             <a:r>
@@ -5012,6 +5055,13 @@
   <p:clrMapOvr>
     <a:masterClrMapping/>
   </p:clrMapOvr>
+  <p:timing>
+    <p:tnLst>
+      <p:par>
+        <p:cTn id="1" dur="indefinite" restart="never" nodeType="tmRoot"/>
+      </p:par>
+    </p:tnLst>
+  </p:timing>
 </p:sld>
 </file>
 
@@ -5128,6 +5178,13 @@
   <p:clrMapOvr>
     <a:masterClrMapping/>
   </p:clrMapOvr>
+  <p:timing>
+    <p:tnLst>
+      <p:par>
+        <p:cTn id="1" dur="indefinite" restart="never" nodeType="tmRoot"/>
+      </p:par>
+    </p:tnLst>
+  </p:timing>
 </p:sld>
 </file>
 
@@ -5243,6 +5300,13 @@
   <p:clrMapOvr>
     <a:masterClrMapping/>
   </p:clrMapOvr>
+  <p:timing>
+    <p:tnLst>
+      <p:par>
+        <p:cTn id="1" dur="indefinite" restart="never" nodeType="tmRoot"/>
+      </p:par>
+    </p:tnLst>
+  </p:timing>
 </p:sld>
 </file>
 
@@ -5349,6 +5413,13 @@
   <p:clrMapOvr>
     <a:masterClrMapping/>
   </p:clrMapOvr>
+  <p:timing>
+    <p:tnLst>
+      <p:par>
+        <p:cTn id="1" dur="indefinite" restart="never" nodeType="tmRoot"/>
+      </p:par>
+    </p:tnLst>
+  </p:timing>
 </p:sld>
 </file>
 
@@ -5402,6 +5473,13 @@
   <p:clrMapOvr>
     <a:masterClrMapping/>
   </p:clrMapOvr>
+  <p:timing>
+    <p:tnLst>
+      <p:par>
+        <p:cTn id="1" dur="indefinite" restart="never" nodeType="tmRoot"/>
+      </p:par>
+    </p:tnLst>
+  </p:timing>
 </p:sld>
 </file>
 

</xml_diff>

<commit_message>
Updated slides with research notes
</commit_message>
<xml_diff>
--- a/Hey Cortana, Where Am I.pptx
+++ b/Hey Cortana, Where Am I.pptx
@@ -21,7 +21,10 @@
     <p:sldId id="267" r:id="rId15"/>
     <p:sldId id="262" r:id="rId16"/>
     <p:sldId id="268" r:id="rId17"/>
-    <p:sldId id="266" r:id="rId18"/>
+    <p:sldId id="273" r:id="rId18"/>
+    <p:sldId id="274" r:id="rId19"/>
+    <p:sldId id="275" r:id="rId20"/>
+    <p:sldId id="266" r:id="rId21"/>
   </p:sldIdLst>
   <p:sldSz cx="12192000" cy="6858000"/>
   <p:notesSz cx="6858000" cy="9144000"/>
@@ -4102,11 +4105,7 @@
           <a:p>
             <a:r>
               <a:rPr lang="en-US" dirty="0" smtClean="0"/>
-              <a:t>Sample </a:t>
-            </a:r>
-            <a:r>
-              <a:rPr lang="en-US" dirty="0" smtClean="0"/>
-              <a:t>SSML (Speech Synthesis Markup Language)</a:t>
+              <a:t>Sample SSML (Speech Synthesis Markup Language)</a:t>
             </a:r>
             <a:endParaRPr lang="en-US" dirty="0"/>
           </a:p>
@@ -4300,336 +4299,573 @@
           <a:lstStyle/>
           <a:p>
             <a:r>
-              <a:rPr lang="en-US" dirty="0"/>
-              <a:t>Download Materials</a:t>
-            </a:r>
-          </a:p>
-        </p:txBody>
-      </p:sp>
-      <p:sp>
-        <p:nvSpPr>
-          <p:cNvPr id="4" name="TextBox 3"/>
-          <p:cNvSpPr txBox="1"/>
-          <p:nvPr/>
-        </p:nvSpPr>
-        <p:spPr>
-          <a:xfrm>
-            <a:off x="3284305" y="1359449"/>
-            <a:ext cx="5301964" cy="369332"/>
-          </a:xfrm>
-          <a:prstGeom prst="rect">
-            <a:avLst/>
-          </a:prstGeom>
-          <a:noFill/>
-        </p:spPr>
-        <p:txBody>
-          <a:bodyPr wrap="none" rtlCol="0">
-            <a:spAutoFit/>
+              <a:rPr lang="en-US" dirty="0" smtClean="0"/>
+              <a:t>My Research: Cortana</a:t>
+            </a:r>
+            <a:endParaRPr lang="en-US" dirty="0"/>
+          </a:p>
+        </p:txBody>
+      </p:sp>
+      <p:sp>
+        <p:nvSpPr>
+          <p:cNvPr id="3" name="Content Placeholder 2"/>
+          <p:cNvSpPr>
+            <a:spLocks noGrp="1"/>
+          </p:cNvSpPr>
+          <p:nvPr>
+            <p:ph idx="1"/>
+          </p:nvPr>
+        </p:nvSpPr>
+        <p:spPr/>
+        <p:txBody>
+          <a:bodyPr>
+            <a:normAutofit fontScale="70000" lnSpcReduction="20000"/>
           </a:bodyPr>
           <a:lstStyle/>
           <a:p>
             <a:r>
+              <a:rPr lang="en-US" dirty="0"/>
+              <a:t>Cortana in Win10</a:t>
+            </a:r>
+          </a:p>
+          <a:p>
+            <a:pPr lvl="1"/>
+            <a:r>
+              <a:rPr lang="en-US" dirty="0">
+                <a:hlinkClick r:id="rId2"/>
+              </a:rPr>
+              <a:t>http://</a:t>
+            </a:r>
+            <a:r>
               <a:rPr lang="en-US" dirty="0" smtClean="0">
                 <a:hlinkClick r:id="rId2"/>
               </a:rPr>
-              <a:t>http://blogs.interknowlogy.com/author/dannywarren/</a:t>
+              <a:t>blogs.msdn.com/b/arsurya/archive/2015/07/06/integrating-cortana-in-your-universal-windows-app-using-visual-studio-2015.aspx</a:t>
             </a:r>
             <a:endParaRPr lang="en-US" dirty="0"/>
           </a:p>
-        </p:txBody>
-      </p:sp>
-      <p:sp>
-        <p:nvSpPr>
-          <p:cNvPr id="5" name="Rectangle 4"/>
-          <p:cNvSpPr/>
-          <p:nvPr/>
-        </p:nvSpPr>
-        <p:spPr>
-          <a:xfrm>
-            <a:off x="1820487" y="1999211"/>
-            <a:ext cx="8229600" cy="369332"/>
-          </a:xfrm>
-          <a:prstGeom prst="rect">
-            <a:avLst/>
-          </a:prstGeom>
-        </p:spPr>
-        <p:txBody>
-          <a:bodyPr wrap="square">
-            <a:spAutoFit/>
-          </a:bodyPr>
-          <a:lstStyle/>
-          <a:p>
-            <a:pPr algn="ctr"/>
+          <a:p>
+            <a:r>
+              <a:rPr lang="en-US" dirty="0"/>
+              <a:t>VCD Definition for Win10</a:t>
+            </a:r>
+          </a:p>
+          <a:p>
+            <a:pPr lvl="1"/>
+            <a:r>
+              <a:rPr lang="en-US" dirty="0">
+                <a:hlinkClick r:id="rId3"/>
+              </a:rPr>
+              <a:t>https://</a:t>
+            </a:r>
             <a:r>
               <a:rPr lang="en-US" dirty="0" smtClean="0">
                 <a:hlinkClick r:id="rId3"/>
               </a:rPr>
-              <a:t>https://github.com/dannydwarren/Cortana-Location-UWP</a:t>
-            </a:r>
-            <a:r>
-              <a:rPr lang="en-US" dirty="0"/>
-              <a:t> </a:t>
-            </a:r>
-            <a:endParaRPr lang="en-US" dirty="0" smtClean="0"/>
-          </a:p>
-        </p:txBody>
-      </p:sp>
-      <p:sp>
-        <p:nvSpPr>
-          <p:cNvPr id="6" name="Title 3"/>
-          <p:cNvSpPr txBox="1">
-            <a:spLocks/>
-          </p:cNvSpPr>
-          <p:nvPr/>
-        </p:nvSpPr>
-        <p:spPr>
-          <a:xfrm>
-            <a:off x="1981200" y="2655917"/>
-            <a:ext cx="8229600" cy="1143000"/>
-          </a:xfrm>
-          <a:prstGeom prst="rect">
-            <a:avLst/>
-          </a:prstGeom>
-        </p:spPr>
-        <p:txBody>
-          <a:bodyPr vert="horz" lIns="91440" tIns="45720" rIns="91440" bIns="45720" rtlCol="0" anchor="ctr">
-            <a:normAutofit/>
-          </a:bodyPr>
-          <a:lstStyle>
-            <a:lvl1pPr algn="ctr" defTabSz="914400" rtl="0" eaLnBrk="1" latinLnBrk="0" hangingPunct="1">
-              <a:spcBef>
-                <a:spcPct val="0"/>
-              </a:spcBef>
-              <a:buNone/>
-              <a:defRPr sz="4400" kern="1200">
-                <a:solidFill>
-                  <a:schemeClr val="tx1">
-                    <a:lumMod val="75000"/>
-                    <a:lumOff val="25000"/>
-                  </a:schemeClr>
-                </a:solidFill>
-                <a:latin typeface="Segoe UI" pitchFamily="34" charset="0"/>
-                <a:ea typeface="Segoe UI" pitchFamily="34" charset="0"/>
-                <a:cs typeface="Segoe UI" pitchFamily="34" charset="0"/>
-              </a:defRPr>
-            </a:lvl1pPr>
-          </a:lstStyle>
-          <a:p>
+              <a:t>msdn.microsoft.com/en-us/library/dn954977.aspx</a:t>
+            </a:r>
+            <a:r>
+              <a:rPr lang="en-US" dirty="0"/>
+              <a:t> </a:t>
+            </a:r>
+          </a:p>
+          <a:p>
+            <a:pPr lvl="1"/>
+            <a:r>
+              <a:rPr lang="en-US" dirty="0"/>
+              <a:t>To activate an app and initiate an action using a voice command, the app must register a VCD file that contains a </a:t>
+            </a:r>
+            <a:r>
+              <a:rPr lang="en-US" dirty="0" err="1"/>
+              <a:t>CommandSet</a:t>
+            </a:r>
+            <a:r>
+              <a:rPr lang="en-US" dirty="0"/>
+              <a:t> with a language that matches the speech language that the user selected on their device. This language is set by the user on the device Settings &gt; System &gt; Speech &gt; Speech Language screen</a:t>
+            </a:r>
             <a:r>
               <a:rPr lang="en-US" dirty="0" smtClean="0"/>
-              <a:t>Interested in talking more?</a:t>
+              <a:t>.</a:t>
             </a:r>
             <a:endParaRPr lang="en-US" dirty="0"/>
           </a:p>
-        </p:txBody>
-      </p:sp>
-      <p:sp>
-        <p:nvSpPr>
-          <p:cNvPr id="7" name="Content Placeholder 5"/>
-          <p:cNvSpPr txBox="1">
-            <a:spLocks/>
-          </p:cNvSpPr>
-          <p:nvPr/>
-        </p:nvSpPr>
-        <p:spPr>
-          <a:xfrm>
-            <a:off x="2056014" y="3798917"/>
-            <a:ext cx="7902633" cy="1882833"/>
-          </a:xfrm>
-          <a:prstGeom prst="rect">
-            <a:avLst/>
-          </a:prstGeom>
-        </p:spPr>
-        <p:txBody>
-          <a:bodyPr/>
-          <a:lstStyle>
-            <a:lvl1pPr marL="342900" indent="-342900" algn="l" defTabSz="914400" rtl="0" eaLnBrk="1" latinLnBrk="0" hangingPunct="1">
-              <a:spcBef>
-                <a:spcPct val="20000"/>
-              </a:spcBef>
-              <a:buFont typeface="Arial" pitchFamily="34" charset="0"/>
-              <a:buChar char="•"/>
-              <a:defRPr sz="3200" kern="1200">
-                <a:solidFill>
-                  <a:schemeClr val="tx1">
-                    <a:lumMod val="65000"/>
-                    <a:lumOff val="35000"/>
-                  </a:schemeClr>
-                </a:solidFill>
-                <a:latin typeface="Segoe UI" pitchFamily="34" charset="0"/>
-                <a:ea typeface="Segoe UI" pitchFamily="34" charset="0"/>
-                <a:cs typeface="Segoe UI" pitchFamily="34" charset="0"/>
-              </a:defRPr>
-            </a:lvl1pPr>
-            <a:lvl2pPr marL="742950" indent="-285750" algn="l" defTabSz="914400" rtl="0" eaLnBrk="1" latinLnBrk="0" hangingPunct="1">
-              <a:spcBef>
-                <a:spcPct val="20000"/>
-              </a:spcBef>
-              <a:buFont typeface="Arial" pitchFamily="34" charset="0"/>
-              <a:buChar char="–"/>
-              <a:defRPr sz="2800" kern="1200">
-                <a:solidFill>
-                  <a:schemeClr val="tx1">
-                    <a:lumMod val="65000"/>
-                    <a:lumOff val="35000"/>
-                  </a:schemeClr>
-                </a:solidFill>
-                <a:latin typeface="Segoe UI" pitchFamily="34" charset="0"/>
-                <a:ea typeface="Segoe UI" pitchFamily="34" charset="0"/>
-                <a:cs typeface="Segoe UI" pitchFamily="34" charset="0"/>
-              </a:defRPr>
-            </a:lvl2pPr>
-            <a:lvl3pPr marL="1143000" indent="-228600" algn="l" defTabSz="914400" rtl="0" eaLnBrk="1" latinLnBrk="0" hangingPunct="1">
-              <a:spcBef>
-                <a:spcPct val="20000"/>
-              </a:spcBef>
-              <a:buFont typeface="Arial" pitchFamily="34" charset="0"/>
-              <a:buChar char="•"/>
-              <a:defRPr sz="2400" kern="1200">
-                <a:solidFill>
-                  <a:schemeClr val="tx1">
-                    <a:lumMod val="65000"/>
-                    <a:lumOff val="35000"/>
-                  </a:schemeClr>
-                </a:solidFill>
-                <a:latin typeface="Segoe UI" pitchFamily="34" charset="0"/>
-                <a:ea typeface="Segoe UI" pitchFamily="34" charset="0"/>
-                <a:cs typeface="Segoe UI" pitchFamily="34" charset="0"/>
-              </a:defRPr>
-            </a:lvl3pPr>
-            <a:lvl4pPr marL="1600200" indent="-228600" algn="l" defTabSz="914400" rtl="0" eaLnBrk="1" latinLnBrk="0" hangingPunct="1">
-              <a:spcBef>
-                <a:spcPct val="20000"/>
-              </a:spcBef>
-              <a:buFont typeface="Arial" pitchFamily="34" charset="0"/>
-              <a:buChar char="–"/>
-              <a:defRPr sz="2000" kern="1200">
-                <a:solidFill>
-                  <a:schemeClr val="tx1">
-                    <a:lumMod val="65000"/>
-                    <a:lumOff val="35000"/>
-                  </a:schemeClr>
-                </a:solidFill>
-                <a:latin typeface="Segoe UI" pitchFamily="34" charset="0"/>
-                <a:ea typeface="Segoe UI" pitchFamily="34" charset="0"/>
-                <a:cs typeface="Segoe UI" pitchFamily="34" charset="0"/>
-              </a:defRPr>
-            </a:lvl4pPr>
-            <a:lvl5pPr marL="2057400" indent="-228600" algn="l" defTabSz="914400" rtl="0" eaLnBrk="1" latinLnBrk="0" hangingPunct="1">
-              <a:spcBef>
-                <a:spcPct val="20000"/>
-              </a:spcBef>
-              <a:buFont typeface="Arial" pitchFamily="34" charset="0"/>
-              <a:buChar char="»"/>
-              <a:defRPr sz="2000" kern="1200">
-                <a:solidFill>
-                  <a:schemeClr val="tx1">
-                    <a:lumMod val="65000"/>
-                    <a:lumOff val="35000"/>
-                  </a:schemeClr>
-                </a:solidFill>
-                <a:latin typeface="Segoe UI" pitchFamily="34" charset="0"/>
-                <a:ea typeface="Segoe UI" pitchFamily="34" charset="0"/>
-                <a:cs typeface="Segoe UI" pitchFamily="34" charset="0"/>
-              </a:defRPr>
-            </a:lvl5pPr>
-            <a:lvl6pPr marL="2514600" indent="-228600" algn="l" defTabSz="914400" rtl="0" eaLnBrk="1" latinLnBrk="0" hangingPunct="1">
-              <a:spcBef>
-                <a:spcPct val="20000"/>
-              </a:spcBef>
-              <a:buFont typeface="Arial" pitchFamily="34" charset="0"/>
-              <a:buChar char="•"/>
-              <a:defRPr sz="2000" kern="1200">
-                <a:solidFill>
-                  <a:schemeClr val="tx1"/>
-                </a:solidFill>
-                <a:latin typeface="+mn-lt"/>
-                <a:ea typeface="+mn-ea"/>
-                <a:cs typeface="+mn-cs"/>
-              </a:defRPr>
-            </a:lvl6pPr>
-            <a:lvl7pPr marL="2971800" indent="-228600" algn="l" defTabSz="914400" rtl="0" eaLnBrk="1" latinLnBrk="0" hangingPunct="1">
-              <a:spcBef>
-                <a:spcPct val="20000"/>
-              </a:spcBef>
-              <a:buFont typeface="Arial" pitchFamily="34" charset="0"/>
-              <a:buChar char="•"/>
-              <a:defRPr sz="2000" kern="1200">
-                <a:solidFill>
-                  <a:schemeClr val="tx1"/>
-                </a:solidFill>
-                <a:latin typeface="+mn-lt"/>
-                <a:ea typeface="+mn-ea"/>
-                <a:cs typeface="+mn-cs"/>
-              </a:defRPr>
-            </a:lvl7pPr>
-            <a:lvl8pPr marL="3429000" indent="-228600" algn="l" defTabSz="914400" rtl="0" eaLnBrk="1" latinLnBrk="0" hangingPunct="1">
-              <a:spcBef>
-                <a:spcPct val="20000"/>
-              </a:spcBef>
-              <a:buFont typeface="Arial" pitchFamily="34" charset="0"/>
-              <a:buChar char="•"/>
-              <a:defRPr sz="2000" kern="1200">
-                <a:solidFill>
-                  <a:schemeClr val="tx1"/>
-                </a:solidFill>
-                <a:latin typeface="+mn-lt"/>
-                <a:ea typeface="+mn-ea"/>
-                <a:cs typeface="+mn-cs"/>
-              </a:defRPr>
-            </a:lvl8pPr>
-            <a:lvl9pPr marL="3886200" indent="-228600" algn="l" defTabSz="914400" rtl="0" eaLnBrk="1" latinLnBrk="0" hangingPunct="1">
-              <a:spcBef>
-                <a:spcPct val="20000"/>
-              </a:spcBef>
-              <a:buFont typeface="Arial" pitchFamily="34" charset="0"/>
-              <a:buChar char="•"/>
-              <a:defRPr sz="2000" kern="1200">
-                <a:solidFill>
-                  <a:schemeClr val="tx1"/>
-                </a:solidFill>
-                <a:latin typeface="+mn-lt"/>
-                <a:ea typeface="+mn-ea"/>
-                <a:cs typeface="+mn-cs"/>
-              </a:defRPr>
-            </a:lvl9pPr>
-          </a:lstStyle>
-          <a:p>
-            <a:pPr marL="0" indent="0" algn="ctr">
-              <a:buNone/>
-            </a:pPr>
-            <a:r>
-              <a:rPr lang="en-US" dirty="0" smtClean="0"/>
-              <a:t>Contact Me</a:t>
-            </a:r>
-          </a:p>
-          <a:p>
-            <a:pPr marL="0" indent="0" algn="ctr">
-              <a:buNone/>
-            </a:pPr>
+          <a:p>
+            <a:r>
+              <a:rPr lang="en-US" dirty="0"/>
+              <a:t>Speech Namespace</a:t>
+            </a:r>
+          </a:p>
+          <a:p>
+            <a:pPr lvl="1"/>
+            <a:r>
+              <a:rPr lang="en-US" dirty="0">
+                <a:hlinkClick r:id="rId4"/>
+              </a:rPr>
+              <a:t>https://</a:t>
+            </a:r>
             <a:r>
               <a:rPr lang="en-US" dirty="0" smtClean="0">
                 <a:hlinkClick r:id="rId4"/>
               </a:rPr>
-              <a:t>dannyw@interknowlogy.com</a:t>
-            </a:r>
-            <a:endParaRPr lang="en-US" dirty="0" smtClean="0"/>
-          </a:p>
-          <a:p>
-            <a:pPr marL="0" indent="0" algn="ctr">
-              <a:buNone/>
-            </a:pPr>
-            <a:r>
-              <a:rPr lang="en-US" dirty="0" smtClean="0"/>
-              <a:t>Mention That Conference</a:t>
-            </a:r>
+              <a:t>msdn.microsoft.com/en-us/library/windows/apps/windows.media.speechrecognition.aspx</a:t>
+            </a:r>
+            <a:endParaRPr lang="en-US" dirty="0"/>
+          </a:p>
+          <a:p>
+            <a:r>
+              <a:rPr lang="en-US" dirty="0"/>
+              <a:t>App Service</a:t>
+            </a:r>
+          </a:p>
+          <a:p>
+            <a:pPr lvl="1"/>
+            <a:r>
+              <a:rPr lang="en-US" dirty="0">
+                <a:hlinkClick r:id="rId5"/>
+              </a:rPr>
+              <a:t>https://msdn.microsoft.com/en-us/library/windows/apps/mt187314.aspx</a:t>
+            </a:r>
+            <a:endParaRPr lang="en-US" dirty="0"/>
+          </a:p>
+          <a:p>
+            <a:pPr lvl="1"/>
+            <a:r>
+              <a:rPr lang="en-US" dirty="0"/>
+              <a:t>Same?</a:t>
+            </a:r>
+          </a:p>
+          <a:p>
+            <a:pPr lvl="2"/>
+            <a:r>
+              <a:rPr lang="en-US" dirty="0">
+                <a:hlinkClick r:id="rId6"/>
+              </a:rPr>
+              <a:t>https://msdn.microsoft.com/en-us/library/dn974228.aspx</a:t>
+            </a:r>
+            <a:endParaRPr lang="en-US" dirty="0"/>
+          </a:p>
+          <a:p>
+            <a:pPr lvl="2"/>
+            <a:r>
+              <a:rPr lang="en-US" dirty="0">
+                <a:hlinkClick r:id="rId7"/>
+              </a:rPr>
+              <a:t>https://</a:t>
+            </a:r>
+            <a:r>
+              <a:rPr lang="en-US" dirty="0" smtClean="0">
+                <a:hlinkClick r:id="rId7"/>
+              </a:rPr>
+              <a:t>msdn.microsoft.com/en-us/library/windows/apps/xaml/dn974228.aspx</a:t>
+            </a:r>
+            <a:endParaRPr lang="en-US" dirty="0"/>
+          </a:p>
+          <a:p>
+            <a:r>
+              <a:rPr lang="en-US" dirty="0"/>
+              <a:t>Guidelines for working within Cortana UI</a:t>
+            </a:r>
+          </a:p>
+          <a:p>
+            <a:pPr lvl="1"/>
+            <a:r>
+              <a:rPr lang="en-US" dirty="0">
+                <a:hlinkClick r:id="rId8"/>
+              </a:rPr>
+              <a:t>https://msdn.microsoft.com/en-us/library/windows/apps/xaml/dn974233.aspx</a:t>
+            </a:r>
+            <a:endParaRPr lang="en-US" dirty="0"/>
+          </a:p>
+          <a:p>
+            <a:r>
+              <a:rPr lang="en-US" dirty="0"/>
+              <a:t>Guidelines for working with foreground Speech Recognition</a:t>
+            </a:r>
+          </a:p>
+          <a:p>
+            <a:pPr lvl="1"/>
+            <a:r>
+              <a:rPr lang="en-US" dirty="0">
+                <a:hlinkClick r:id="rId9"/>
+              </a:rPr>
+              <a:t>https://</a:t>
+            </a:r>
+            <a:r>
+              <a:rPr lang="en-US" dirty="0" smtClean="0">
+                <a:hlinkClick r:id="rId9"/>
+              </a:rPr>
+              <a:t>msdn.microsoft.com/en-us/library/windows/apps/xaml/dn596121.aspx</a:t>
+            </a:r>
+            <a:endParaRPr lang="en-US" dirty="0"/>
           </a:p>
         </p:txBody>
       </p:sp>
     </p:spTree>
     <p:extLst>
       <p:ext uri="{BB962C8B-B14F-4D97-AF65-F5344CB8AC3E}">
-        <p14:creationId xmlns:p14="http://schemas.microsoft.com/office/powerpoint/2010/main" val="1608563487"/>
+        <p14:creationId xmlns:p14="http://schemas.microsoft.com/office/powerpoint/2010/main" val="2592117313"/>
+      </p:ext>
+    </p:extLst>
+  </p:cSld>
+  <p:clrMapOvr>
+    <a:masterClrMapping/>
+  </p:clrMapOvr>
+</p:sld>
+</file>
+
+<file path=ppt/slides/slide18.xml><?xml version="1.0" encoding="utf-8"?>
+<p:sld xmlns:a="http://schemas.openxmlformats.org/drawingml/2006/main" xmlns:r="http://schemas.openxmlformats.org/officeDocument/2006/relationships" xmlns:p="http://schemas.openxmlformats.org/presentationml/2006/main">
+  <p:cSld>
+    <p:spTree>
+      <p:nvGrpSpPr>
+        <p:cNvPr id="1" name=""/>
+        <p:cNvGrpSpPr/>
+        <p:nvPr/>
+      </p:nvGrpSpPr>
+      <p:grpSpPr>
+        <a:xfrm>
+          <a:off x="0" y="0"/>
+          <a:ext cx="0" cy="0"/>
+          <a:chOff x="0" y="0"/>
+          <a:chExt cx="0" cy="0"/>
+        </a:xfrm>
+      </p:grpSpPr>
+      <p:sp>
+        <p:nvSpPr>
+          <p:cNvPr id="2" name="Title 1"/>
+          <p:cNvSpPr>
+            <a:spLocks noGrp="1"/>
+          </p:cNvSpPr>
+          <p:nvPr>
+            <p:ph type="title"/>
+          </p:nvPr>
+        </p:nvSpPr>
+        <p:spPr/>
+        <p:txBody>
+          <a:bodyPr/>
+          <a:lstStyle/>
+          <a:p>
+            <a:r>
+              <a:rPr lang="en-US" dirty="0" smtClean="0"/>
+              <a:t>My Research: Location</a:t>
+            </a:r>
+            <a:endParaRPr lang="en-US" dirty="0"/>
+          </a:p>
+        </p:txBody>
+      </p:sp>
+      <p:sp>
+        <p:nvSpPr>
+          <p:cNvPr id="3" name="Content Placeholder 2"/>
+          <p:cNvSpPr>
+            <a:spLocks noGrp="1"/>
+          </p:cNvSpPr>
+          <p:nvPr>
+            <p:ph idx="1"/>
+          </p:nvPr>
+        </p:nvSpPr>
+        <p:spPr/>
+        <p:txBody>
+          <a:bodyPr>
+            <a:normAutofit lnSpcReduction="10000"/>
+          </a:bodyPr>
+          <a:lstStyle/>
+          <a:p>
+            <a:r>
+              <a:rPr lang="en-US" dirty="0"/>
+              <a:t>Geolocation (namespace aka API):</a:t>
+            </a:r>
+          </a:p>
+          <a:p>
+            <a:pPr lvl="1"/>
+            <a:r>
+              <a:rPr lang="en-US" dirty="0">
+                <a:hlinkClick r:id="rId2"/>
+              </a:rPr>
+              <a:t>https://msdn.microsoft.com/en-us/library/windows/apps/windows.devices.geolocation.aspx</a:t>
+            </a:r>
+            <a:endParaRPr lang="en-US" dirty="0"/>
+          </a:p>
+          <a:p>
+            <a:pPr lvl="1"/>
+            <a:r>
+              <a:rPr lang="en-US" dirty="0"/>
+              <a:t>Interesting Info:</a:t>
+            </a:r>
+          </a:p>
+          <a:p>
+            <a:pPr lvl="2"/>
+            <a:r>
+              <a:rPr lang="en-US" dirty="0"/>
+              <a:t>Accuracy</a:t>
+            </a:r>
+          </a:p>
+          <a:p>
+            <a:pPr lvl="2"/>
+            <a:r>
+              <a:rPr lang="en-US" dirty="0"/>
+              <a:t>Circumstances and Settings required to work</a:t>
+            </a:r>
+          </a:p>
+          <a:p>
+            <a:pPr lvl="2"/>
+            <a:r>
+              <a:rPr lang="en-US" dirty="0"/>
+              <a:t>How to get access to Location</a:t>
+            </a:r>
+          </a:p>
+          <a:p>
+            <a:pPr lvl="3"/>
+            <a:r>
+              <a:rPr lang="en-US" dirty="0"/>
+              <a:t>If denied need to send the user to settings - </a:t>
+            </a:r>
+            <a:r>
+              <a:rPr lang="en-US" dirty="0">
+                <a:hlinkClick r:id="rId3"/>
+              </a:rPr>
+              <a:t>https://</a:t>
+            </a:r>
+            <a:r>
+              <a:rPr lang="en-US" dirty="0" smtClean="0">
+                <a:hlinkClick r:id="rId3"/>
+              </a:rPr>
+              <a:t>msdn.microsoft.com/en-us/library/windows/apps/xaml/dn741261.aspx</a:t>
+            </a:r>
+            <a:r>
+              <a:rPr lang="en-US" dirty="0"/>
+              <a:t> </a:t>
+            </a:r>
+          </a:p>
+          <a:p>
+            <a:r>
+              <a:rPr lang="en-US" dirty="0"/>
+              <a:t>Intro to </a:t>
+            </a:r>
+            <a:r>
+              <a:rPr lang="en-US" dirty="0" err="1"/>
+              <a:t>MapControl</a:t>
+            </a:r>
+            <a:r>
+              <a:rPr lang="en-US" dirty="0"/>
+              <a:t> and its MVVM Support</a:t>
+            </a:r>
+          </a:p>
+          <a:p>
+            <a:pPr lvl="1"/>
+            <a:r>
+              <a:rPr lang="en-US" dirty="0">
+                <a:hlinkClick r:id="rId4"/>
+              </a:rPr>
+              <a:t>http://jamescroft.co.uk/blog/uwp/exploring-windows-10-sdk-new-map-control/</a:t>
+            </a:r>
+            <a:endParaRPr lang="en-US" dirty="0"/>
+          </a:p>
+          <a:p>
+            <a:pPr lvl="1"/>
+            <a:r>
+              <a:rPr lang="en-US" dirty="0" smtClean="0"/>
+              <a:t>Attached </a:t>
+            </a:r>
+            <a:r>
+              <a:rPr lang="en-US" dirty="0"/>
+              <a:t>Location Prop</a:t>
+            </a:r>
+          </a:p>
+          <a:p>
+            <a:pPr lvl="2"/>
+            <a:r>
+              <a:rPr lang="en-US" dirty="0">
+                <a:hlinkClick r:id="rId5"/>
+              </a:rPr>
+              <a:t>https://msdn.microsoft.com/en-us/library/windows.ui.xaml.controls.maps.location.aspx</a:t>
+            </a:r>
+            <a:endParaRPr lang="en-US" dirty="0"/>
+          </a:p>
+          <a:p>
+            <a:endParaRPr lang="en-US" dirty="0"/>
+          </a:p>
+        </p:txBody>
+      </p:sp>
+    </p:spTree>
+    <p:extLst>
+      <p:ext uri="{BB962C8B-B14F-4D97-AF65-F5344CB8AC3E}">
+        <p14:creationId xmlns:p14="http://schemas.microsoft.com/office/powerpoint/2010/main" val="2498168495"/>
+      </p:ext>
+    </p:extLst>
+  </p:cSld>
+  <p:clrMapOvr>
+    <a:masterClrMapping/>
+  </p:clrMapOvr>
+</p:sld>
+</file>
+
+<file path=ppt/slides/slide19.xml><?xml version="1.0" encoding="utf-8"?>
+<p:sld xmlns:a="http://schemas.openxmlformats.org/drawingml/2006/main" xmlns:r="http://schemas.openxmlformats.org/officeDocument/2006/relationships" xmlns:p="http://schemas.openxmlformats.org/presentationml/2006/main">
+  <p:cSld>
+    <p:spTree>
+      <p:nvGrpSpPr>
+        <p:cNvPr id="1" name=""/>
+        <p:cNvGrpSpPr/>
+        <p:nvPr/>
+      </p:nvGrpSpPr>
+      <p:grpSpPr>
+        <a:xfrm>
+          <a:off x="0" y="0"/>
+          <a:ext cx="0" cy="0"/>
+          <a:chOff x="0" y="0"/>
+          <a:chExt cx="0" cy="0"/>
+        </a:xfrm>
+      </p:grpSpPr>
+      <p:sp>
+        <p:nvSpPr>
+          <p:cNvPr id="2" name="Title 1"/>
+          <p:cNvSpPr>
+            <a:spLocks noGrp="1"/>
+          </p:cNvSpPr>
+          <p:nvPr>
+            <p:ph type="title"/>
+          </p:nvPr>
+        </p:nvSpPr>
+        <p:spPr/>
+        <p:txBody>
+          <a:bodyPr/>
+          <a:lstStyle/>
+          <a:p>
+            <a:r>
+              <a:rPr lang="en-US" dirty="0" smtClean="0"/>
+              <a:t>My Research: Other Interesting UWP Topics</a:t>
+            </a:r>
+            <a:endParaRPr lang="en-US" dirty="0"/>
+          </a:p>
+        </p:txBody>
+      </p:sp>
+      <p:sp>
+        <p:nvSpPr>
+          <p:cNvPr id="3" name="Content Placeholder 2"/>
+          <p:cNvSpPr>
+            <a:spLocks noGrp="1"/>
+          </p:cNvSpPr>
+          <p:nvPr>
+            <p:ph idx="1"/>
+          </p:nvPr>
+        </p:nvSpPr>
+        <p:spPr/>
+        <p:txBody>
+          <a:bodyPr>
+            <a:normAutofit/>
+          </a:bodyPr>
+          <a:lstStyle/>
+          <a:p>
+            <a:r>
+              <a:rPr lang="en-US" dirty="0" smtClean="0"/>
+              <a:t>Guide </a:t>
+            </a:r>
+            <a:r>
+              <a:rPr lang="en-US" dirty="0"/>
+              <a:t>to Universal Windows Platform (UWP) apps</a:t>
+            </a:r>
+          </a:p>
+          <a:p>
+            <a:pPr lvl="1"/>
+            <a:r>
+              <a:rPr lang="en-US" dirty="0">
+                <a:hlinkClick r:id="rId2"/>
+              </a:rPr>
+              <a:t>https://</a:t>
+            </a:r>
+            <a:r>
+              <a:rPr lang="en-US" dirty="0" smtClean="0">
+                <a:hlinkClick r:id="rId2"/>
+              </a:rPr>
+              <a:t>msdn.microsoft.com/en-us/library/windows/apps/xaml/dn894631.aspx</a:t>
+            </a:r>
+            <a:r>
+              <a:rPr lang="en-US" dirty="0"/>
+              <a:t> </a:t>
+            </a:r>
+          </a:p>
+          <a:p>
+            <a:r>
+              <a:rPr lang="en-US" dirty="0"/>
+              <a:t>Porting a Windows Runtime 8 project to a Universal Windows Platform (UWP) project</a:t>
+            </a:r>
+          </a:p>
+          <a:p>
+            <a:pPr lvl="1"/>
+            <a:r>
+              <a:rPr lang="en-US" dirty="0">
+                <a:hlinkClick r:id="rId3"/>
+              </a:rPr>
+              <a:t>https://</a:t>
+            </a:r>
+            <a:r>
+              <a:rPr lang="en-US" dirty="0" smtClean="0">
+                <a:hlinkClick r:id="rId3"/>
+              </a:rPr>
+              <a:t>msdn.microsoft.com/en-us/library/windows/apps/xaml/dn705768.aspx#extension_sdks</a:t>
+            </a:r>
+            <a:endParaRPr lang="en-US" dirty="0"/>
+          </a:p>
+          <a:p>
+            <a:r>
+              <a:rPr lang="en-US" dirty="0"/>
+              <a:t>Planning your App</a:t>
+            </a:r>
+          </a:p>
+          <a:p>
+            <a:pPr lvl="1"/>
+            <a:r>
+              <a:rPr lang="en-US" dirty="0">
+                <a:hlinkClick r:id="rId4"/>
+              </a:rPr>
+              <a:t>https://</a:t>
+            </a:r>
+            <a:r>
+              <a:rPr lang="en-US" dirty="0" smtClean="0">
+                <a:hlinkClick r:id="rId4"/>
+              </a:rPr>
+              <a:t>msdn.microsoft.com/en-us/library/windows/apps/hh465427.aspx</a:t>
+            </a:r>
+            <a:endParaRPr lang="en-US" dirty="0" smtClean="0"/>
+          </a:p>
+          <a:p>
+            <a:r>
+              <a:rPr lang="en-US" dirty="0"/>
+              <a:t>Launch </a:t>
+            </a:r>
+            <a:r>
+              <a:rPr lang="en-US" dirty="0" smtClean="0"/>
+              <a:t>Settings</a:t>
+            </a:r>
+          </a:p>
+          <a:p>
+            <a:pPr lvl="1"/>
+            <a:r>
+              <a:rPr lang="en-US" dirty="0" smtClean="0">
+                <a:hlinkClick r:id="rId5"/>
+              </a:rPr>
+              <a:t>https</a:t>
+            </a:r>
+            <a:r>
+              <a:rPr lang="en-US" dirty="0">
+                <a:hlinkClick r:id="rId5"/>
+              </a:rPr>
+              <a:t>://msdn.microsoft.com/en-us/library/windows/apps/xaml/dn741261.aspx</a:t>
+            </a:r>
+            <a:endParaRPr lang="en-US" dirty="0"/>
+          </a:p>
+          <a:p>
+            <a:endParaRPr lang="en-US" dirty="0"/>
+          </a:p>
+          <a:p>
+            <a:endParaRPr lang="en-US" dirty="0"/>
+          </a:p>
+        </p:txBody>
+      </p:sp>
+    </p:spTree>
+    <p:extLst>
+      <p:ext uri="{BB962C8B-B14F-4D97-AF65-F5344CB8AC3E}">
+        <p14:creationId xmlns:p14="http://schemas.microsoft.com/office/powerpoint/2010/main" val="967360034"/>
       </p:ext>
     </p:extLst>
   </p:cSld>
@@ -4720,6 +4956,404 @@
     <p:extLst>
       <p:ext uri="{BB962C8B-B14F-4D97-AF65-F5344CB8AC3E}">
         <p14:creationId xmlns:p14="http://schemas.microsoft.com/office/powerpoint/2010/main" val="269905186"/>
+      </p:ext>
+    </p:extLst>
+  </p:cSld>
+  <p:clrMapOvr>
+    <a:masterClrMapping/>
+  </p:clrMapOvr>
+</p:sld>
+</file>
+
+<file path=ppt/slides/slide20.xml><?xml version="1.0" encoding="utf-8"?>
+<p:sld xmlns:a="http://schemas.openxmlformats.org/drawingml/2006/main" xmlns:r="http://schemas.openxmlformats.org/officeDocument/2006/relationships" xmlns:p="http://schemas.openxmlformats.org/presentationml/2006/main">
+  <p:cSld>
+    <p:spTree>
+      <p:nvGrpSpPr>
+        <p:cNvPr id="1" name=""/>
+        <p:cNvGrpSpPr/>
+        <p:nvPr/>
+      </p:nvGrpSpPr>
+      <p:grpSpPr>
+        <a:xfrm>
+          <a:off x="0" y="0"/>
+          <a:ext cx="0" cy="0"/>
+          <a:chOff x="0" y="0"/>
+          <a:chExt cx="0" cy="0"/>
+        </a:xfrm>
+      </p:grpSpPr>
+      <p:sp>
+        <p:nvSpPr>
+          <p:cNvPr id="2" name="Title 1"/>
+          <p:cNvSpPr>
+            <a:spLocks noGrp="1"/>
+          </p:cNvSpPr>
+          <p:nvPr>
+            <p:ph type="title"/>
+          </p:nvPr>
+        </p:nvSpPr>
+        <p:spPr/>
+        <p:txBody>
+          <a:bodyPr/>
+          <a:lstStyle/>
+          <a:p>
+            <a:r>
+              <a:rPr lang="en-US" dirty="0"/>
+              <a:t>Download Materials</a:t>
+            </a:r>
+          </a:p>
+        </p:txBody>
+      </p:sp>
+      <p:sp>
+        <p:nvSpPr>
+          <p:cNvPr id="4" name="TextBox 3"/>
+          <p:cNvSpPr txBox="1"/>
+          <p:nvPr/>
+        </p:nvSpPr>
+        <p:spPr>
+          <a:xfrm>
+            <a:off x="3284305" y="1359449"/>
+            <a:ext cx="5301964" cy="369332"/>
+          </a:xfrm>
+          <a:prstGeom prst="rect">
+            <a:avLst/>
+          </a:prstGeom>
+          <a:noFill/>
+        </p:spPr>
+        <p:txBody>
+          <a:bodyPr wrap="none" rtlCol="0">
+            <a:spAutoFit/>
+          </a:bodyPr>
+          <a:lstStyle/>
+          <a:p>
+            <a:r>
+              <a:rPr lang="en-US" dirty="0" smtClean="0">
+                <a:hlinkClick r:id="rId2"/>
+              </a:rPr>
+              <a:t>http://blogs.interknowlogy.com/author/dannywarren/</a:t>
+            </a:r>
+            <a:endParaRPr lang="en-US" dirty="0"/>
+          </a:p>
+        </p:txBody>
+      </p:sp>
+      <p:sp>
+        <p:nvSpPr>
+          <p:cNvPr id="5" name="Rectangle 4"/>
+          <p:cNvSpPr/>
+          <p:nvPr/>
+        </p:nvSpPr>
+        <p:spPr>
+          <a:xfrm>
+            <a:off x="1820487" y="1999211"/>
+            <a:ext cx="8229600" cy="369332"/>
+          </a:xfrm>
+          <a:prstGeom prst="rect">
+            <a:avLst/>
+          </a:prstGeom>
+        </p:spPr>
+        <p:txBody>
+          <a:bodyPr wrap="square">
+            <a:spAutoFit/>
+          </a:bodyPr>
+          <a:lstStyle/>
+          <a:p>
+            <a:pPr algn="ctr"/>
+            <a:r>
+              <a:rPr lang="en-US" dirty="0" smtClean="0">
+                <a:hlinkClick r:id="rId3"/>
+              </a:rPr>
+              <a:t>https://github.com/dannydwarren/Cortana-Location-UWP</a:t>
+            </a:r>
+            <a:r>
+              <a:rPr lang="en-US" dirty="0"/>
+              <a:t> </a:t>
+            </a:r>
+            <a:endParaRPr lang="en-US" dirty="0" smtClean="0"/>
+          </a:p>
+        </p:txBody>
+      </p:sp>
+      <p:sp>
+        <p:nvSpPr>
+          <p:cNvPr id="6" name="Title 3"/>
+          <p:cNvSpPr txBox="1">
+            <a:spLocks/>
+          </p:cNvSpPr>
+          <p:nvPr/>
+        </p:nvSpPr>
+        <p:spPr>
+          <a:xfrm>
+            <a:off x="1981200" y="2655917"/>
+            <a:ext cx="8229600" cy="1143000"/>
+          </a:xfrm>
+          <a:prstGeom prst="rect">
+            <a:avLst/>
+          </a:prstGeom>
+        </p:spPr>
+        <p:txBody>
+          <a:bodyPr vert="horz" lIns="91440" tIns="45720" rIns="91440" bIns="45720" rtlCol="0" anchor="ctr">
+            <a:normAutofit/>
+          </a:bodyPr>
+          <a:lstStyle>
+            <a:lvl1pPr algn="ctr" defTabSz="914400" rtl="0" eaLnBrk="1" latinLnBrk="0" hangingPunct="1">
+              <a:spcBef>
+                <a:spcPct val="0"/>
+              </a:spcBef>
+              <a:buNone/>
+              <a:defRPr sz="4400" kern="1200">
+                <a:solidFill>
+                  <a:schemeClr val="tx1">
+                    <a:lumMod val="75000"/>
+                    <a:lumOff val="25000"/>
+                  </a:schemeClr>
+                </a:solidFill>
+                <a:latin typeface="Segoe UI" pitchFamily="34" charset="0"/>
+                <a:ea typeface="Segoe UI" pitchFamily="34" charset="0"/>
+                <a:cs typeface="Segoe UI" pitchFamily="34" charset="0"/>
+              </a:defRPr>
+            </a:lvl1pPr>
+          </a:lstStyle>
+          <a:p>
+            <a:r>
+              <a:rPr lang="en-US" dirty="0" smtClean="0"/>
+              <a:t>Interested in talking more?</a:t>
+            </a:r>
+            <a:endParaRPr lang="en-US" dirty="0"/>
+          </a:p>
+        </p:txBody>
+      </p:sp>
+      <p:sp>
+        <p:nvSpPr>
+          <p:cNvPr id="7" name="Content Placeholder 5"/>
+          <p:cNvSpPr txBox="1">
+            <a:spLocks/>
+          </p:cNvSpPr>
+          <p:nvPr/>
+        </p:nvSpPr>
+        <p:spPr>
+          <a:xfrm>
+            <a:off x="1400842" y="3798917"/>
+            <a:ext cx="9390315" cy="1882833"/>
+          </a:xfrm>
+          <a:prstGeom prst="rect">
+            <a:avLst/>
+          </a:prstGeom>
+        </p:spPr>
+        <p:txBody>
+          <a:bodyPr/>
+          <a:lstStyle>
+            <a:lvl1pPr marL="342900" indent="-342900" algn="l" defTabSz="914400" rtl="0" eaLnBrk="1" latinLnBrk="0" hangingPunct="1">
+              <a:spcBef>
+                <a:spcPct val="20000"/>
+              </a:spcBef>
+              <a:buFont typeface="Arial" pitchFamily="34" charset="0"/>
+              <a:buChar char="•"/>
+              <a:defRPr sz="3200" kern="1200">
+                <a:solidFill>
+                  <a:schemeClr val="tx1">
+                    <a:lumMod val="65000"/>
+                    <a:lumOff val="35000"/>
+                  </a:schemeClr>
+                </a:solidFill>
+                <a:latin typeface="Segoe UI" pitchFamily="34" charset="0"/>
+                <a:ea typeface="Segoe UI" pitchFamily="34" charset="0"/>
+                <a:cs typeface="Segoe UI" pitchFamily="34" charset="0"/>
+              </a:defRPr>
+            </a:lvl1pPr>
+            <a:lvl2pPr marL="742950" indent="-285750" algn="l" defTabSz="914400" rtl="0" eaLnBrk="1" latinLnBrk="0" hangingPunct="1">
+              <a:spcBef>
+                <a:spcPct val="20000"/>
+              </a:spcBef>
+              <a:buFont typeface="Arial" pitchFamily="34" charset="0"/>
+              <a:buChar char="–"/>
+              <a:defRPr sz="2800" kern="1200">
+                <a:solidFill>
+                  <a:schemeClr val="tx1">
+                    <a:lumMod val="65000"/>
+                    <a:lumOff val="35000"/>
+                  </a:schemeClr>
+                </a:solidFill>
+                <a:latin typeface="Segoe UI" pitchFamily="34" charset="0"/>
+                <a:ea typeface="Segoe UI" pitchFamily="34" charset="0"/>
+                <a:cs typeface="Segoe UI" pitchFamily="34" charset="0"/>
+              </a:defRPr>
+            </a:lvl2pPr>
+            <a:lvl3pPr marL="1143000" indent="-228600" algn="l" defTabSz="914400" rtl="0" eaLnBrk="1" latinLnBrk="0" hangingPunct="1">
+              <a:spcBef>
+                <a:spcPct val="20000"/>
+              </a:spcBef>
+              <a:buFont typeface="Arial" pitchFamily="34" charset="0"/>
+              <a:buChar char="•"/>
+              <a:defRPr sz="2400" kern="1200">
+                <a:solidFill>
+                  <a:schemeClr val="tx1">
+                    <a:lumMod val="65000"/>
+                    <a:lumOff val="35000"/>
+                  </a:schemeClr>
+                </a:solidFill>
+                <a:latin typeface="Segoe UI" pitchFamily="34" charset="0"/>
+                <a:ea typeface="Segoe UI" pitchFamily="34" charset="0"/>
+                <a:cs typeface="Segoe UI" pitchFamily="34" charset="0"/>
+              </a:defRPr>
+            </a:lvl3pPr>
+            <a:lvl4pPr marL="1600200" indent="-228600" algn="l" defTabSz="914400" rtl="0" eaLnBrk="1" latinLnBrk="0" hangingPunct="1">
+              <a:spcBef>
+                <a:spcPct val="20000"/>
+              </a:spcBef>
+              <a:buFont typeface="Arial" pitchFamily="34" charset="0"/>
+              <a:buChar char="–"/>
+              <a:defRPr sz="2000" kern="1200">
+                <a:solidFill>
+                  <a:schemeClr val="tx1">
+                    <a:lumMod val="65000"/>
+                    <a:lumOff val="35000"/>
+                  </a:schemeClr>
+                </a:solidFill>
+                <a:latin typeface="Segoe UI" pitchFamily="34" charset="0"/>
+                <a:ea typeface="Segoe UI" pitchFamily="34" charset="0"/>
+                <a:cs typeface="Segoe UI" pitchFamily="34" charset="0"/>
+              </a:defRPr>
+            </a:lvl4pPr>
+            <a:lvl5pPr marL="2057400" indent="-228600" algn="l" defTabSz="914400" rtl="0" eaLnBrk="1" latinLnBrk="0" hangingPunct="1">
+              <a:spcBef>
+                <a:spcPct val="20000"/>
+              </a:spcBef>
+              <a:buFont typeface="Arial" pitchFamily="34" charset="0"/>
+              <a:buChar char="»"/>
+              <a:defRPr sz="2000" kern="1200">
+                <a:solidFill>
+                  <a:schemeClr val="tx1">
+                    <a:lumMod val="65000"/>
+                    <a:lumOff val="35000"/>
+                  </a:schemeClr>
+                </a:solidFill>
+                <a:latin typeface="Segoe UI" pitchFamily="34" charset="0"/>
+                <a:ea typeface="Segoe UI" pitchFamily="34" charset="0"/>
+                <a:cs typeface="Segoe UI" pitchFamily="34" charset="0"/>
+              </a:defRPr>
+            </a:lvl5pPr>
+            <a:lvl6pPr marL="2514600" indent="-228600" algn="l" defTabSz="914400" rtl="0" eaLnBrk="1" latinLnBrk="0" hangingPunct="1">
+              <a:spcBef>
+                <a:spcPct val="20000"/>
+              </a:spcBef>
+              <a:buFont typeface="Arial" pitchFamily="34" charset="0"/>
+              <a:buChar char="•"/>
+              <a:defRPr sz="2000" kern="1200">
+                <a:solidFill>
+                  <a:schemeClr val="tx1"/>
+                </a:solidFill>
+                <a:latin typeface="+mn-lt"/>
+                <a:ea typeface="+mn-ea"/>
+                <a:cs typeface="+mn-cs"/>
+              </a:defRPr>
+            </a:lvl6pPr>
+            <a:lvl7pPr marL="2971800" indent="-228600" algn="l" defTabSz="914400" rtl="0" eaLnBrk="1" latinLnBrk="0" hangingPunct="1">
+              <a:spcBef>
+                <a:spcPct val="20000"/>
+              </a:spcBef>
+              <a:buFont typeface="Arial" pitchFamily="34" charset="0"/>
+              <a:buChar char="•"/>
+              <a:defRPr sz="2000" kern="1200">
+                <a:solidFill>
+                  <a:schemeClr val="tx1"/>
+                </a:solidFill>
+                <a:latin typeface="+mn-lt"/>
+                <a:ea typeface="+mn-ea"/>
+                <a:cs typeface="+mn-cs"/>
+              </a:defRPr>
+            </a:lvl7pPr>
+            <a:lvl8pPr marL="3429000" indent="-228600" algn="l" defTabSz="914400" rtl="0" eaLnBrk="1" latinLnBrk="0" hangingPunct="1">
+              <a:spcBef>
+                <a:spcPct val="20000"/>
+              </a:spcBef>
+              <a:buFont typeface="Arial" pitchFamily="34" charset="0"/>
+              <a:buChar char="•"/>
+              <a:defRPr sz="2000" kern="1200">
+                <a:solidFill>
+                  <a:schemeClr val="tx1"/>
+                </a:solidFill>
+                <a:latin typeface="+mn-lt"/>
+                <a:ea typeface="+mn-ea"/>
+                <a:cs typeface="+mn-cs"/>
+              </a:defRPr>
+            </a:lvl8pPr>
+            <a:lvl9pPr marL="3886200" indent="-228600" algn="l" defTabSz="914400" rtl="0" eaLnBrk="1" latinLnBrk="0" hangingPunct="1">
+              <a:spcBef>
+                <a:spcPct val="20000"/>
+              </a:spcBef>
+              <a:buFont typeface="Arial" pitchFamily="34" charset="0"/>
+              <a:buChar char="•"/>
+              <a:defRPr sz="2000" kern="1200">
+                <a:solidFill>
+                  <a:schemeClr val="tx1"/>
+                </a:solidFill>
+                <a:latin typeface="+mn-lt"/>
+                <a:ea typeface="+mn-ea"/>
+                <a:cs typeface="+mn-cs"/>
+              </a:defRPr>
+            </a:lvl9pPr>
+          </a:lstStyle>
+          <a:p>
+            <a:pPr marL="0" indent="0" algn="ctr">
+              <a:buNone/>
+            </a:pPr>
+            <a:r>
+              <a:rPr lang="en-US" dirty="0" smtClean="0"/>
+              <a:t>Contact Me</a:t>
+            </a:r>
+          </a:p>
+          <a:p>
+            <a:pPr marL="0" indent="0" algn="ctr">
+              <a:buNone/>
+            </a:pPr>
+            <a:r>
+              <a:rPr lang="en-US" dirty="0" smtClean="0">
+                <a:hlinkClick r:id="rId4"/>
+              </a:rPr>
+              <a:t>dannyw@interknowlogy.com</a:t>
+            </a:r>
+            <a:endParaRPr lang="en-US" dirty="0" smtClean="0"/>
+          </a:p>
+          <a:p>
+            <a:pPr marL="0" indent="0" algn="ctr">
+              <a:buNone/>
+            </a:pPr>
+            <a:r>
+              <a:rPr lang="en-US" dirty="0" smtClean="0"/>
+              <a:t>Mention That </a:t>
+            </a:r>
+            <a:r>
+              <a:rPr lang="en-US" dirty="0" smtClean="0"/>
+              <a:t>Conference</a:t>
+            </a:r>
+          </a:p>
+          <a:p>
+            <a:pPr marL="0" indent="0" algn="ctr">
+              <a:buNone/>
+            </a:pPr>
+            <a:r>
+              <a:rPr lang="en-US" dirty="0" smtClean="0"/>
+              <a:t>LinkedIn: </a:t>
+            </a:r>
+            <a:r>
+              <a:rPr lang="en-US" dirty="0" err="1" smtClean="0"/>
+              <a:t>dannydwarren</a:t>
+            </a:r>
+            <a:r>
+              <a:rPr lang="en-US" dirty="0" smtClean="0"/>
+              <a:t>   Twitter: </a:t>
+            </a:r>
+            <a:r>
+              <a:rPr lang="en-US" dirty="0" err="1" smtClean="0"/>
+              <a:t>dannydwarren</a:t>
+            </a:r>
+            <a:endParaRPr lang="en-US" dirty="0" smtClean="0"/>
+          </a:p>
+        </p:txBody>
+      </p:sp>
+    </p:spTree>
+    <p:extLst>
+      <p:ext uri="{BB962C8B-B14F-4D97-AF65-F5344CB8AC3E}">
+        <p14:creationId xmlns:p14="http://schemas.microsoft.com/office/powerpoint/2010/main" val="1608563487"/>
       </p:ext>
     </p:extLst>
   </p:cSld>

</xml_diff>